<commit_message>
Updated the GettingStarted slides.
</commit_message>
<xml_diff>
--- a/wiki/getting_started/getting_started.pptx
+++ b/wiki/getting_started/getting_started.pptx
@@ -14,7 +14,8 @@
     <p:sldId id="265" r:id="rId8"/>
     <p:sldId id="269" r:id="rId9"/>
     <p:sldId id="264" r:id="rId10"/>
-    <p:sldId id="257" r:id="rId11"/>
+    <p:sldId id="271" r:id="rId11"/>
+    <p:sldId id="257" r:id="rId12"/>
   </p:sldIdLst>
   <p:sldSz cx="9144000" cy="6858000" type="screen4x3"/>
   <p:notesSz cx="6858000" cy="9144000"/>
@@ -298,7 +299,7 @@
             <a:fld id="{925377B3-2828-421F-BFC8-72289DEFFBB5}" type="datetimeFigureOut">
               <a:rPr lang="en-US" smtClean="0"/>
               <a:pPr/>
-              <a:t>1/25/2013</a:t>
+              <a:t>1/26/2013</a:t>
             </a:fld>
             <a:endParaRPr lang="en-US"/>
           </a:p>
@@ -465,7 +466,7 @@
             <a:fld id="{925377B3-2828-421F-BFC8-72289DEFFBB5}" type="datetimeFigureOut">
               <a:rPr lang="en-US" smtClean="0"/>
               <a:pPr/>
-              <a:t>1/25/2013</a:t>
+              <a:t>1/26/2013</a:t>
             </a:fld>
             <a:endParaRPr lang="en-US"/>
           </a:p>
@@ -642,7 +643,7 @@
             <a:fld id="{925377B3-2828-421F-BFC8-72289DEFFBB5}" type="datetimeFigureOut">
               <a:rPr lang="en-US" smtClean="0"/>
               <a:pPr/>
-              <a:t>1/25/2013</a:t>
+              <a:t>1/26/2013</a:t>
             </a:fld>
             <a:endParaRPr lang="en-US"/>
           </a:p>
@@ -809,7 +810,7 @@
             <a:fld id="{925377B3-2828-421F-BFC8-72289DEFFBB5}" type="datetimeFigureOut">
               <a:rPr lang="en-US" smtClean="0"/>
               <a:pPr/>
-              <a:t>1/25/2013</a:t>
+              <a:t>1/26/2013</a:t>
             </a:fld>
             <a:endParaRPr lang="en-US"/>
           </a:p>
@@ -1052,7 +1053,7 @@
             <a:fld id="{925377B3-2828-421F-BFC8-72289DEFFBB5}" type="datetimeFigureOut">
               <a:rPr lang="en-US" smtClean="0"/>
               <a:pPr/>
-              <a:t>1/25/2013</a:t>
+              <a:t>1/26/2013</a:t>
             </a:fld>
             <a:endParaRPr lang="en-US"/>
           </a:p>
@@ -1337,7 +1338,7 @@
             <a:fld id="{925377B3-2828-421F-BFC8-72289DEFFBB5}" type="datetimeFigureOut">
               <a:rPr lang="en-US" smtClean="0"/>
               <a:pPr/>
-              <a:t>1/25/2013</a:t>
+              <a:t>1/26/2013</a:t>
             </a:fld>
             <a:endParaRPr lang="en-US"/>
           </a:p>
@@ -1756,7 +1757,7 @@
             <a:fld id="{925377B3-2828-421F-BFC8-72289DEFFBB5}" type="datetimeFigureOut">
               <a:rPr lang="en-US" smtClean="0"/>
               <a:pPr/>
-              <a:t>1/25/2013</a:t>
+              <a:t>1/26/2013</a:t>
             </a:fld>
             <a:endParaRPr lang="en-US"/>
           </a:p>
@@ -1871,7 +1872,7 @@
             <a:fld id="{925377B3-2828-421F-BFC8-72289DEFFBB5}" type="datetimeFigureOut">
               <a:rPr lang="en-US" smtClean="0"/>
               <a:pPr/>
-              <a:t>1/25/2013</a:t>
+              <a:t>1/26/2013</a:t>
             </a:fld>
             <a:endParaRPr lang="en-US"/>
           </a:p>
@@ -1963,7 +1964,7 @@
             <a:fld id="{925377B3-2828-421F-BFC8-72289DEFFBB5}" type="datetimeFigureOut">
               <a:rPr lang="en-US" smtClean="0"/>
               <a:pPr/>
-              <a:t>1/25/2013</a:t>
+              <a:t>1/26/2013</a:t>
             </a:fld>
             <a:endParaRPr lang="en-US"/>
           </a:p>
@@ -2237,7 +2238,7 @@
             <a:fld id="{925377B3-2828-421F-BFC8-72289DEFFBB5}" type="datetimeFigureOut">
               <a:rPr lang="en-US" smtClean="0"/>
               <a:pPr/>
-              <a:t>1/25/2013</a:t>
+              <a:t>1/26/2013</a:t>
             </a:fld>
             <a:endParaRPr lang="en-US"/>
           </a:p>
@@ -2487,7 +2488,7 @@
             <a:fld id="{925377B3-2828-421F-BFC8-72289DEFFBB5}" type="datetimeFigureOut">
               <a:rPr lang="en-US" smtClean="0"/>
               <a:pPr/>
-              <a:t>1/25/2013</a:t>
+              <a:t>1/26/2013</a:t>
             </a:fld>
             <a:endParaRPr lang="en-US"/>
           </a:p>
@@ -2697,7 +2698,7 @@
             <a:fld id="{925377B3-2828-421F-BFC8-72289DEFFBB5}" type="datetimeFigureOut">
               <a:rPr lang="en-US" smtClean="0"/>
               <a:pPr/>
-              <a:t>1/25/2013</a:t>
+              <a:t>1/26/2013</a:t>
             </a:fld>
             <a:endParaRPr lang="en-US"/>
           </a:p>
@@ -3362,6 +3363,388 @@
       </p:grpSpPr>
       <p:sp>
         <p:nvSpPr>
+          <p:cNvPr id="7" name="Rectangle 6"/>
+          <p:cNvSpPr/>
+          <p:nvPr/>
+        </p:nvSpPr>
+        <p:spPr>
+          <a:xfrm>
+            <a:off x="323528" y="711746"/>
+            <a:ext cx="7848872" cy="5184576"/>
+          </a:xfrm>
+          <a:prstGeom prst="rect">
+            <a:avLst/>
+          </a:prstGeom>
+        </p:spPr>
+        <p:style>
+          <a:lnRef idx="2">
+            <a:schemeClr val="accent1">
+              <a:shade val="50000"/>
+            </a:schemeClr>
+          </a:lnRef>
+          <a:fillRef idx="1">
+            <a:schemeClr val="accent1"/>
+          </a:fillRef>
+          <a:effectRef idx="0">
+            <a:schemeClr val="accent1"/>
+          </a:effectRef>
+          <a:fontRef idx="minor">
+            <a:schemeClr val="lt1"/>
+          </a:fontRef>
+        </p:style>
+        <p:txBody>
+          <a:bodyPr rtlCol="0" anchor="ctr"/>
+          <a:lstStyle/>
+          <a:p>
+            <a:pPr algn="ctr"/>
+            <a:endParaRPr lang="en-US"/>
+          </a:p>
+        </p:txBody>
+      </p:sp>
+      <p:sp>
+        <p:nvSpPr>
+          <p:cNvPr id="5" name="Rectangle 4"/>
+          <p:cNvSpPr/>
+          <p:nvPr/>
+        </p:nvSpPr>
+        <p:spPr>
+          <a:xfrm>
+            <a:off x="1403648" y="1412776"/>
+            <a:ext cx="5271472" cy="3182084"/>
+          </a:xfrm>
+          <a:prstGeom prst="rect">
+            <a:avLst/>
+          </a:prstGeom>
+          <a:solidFill>
+            <a:schemeClr val="bg1"/>
+          </a:solidFill>
+          <a:ln w="6350">
+            <a:noFill/>
+          </a:ln>
+        </p:spPr>
+        <p:style>
+          <a:lnRef idx="2">
+            <a:schemeClr val="accent1">
+              <a:shade val="50000"/>
+            </a:schemeClr>
+          </a:lnRef>
+          <a:fillRef idx="1">
+            <a:schemeClr val="accent1"/>
+          </a:fillRef>
+          <a:effectRef idx="0">
+            <a:schemeClr val="accent1"/>
+          </a:effectRef>
+          <a:fontRef idx="minor">
+            <a:schemeClr val="lt1"/>
+          </a:fontRef>
+        </p:style>
+        <p:txBody>
+          <a:bodyPr rtlCol="0" anchor="ctr"/>
+          <a:lstStyle/>
+          <a:p>
+            <a:pPr algn="ctr"/>
+            <a:r>
+              <a:rPr lang="en-US" dirty="0" smtClean="0"/>
+              <a:t>PeptideShaker Overview</a:t>
+            </a:r>
+          </a:p>
+        </p:txBody>
+      </p:sp>
+      <p:sp>
+        <p:nvSpPr>
+          <p:cNvPr id="8" name="TextBox 7"/>
+          <p:cNvSpPr txBox="1"/>
+          <p:nvPr/>
+        </p:nvSpPr>
+        <p:spPr>
+          <a:xfrm>
+            <a:off x="1475656" y="1556792"/>
+            <a:ext cx="4019562" cy="338554"/>
+          </a:xfrm>
+          <a:prstGeom prst="rect">
+            <a:avLst/>
+          </a:prstGeom>
+          <a:solidFill>
+            <a:schemeClr val="accent6"/>
+          </a:solidFill>
+          <a:ln>
+            <a:noFill/>
+          </a:ln>
+          <a:effectLst>
+            <a:outerShdw blurRad="50800" dist="38100" dir="2700000" algn="tl" rotWithShape="0">
+              <a:prstClr val="black">
+                <a:alpha val="40000"/>
+              </a:prstClr>
+            </a:outerShdw>
+          </a:effectLst>
+        </p:spPr>
+        <p:txBody>
+          <a:bodyPr wrap="none" rtlCol="0">
+            <a:spAutoFit/>
+          </a:bodyPr>
+          <a:lstStyle/>
+          <a:p>
+            <a:r>
+              <a:rPr lang="en-US" sz="1600" b="1" dirty="0" smtClean="0">
+                <a:solidFill>
+                  <a:schemeClr val="bg1"/>
+                </a:solidFill>
+              </a:rPr>
+              <a:t>Now open a PeptideShaker </a:t>
+            </a:r>
+            <a:r>
+              <a:rPr lang="en-US" sz="1600" b="1" dirty="0" smtClean="0">
+                <a:solidFill>
+                  <a:schemeClr val="bg1"/>
+                </a:solidFill>
+              </a:rPr>
+              <a:t>e</a:t>
+            </a:r>
+            <a:r>
+              <a:rPr lang="en-US" sz="1600" b="1" dirty="0" smtClean="0">
+                <a:solidFill>
+                  <a:schemeClr val="bg1"/>
+                </a:solidFill>
+              </a:rPr>
+              <a:t>xample </a:t>
+            </a:r>
+            <a:r>
+              <a:rPr lang="en-US" sz="1600" b="1" dirty="0" smtClean="0">
+                <a:solidFill>
+                  <a:schemeClr val="bg1"/>
+                </a:solidFill>
+              </a:rPr>
+              <a:t>d</a:t>
+            </a:r>
+            <a:r>
+              <a:rPr lang="en-US" sz="1600" b="1" dirty="0" smtClean="0">
+                <a:solidFill>
+                  <a:schemeClr val="bg1"/>
+                </a:solidFill>
+              </a:rPr>
+              <a:t>ataset!</a:t>
+            </a:r>
+            <a:endParaRPr lang="en-US" sz="1600" b="1" dirty="0">
+              <a:solidFill>
+                <a:schemeClr val="bg1"/>
+              </a:solidFill>
+            </a:endParaRPr>
+          </a:p>
+        </p:txBody>
+      </p:sp>
+      <p:pic>
+        <p:nvPicPr>
+          <p:cNvPr id="13" name="Picture 3"/>
+          <p:cNvPicPr>
+            <a:picLocks noChangeAspect="1" noChangeArrowheads="1"/>
+          </p:cNvPicPr>
+          <p:nvPr/>
+        </p:nvPicPr>
+        <p:blipFill>
+          <a:blip r:embed="rId2" cstate="print"/>
+          <a:srcRect/>
+          <a:stretch>
+            <a:fillRect/>
+          </a:stretch>
+        </p:blipFill>
+        <p:spPr bwMode="auto">
+          <a:xfrm>
+            <a:off x="2210584" y="2033972"/>
+            <a:ext cx="3657600" cy="2209800"/>
+          </a:xfrm>
+          <a:prstGeom prst="rect">
+            <a:avLst/>
+          </a:prstGeom>
+          <a:noFill/>
+          <a:ln w="3175">
+            <a:solidFill>
+              <a:schemeClr val="bg1">
+                <a:lumMod val="85000"/>
+              </a:schemeClr>
+            </a:solidFill>
+            <a:miter lim="800000"/>
+            <a:headEnd/>
+            <a:tailEnd/>
+          </a:ln>
+          <a:effectLst>
+            <a:outerShdw blurRad="50800" dist="38100" dir="2700000" algn="tl" rotWithShape="0">
+              <a:prstClr val="black">
+                <a:alpha val="40000"/>
+              </a:prstClr>
+            </a:outerShdw>
+          </a:effectLst>
+        </p:spPr>
+      </p:pic>
+      <p:sp>
+        <p:nvSpPr>
+          <p:cNvPr id="26" name="TextBox 25"/>
+          <p:cNvSpPr txBox="1"/>
+          <p:nvPr/>
+        </p:nvSpPr>
+        <p:spPr>
+          <a:xfrm>
+            <a:off x="2709372" y="3068639"/>
+            <a:ext cx="2660024" cy="307777"/>
+          </a:xfrm>
+          <a:prstGeom prst="rect">
+            <a:avLst/>
+          </a:prstGeom>
+          <a:solidFill>
+            <a:schemeClr val="accent6"/>
+          </a:solidFill>
+          <a:ln>
+            <a:noFill/>
+          </a:ln>
+          <a:effectLst>
+            <a:outerShdw blurRad="50800" dist="38100" dir="2700000" algn="tl" rotWithShape="0">
+              <a:prstClr val="black">
+                <a:alpha val="40000"/>
+              </a:prstClr>
+            </a:outerShdw>
+          </a:effectLst>
+        </p:spPr>
+        <p:txBody>
+          <a:bodyPr wrap="none" rtlCol="0">
+            <a:spAutoFit/>
+          </a:bodyPr>
+          <a:lstStyle/>
+          <a:p>
+            <a:r>
+              <a:rPr lang="en-US" sz="1400" dirty="0" smtClean="0">
+                <a:solidFill>
+                  <a:schemeClr val="bg1"/>
+                </a:solidFill>
+              </a:rPr>
+              <a:t>Click </a:t>
+            </a:r>
+            <a:r>
+              <a:rPr lang="en-US" sz="1400" dirty="0" smtClean="0">
+                <a:solidFill>
+                  <a:schemeClr val="bg1"/>
+                </a:solidFill>
+              </a:rPr>
+              <a:t>to </a:t>
+            </a:r>
+            <a:r>
+              <a:rPr lang="en-US" sz="1400" dirty="0" smtClean="0">
+                <a:solidFill>
+                  <a:schemeClr val="bg1"/>
+                </a:solidFill>
+              </a:rPr>
+              <a:t>open </a:t>
+            </a:r>
+            <a:r>
+              <a:rPr lang="en-US" sz="1400" dirty="0" smtClean="0">
+                <a:solidFill>
+                  <a:schemeClr val="bg1"/>
+                </a:solidFill>
+              </a:rPr>
+              <a:t>an example </a:t>
+            </a:r>
+            <a:r>
+              <a:rPr lang="en-US" sz="1400" dirty="0" smtClean="0">
+                <a:solidFill>
+                  <a:schemeClr val="bg1"/>
+                </a:solidFill>
+              </a:rPr>
+              <a:t>d</a:t>
+            </a:r>
+            <a:r>
+              <a:rPr lang="en-US" sz="1400" dirty="0" smtClean="0">
+                <a:solidFill>
+                  <a:schemeClr val="bg1"/>
+                </a:solidFill>
+              </a:rPr>
+              <a:t>ataset</a:t>
+            </a:r>
+            <a:r>
+              <a:rPr lang="en-US" sz="1050" dirty="0" smtClean="0">
+                <a:solidFill>
+                  <a:schemeClr val="bg1"/>
+                </a:solidFill>
+              </a:rPr>
+              <a:t>*</a:t>
+            </a:r>
+            <a:endParaRPr lang="en-US" sz="1400" dirty="0">
+              <a:solidFill>
+                <a:schemeClr val="bg1"/>
+              </a:solidFill>
+            </a:endParaRPr>
+          </a:p>
+        </p:txBody>
+      </p:sp>
+      <p:sp>
+        <p:nvSpPr>
+          <p:cNvPr id="14" name="TextBox 13"/>
+          <p:cNvSpPr txBox="1"/>
+          <p:nvPr/>
+        </p:nvSpPr>
+        <p:spPr>
+          <a:xfrm>
+            <a:off x="1414462" y="4371977"/>
+            <a:ext cx="4732386" cy="215444"/>
+          </a:xfrm>
+          <a:prstGeom prst="rect">
+            <a:avLst/>
+          </a:prstGeom>
+          <a:noFill/>
+        </p:spPr>
+        <p:txBody>
+          <a:bodyPr wrap="none" rtlCol="0">
+            <a:spAutoFit/>
+          </a:bodyPr>
+          <a:lstStyle/>
+          <a:p>
+            <a:r>
+              <a:rPr lang="de-DE" sz="800" i="1" dirty="0" smtClean="0"/>
+              <a:t>*Data </a:t>
+            </a:r>
+            <a:r>
+              <a:rPr lang="de-DE" sz="800" i="1" dirty="0" smtClean="0"/>
+              <a:t>kindly provided by the Leibniz-Institut für Analytische Wissenschaften - ISAS - e.V., Dortmund, </a:t>
+            </a:r>
+            <a:r>
+              <a:rPr lang="de-DE" sz="800" i="1" dirty="0" smtClean="0"/>
+              <a:t>Germany.</a:t>
+            </a:r>
+            <a:endParaRPr lang="en-US" sz="800" i="1" dirty="0"/>
+          </a:p>
+        </p:txBody>
+      </p:sp>
+    </p:spTree>
+  </p:cSld>
+  <p:clrMapOvr>
+    <a:masterClrMapping/>
+  </p:clrMapOvr>
+  <p:timing>
+    <p:tnLst>
+      <p:par>
+        <p:cTn id="1" dur="indefinite" restart="never" nodeType="tmRoot"/>
+      </p:par>
+    </p:tnLst>
+  </p:timing>
+</p:sld>
+</file>
+
+<file path=ppt/slides/slide11.xml><?xml version="1.0" encoding="utf-8"?>
+<p:sld xmlns:a="http://schemas.openxmlformats.org/drawingml/2006/main" xmlns:r="http://schemas.openxmlformats.org/officeDocument/2006/relationships" xmlns:p="http://schemas.openxmlformats.org/presentationml/2006/main">
+  <p:cSld>
+    <p:spTree>
+      <p:nvGrpSpPr>
+        <p:cNvPr id="1" name=""/>
+        <p:cNvGrpSpPr/>
+        <p:nvPr/>
+      </p:nvGrpSpPr>
+      <p:grpSpPr>
+        <a:xfrm>
+          <a:off x="0" y="0"/>
+          <a:ext cx="0" cy="0"/>
+          <a:chOff x="0" y="0"/>
+          <a:chExt cx="0" cy="0"/>
+        </a:xfrm>
+      </p:grpSpPr>
+      <p:sp>
+        <p:nvSpPr>
           <p:cNvPr id="2" name="Right Arrow 1"/>
           <p:cNvSpPr>
             <a:spLocks noChangeAspect="1"/>
@@ -4780,7 +5163,15 @@
                   <a:schemeClr val="bg1"/>
                 </a:solidFill>
               </a:rPr>
-              <a:t>… and updates the sequence coverage</a:t>
+              <a:t>… and updates the sequence </a:t>
+            </a:r>
+            <a:r>
+              <a:rPr lang="en-US" sz="1400" dirty="0" smtClean="0">
+                <a:solidFill>
+                  <a:schemeClr val="bg1"/>
+                </a:solidFill>
+              </a:rPr>
+              <a:t>coverage.</a:t>
             </a:r>
             <a:endParaRPr lang="en-US" sz="1400" dirty="0">
               <a:solidFill>
@@ -8217,8 +8608,8 @@
         </p:nvGrpSpPr>
         <p:grpSpPr>
           <a:xfrm>
-            <a:off x="5994400" y="1534708"/>
-            <a:ext cx="562768" cy="397045"/>
+            <a:off x="5867400" y="1496607"/>
+            <a:ext cx="742854" cy="524099"/>
             <a:chOff x="5057775" y="2350294"/>
             <a:chExt cx="3493294" cy="2464594"/>
           </a:xfrm>
@@ -8531,12 +8922,20 @@
           <a:lstStyle/>
           <a:p>
             <a:r>
+              <a:rPr lang="en-US" sz="1600" b="1" dirty="0" smtClean="0">
+                <a:solidFill>
+                  <a:schemeClr val="bg1"/>
+                </a:solidFill>
+              </a:rPr>
+              <a:t>Try using </a:t>
+            </a:r>
+            <a:r>
               <a:rPr lang="en-US" sz="1600" b="1" dirty="0">
                 <a:solidFill>
                   <a:schemeClr val="bg1"/>
                 </a:solidFill>
               </a:rPr>
-              <a:t>Try using SearchGUI to identify your spectra!</a:t>
+              <a:t>SearchGUI to identify your spectra!</a:t>
             </a:r>
           </a:p>
         </p:txBody>
@@ -8558,8 +8957,8 @@
         </p:blipFill>
         <p:spPr bwMode="auto">
           <a:xfrm>
-            <a:off x="5920581" y="1539080"/>
-            <a:ext cx="487363" cy="365125"/>
+            <a:off x="5863430" y="1551779"/>
+            <a:ext cx="633932" cy="475449"/>
           </a:xfrm>
           <a:prstGeom prst="rect">
             <a:avLst/>
@@ -8836,7 +9235,15 @@
                   <a:schemeClr val="bg1"/>
                 </a:solidFill>
               </a:rPr>
-              <a:t>… in a simple graphical user interface</a:t>
+              <a:t>… in a simple graphical user </a:t>
+            </a:r>
+            <a:r>
+              <a:rPr lang="en-US" sz="1400" dirty="0" smtClean="0">
+                <a:solidFill>
+                  <a:schemeClr val="bg1"/>
+                </a:solidFill>
+              </a:rPr>
+              <a:t>interface.</a:t>
             </a:r>
             <a:endParaRPr lang="en-US" sz="1400" dirty="0">
               <a:solidFill>

</xml_diff>

<commit_message>
Updated the getting started slides.
</commit_message>
<xml_diff>
--- a/wiki/getting_started/getting_started.pptx
+++ b/wiki/getting_started/getting_started.pptx
@@ -6,17 +6,18 @@
   </p:sldMasterIdLst>
   <p:sldIdLst>
     <p:sldId id="268" r:id="rId2"/>
-    <p:sldId id="256" r:id="rId3"/>
-    <p:sldId id="258" r:id="rId4"/>
-    <p:sldId id="259" r:id="rId5"/>
-    <p:sldId id="262" r:id="rId6"/>
-    <p:sldId id="263" r:id="rId7"/>
-    <p:sldId id="265" r:id="rId8"/>
-    <p:sldId id="273" r:id="rId9"/>
-    <p:sldId id="269" r:id="rId10"/>
-    <p:sldId id="264" r:id="rId11"/>
-    <p:sldId id="271" r:id="rId12"/>
-    <p:sldId id="257" r:id="rId13"/>
+    <p:sldId id="264" r:id="rId3"/>
+    <p:sldId id="256" r:id="rId4"/>
+    <p:sldId id="258" r:id="rId5"/>
+    <p:sldId id="259" r:id="rId6"/>
+    <p:sldId id="262" r:id="rId7"/>
+    <p:sldId id="263" r:id="rId8"/>
+    <p:sldId id="265" r:id="rId9"/>
+    <p:sldId id="273" r:id="rId10"/>
+    <p:sldId id="269" r:id="rId11"/>
+    <p:sldId id="274" r:id="rId12"/>
+    <p:sldId id="271" r:id="rId13"/>
+    <p:sldId id="257" r:id="rId14"/>
   </p:sldIdLst>
   <p:sldSz cx="9144000" cy="6858000" type="screen4x3"/>
   <p:notesSz cx="6858000" cy="9144000"/>
@@ -300,7 +301,7 @@
             <a:fld id="{925377B3-2828-421F-BFC8-72289DEFFBB5}" type="datetimeFigureOut">
               <a:rPr lang="en-US" smtClean="0"/>
               <a:pPr/>
-              <a:t>2/11/2013</a:t>
+              <a:t>8/28/2013</a:t>
             </a:fld>
             <a:endParaRPr lang="en-US"/>
           </a:p>
@@ -467,7 +468,7 @@
             <a:fld id="{925377B3-2828-421F-BFC8-72289DEFFBB5}" type="datetimeFigureOut">
               <a:rPr lang="en-US" smtClean="0"/>
               <a:pPr/>
-              <a:t>2/11/2013</a:t>
+              <a:t>8/28/2013</a:t>
             </a:fld>
             <a:endParaRPr lang="en-US"/>
           </a:p>
@@ -644,7 +645,7 @@
             <a:fld id="{925377B3-2828-421F-BFC8-72289DEFFBB5}" type="datetimeFigureOut">
               <a:rPr lang="en-US" smtClean="0"/>
               <a:pPr/>
-              <a:t>2/11/2013</a:t>
+              <a:t>8/28/2013</a:t>
             </a:fld>
             <a:endParaRPr lang="en-US"/>
           </a:p>
@@ -811,7 +812,7 @@
             <a:fld id="{925377B3-2828-421F-BFC8-72289DEFFBB5}" type="datetimeFigureOut">
               <a:rPr lang="en-US" smtClean="0"/>
               <a:pPr/>
-              <a:t>2/11/2013</a:t>
+              <a:t>8/28/2013</a:t>
             </a:fld>
             <a:endParaRPr lang="en-US"/>
           </a:p>
@@ -1054,7 +1055,7 @@
             <a:fld id="{925377B3-2828-421F-BFC8-72289DEFFBB5}" type="datetimeFigureOut">
               <a:rPr lang="en-US" smtClean="0"/>
               <a:pPr/>
-              <a:t>2/11/2013</a:t>
+              <a:t>8/28/2013</a:t>
             </a:fld>
             <a:endParaRPr lang="en-US"/>
           </a:p>
@@ -1339,7 +1340,7 @@
             <a:fld id="{925377B3-2828-421F-BFC8-72289DEFFBB5}" type="datetimeFigureOut">
               <a:rPr lang="en-US" smtClean="0"/>
               <a:pPr/>
-              <a:t>2/11/2013</a:t>
+              <a:t>8/28/2013</a:t>
             </a:fld>
             <a:endParaRPr lang="en-US"/>
           </a:p>
@@ -1758,7 +1759,7 @@
             <a:fld id="{925377B3-2828-421F-BFC8-72289DEFFBB5}" type="datetimeFigureOut">
               <a:rPr lang="en-US" smtClean="0"/>
               <a:pPr/>
-              <a:t>2/11/2013</a:t>
+              <a:t>8/28/2013</a:t>
             </a:fld>
             <a:endParaRPr lang="en-US"/>
           </a:p>
@@ -1873,7 +1874,7 @@
             <a:fld id="{925377B3-2828-421F-BFC8-72289DEFFBB5}" type="datetimeFigureOut">
               <a:rPr lang="en-US" smtClean="0"/>
               <a:pPr/>
-              <a:t>2/11/2013</a:t>
+              <a:t>8/28/2013</a:t>
             </a:fld>
             <a:endParaRPr lang="en-US"/>
           </a:p>
@@ -1965,7 +1966,7 @@
             <a:fld id="{925377B3-2828-421F-BFC8-72289DEFFBB5}" type="datetimeFigureOut">
               <a:rPr lang="en-US" smtClean="0"/>
               <a:pPr/>
-              <a:t>2/11/2013</a:t>
+              <a:t>8/28/2013</a:t>
             </a:fld>
             <a:endParaRPr lang="en-US"/>
           </a:p>
@@ -2239,7 +2240,7 @@
             <a:fld id="{925377B3-2828-421F-BFC8-72289DEFFBB5}" type="datetimeFigureOut">
               <a:rPr lang="en-US" smtClean="0"/>
               <a:pPr/>
-              <a:t>2/11/2013</a:t>
+              <a:t>8/28/2013</a:t>
             </a:fld>
             <a:endParaRPr lang="en-US"/>
           </a:p>
@@ -2489,7 +2490,7 @@
             <a:fld id="{925377B3-2828-421F-BFC8-72289DEFFBB5}" type="datetimeFigureOut">
               <a:rPr lang="en-US" smtClean="0"/>
               <a:pPr/>
-              <a:t>2/11/2013</a:t>
+              <a:t>8/28/2013</a:t>
             </a:fld>
             <a:endParaRPr lang="en-US"/>
           </a:p>
@@ -2699,7 +2700,7 @@
             <a:fld id="{925377B3-2828-421F-BFC8-72289DEFFBB5}" type="datetimeFigureOut">
               <a:rPr lang="en-US" smtClean="0"/>
               <a:pPr/>
-              <a:t>2/11/2013</a:t>
+              <a:t>8/28/2013</a:t>
             </a:fld>
             <a:endParaRPr lang="en-US"/>
           </a:p>
@@ -3325,8 +3326,12 @@
                 <a:latin typeface="Calibri" pitchFamily="34" charset="0"/>
                 <a:cs typeface="Calibri" pitchFamily="34" charset="0"/>
               </a:rPr>
-              <a:t>From spectra to identifications and beyond!</a:t>
-            </a:r>
+              <a:t>Completes the proteomics analysis cycle!</a:t>
+            </a:r>
+            <a:endParaRPr lang="en-US" sz="1600" i="1" dirty="0" smtClean="0">
+              <a:latin typeface="Calibri" pitchFamily="34" charset="0"/>
+              <a:cs typeface="Calibri" pitchFamily="34" charset="0"/>
+            </a:endParaRPr>
           </a:p>
         </p:txBody>
       </p:sp>
@@ -3364,7 +3369,7 @@
       </p:grpSpPr>
       <p:sp>
         <p:nvSpPr>
-          <p:cNvPr id="7" name="Rectangle 6"/>
+          <p:cNvPr id="24" name="Rectangle 23"/>
           <p:cNvSpPr/>
           <p:nvPr/>
         </p:nvSpPr>
@@ -3404,7 +3409,7 @@
       </p:sp>
       <p:sp>
         <p:nvSpPr>
-          <p:cNvPr id="5" name="Rectangle 4"/>
+          <p:cNvPr id="28" name="Rectangle 27"/>
           <p:cNvSpPr/>
           <p:nvPr/>
         </p:nvSpPr>
@@ -3451,62 +3456,9 @@
           </a:p>
         </p:txBody>
       </p:sp>
-      <p:sp>
-        <p:nvSpPr>
-          <p:cNvPr id="8" name="TextBox 7"/>
-          <p:cNvSpPr txBox="1"/>
-          <p:nvPr/>
-        </p:nvSpPr>
-        <p:spPr>
-          <a:xfrm>
-            <a:off x="1475656" y="1556792"/>
-            <a:ext cx="3982565" cy="338554"/>
-          </a:xfrm>
-          <a:prstGeom prst="rect">
-            <a:avLst/>
-          </a:prstGeom>
-          <a:solidFill>
-            <a:schemeClr val="accent6"/>
-          </a:solidFill>
-          <a:ln>
-            <a:noFill/>
-          </a:ln>
-          <a:effectLst>
-            <a:outerShdw blurRad="50800" dist="38100" dir="2700000" algn="tl" rotWithShape="0">
-              <a:prstClr val="black">
-                <a:alpha val="40000"/>
-              </a:prstClr>
-            </a:outerShdw>
-          </a:effectLst>
-        </p:spPr>
-        <p:txBody>
-          <a:bodyPr wrap="none" rtlCol="0">
-            <a:spAutoFit/>
-          </a:bodyPr>
-          <a:lstStyle/>
-          <a:p>
-            <a:r>
-              <a:rPr lang="en-US" sz="1600" b="1" dirty="0" smtClean="0">
-                <a:solidFill>
-                  <a:schemeClr val="bg1"/>
-                </a:solidFill>
-              </a:rPr>
-              <a:t>Try using </a:t>
-            </a:r>
-            <a:r>
-              <a:rPr lang="en-US" sz="1600" b="1" dirty="0">
-                <a:solidFill>
-                  <a:schemeClr val="bg1"/>
-                </a:solidFill>
-              </a:rPr>
-              <a:t>SearchGUI to identify your spectra!</a:t>
-            </a:r>
-          </a:p>
-        </p:txBody>
-      </p:sp>
       <p:pic>
         <p:nvPicPr>
-          <p:cNvPr id="18439" name="Picture 7" descr="C:\Users\hba041\My_Applications\peptide-shaker\src\main\resources\icons\searchgui-medium-shadow.png"/>
+          <p:cNvPr id="21" name="Picture 2"/>
           <p:cNvPicPr>
             <a:picLocks noChangeAspect="1" noChangeArrowheads="1"/>
           </p:cNvPicPr>
@@ -3521,66 +3473,244 @@
         </p:blipFill>
         <p:spPr bwMode="auto">
           <a:xfrm>
-            <a:off x="5863430" y="1551779"/>
-            <a:ext cx="633932" cy="475449"/>
+            <a:off x="2275200" y="2073600"/>
+            <a:ext cx="3657600" cy="2209800"/>
           </a:xfrm>
           <a:prstGeom prst="rect">
             <a:avLst/>
           </a:prstGeom>
           <a:noFill/>
+          <a:ln w="3175">
+            <a:solidFill>
+              <a:schemeClr val="bg1">
+                <a:lumMod val="85000"/>
+              </a:schemeClr>
+            </a:solidFill>
+            <a:miter lim="800000"/>
+            <a:headEnd/>
+            <a:tailEnd/>
+          </a:ln>
+          <a:effectLst>
+            <a:outerShdw blurRad="50800" dist="38100" dir="2700000" algn="tl" rotWithShape="0">
+              <a:prstClr val="black">
+                <a:alpha val="40000"/>
+              </a:prstClr>
+            </a:outerShdw>
+          </a:effectLst>
         </p:spPr>
       </p:pic>
       <p:sp>
         <p:nvSpPr>
-          <p:cNvPr id="26" name="TextBox 25"/>
-          <p:cNvSpPr txBox="1"/>
-          <p:nvPr/>
-        </p:nvSpPr>
-        <p:spPr>
-          <a:xfrm>
-            <a:off x="1693081" y="4357689"/>
-            <a:ext cx="1952779" cy="246221"/>
-          </a:xfrm>
-          <a:prstGeom prst="rect">
-            <a:avLst/>
-          </a:prstGeom>
-          <a:noFill/>
-        </p:spPr>
-        <p:txBody>
-          <a:bodyPr wrap="none" rtlCol="0">
-            <a:spAutoFit/>
-          </a:bodyPr>
-          <a:lstStyle/>
-          <a:p>
-            <a:r>
-              <a:rPr lang="en-US" sz="1000" dirty="0" smtClean="0">
-                <a:hlinkClick r:id="rId3"/>
-              </a:rPr>
-              <a:t>Click here to download SearchGUI</a:t>
-            </a:r>
-            <a:endParaRPr lang="en-US" sz="1000" dirty="0"/>
+          <p:cNvPr id="22" name="Freeform 21"/>
+          <p:cNvSpPr/>
+          <p:nvPr/>
+        </p:nvSpPr>
+        <p:spPr>
+          <a:xfrm>
+            <a:off x="2288380" y="2178051"/>
+            <a:ext cx="1086644" cy="1345405"/>
+          </a:xfrm>
+          <a:custGeom>
+            <a:avLst/>
+            <a:gdLst>
+              <a:gd name="connsiteX0" fmla="*/ 0 w 966788"/>
+              <a:gd name="connsiteY0" fmla="*/ 0 h 1012031"/>
+              <a:gd name="connsiteX1" fmla="*/ 119063 w 966788"/>
+              <a:gd name="connsiteY1" fmla="*/ 1012031 h 1012031"/>
+              <a:gd name="connsiteX2" fmla="*/ 966788 w 966788"/>
+              <a:gd name="connsiteY2" fmla="*/ 285750 h 1012031"/>
+              <a:gd name="connsiteX3" fmla="*/ 88107 w 966788"/>
+              <a:gd name="connsiteY3" fmla="*/ 0 h 1012031"/>
+              <a:gd name="connsiteX4" fmla="*/ 0 w 966788"/>
+              <a:gd name="connsiteY4" fmla="*/ 0 h 1012031"/>
+              <a:gd name="connsiteX0" fmla="*/ 0 w 919163"/>
+              <a:gd name="connsiteY0" fmla="*/ 0 h 1012031"/>
+              <a:gd name="connsiteX1" fmla="*/ 119063 w 919163"/>
+              <a:gd name="connsiteY1" fmla="*/ 1012031 h 1012031"/>
+              <a:gd name="connsiteX2" fmla="*/ 919163 w 919163"/>
+              <a:gd name="connsiteY2" fmla="*/ 328613 h 1012031"/>
+              <a:gd name="connsiteX3" fmla="*/ 88107 w 919163"/>
+              <a:gd name="connsiteY3" fmla="*/ 0 h 1012031"/>
+              <a:gd name="connsiteX4" fmla="*/ 0 w 919163"/>
+              <a:gd name="connsiteY4" fmla="*/ 0 h 1012031"/>
+              <a:gd name="connsiteX0" fmla="*/ 0 w 893763"/>
+              <a:gd name="connsiteY0" fmla="*/ 0 h 1012031"/>
+              <a:gd name="connsiteX1" fmla="*/ 119063 w 893763"/>
+              <a:gd name="connsiteY1" fmla="*/ 1012031 h 1012031"/>
+              <a:gd name="connsiteX2" fmla="*/ 893763 w 893763"/>
+              <a:gd name="connsiteY2" fmla="*/ 366713 h 1012031"/>
+              <a:gd name="connsiteX3" fmla="*/ 88107 w 893763"/>
+              <a:gd name="connsiteY3" fmla="*/ 0 h 1012031"/>
+              <a:gd name="connsiteX4" fmla="*/ 0 w 893763"/>
+              <a:gd name="connsiteY4" fmla="*/ 0 h 1012031"/>
+              <a:gd name="connsiteX0" fmla="*/ 0 w 1050925"/>
+              <a:gd name="connsiteY0" fmla="*/ 0 h 1012031"/>
+              <a:gd name="connsiteX1" fmla="*/ 119063 w 1050925"/>
+              <a:gd name="connsiteY1" fmla="*/ 1012031 h 1012031"/>
+              <a:gd name="connsiteX2" fmla="*/ 1050925 w 1050925"/>
+              <a:gd name="connsiteY2" fmla="*/ 226220 h 1012031"/>
+              <a:gd name="connsiteX3" fmla="*/ 88107 w 1050925"/>
+              <a:gd name="connsiteY3" fmla="*/ 0 h 1012031"/>
+              <a:gd name="connsiteX4" fmla="*/ 0 w 1050925"/>
+              <a:gd name="connsiteY4" fmla="*/ 0 h 1012031"/>
+              <a:gd name="connsiteX0" fmla="*/ 0 w 1050925"/>
+              <a:gd name="connsiteY0" fmla="*/ 0 h 1343024"/>
+              <a:gd name="connsiteX1" fmla="*/ 40482 w 1050925"/>
+              <a:gd name="connsiteY1" fmla="*/ 1343024 h 1343024"/>
+              <a:gd name="connsiteX2" fmla="*/ 1050925 w 1050925"/>
+              <a:gd name="connsiteY2" fmla="*/ 226220 h 1343024"/>
+              <a:gd name="connsiteX3" fmla="*/ 88107 w 1050925"/>
+              <a:gd name="connsiteY3" fmla="*/ 0 h 1343024"/>
+              <a:gd name="connsiteX4" fmla="*/ 0 w 1050925"/>
+              <a:gd name="connsiteY4" fmla="*/ 0 h 1343024"/>
+              <a:gd name="connsiteX0" fmla="*/ 0 w 1096169"/>
+              <a:gd name="connsiteY0" fmla="*/ 0 h 1343024"/>
+              <a:gd name="connsiteX1" fmla="*/ 40482 w 1096169"/>
+              <a:gd name="connsiteY1" fmla="*/ 1343024 h 1343024"/>
+              <a:gd name="connsiteX2" fmla="*/ 1096169 w 1096169"/>
+              <a:gd name="connsiteY2" fmla="*/ 219076 h 1343024"/>
+              <a:gd name="connsiteX3" fmla="*/ 88107 w 1096169"/>
+              <a:gd name="connsiteY3" fmla="*/ 0 h 1343024"/>
+              <a:gd name="connsiteX4" fmla="*/ 0 w 1096169"/>
+              <a:gd name="connsiteY4" fmla="*/ 0 h 1343024"/>
+              <a:gd name="connsiteX0" fmla="*/ 0 w 1096169"/>
+              <a:gd name="connsiteY0" fmla="*/ 0 h 1350167"/>
+              <a:gd name="connsiteX1" fmla="*/ 50007 w 1096169"/>
+              <a:gd name="connsiteY1" fmla="*/ 1350167 h 1350167"/>
+              <a:gd name="connsiteX2" fmla="*/ 1096169 w 1096169"/>
+              <a:gd name="connsiteY2" fmla="*/ 219076 h 1350167"/>
+              <a:gd name="connsiteX3" fmla="*/ 88107 w 1096169"/>
+              <a:gd name="connsiteY3" fmla="*/ 0 h 1350167"/>
+              <a:gd name="connsiteX4" fmla="*/ 0 w 1096169"/>
+              <a:gd name="connsiteY4" fmla="*/ 0 h 1350167"/>
+              <a:gd name="connsiteX0" fmla="*/ 0 w 1096169"/>
+              <a:gd name="connsiteY0" fmla="*/ 0 h 1345405"/>
+              <a:gd name="connsiteX1" fmla="*/ 64294 w 1096169"/>
+              <a:gd name="connsiteY1" fmla="*/ 1345405 h 1345405"/>
+              <a:gd name="connsiteX2" fmla="*/ 1096169 w 1096169"/>
+              <a:gd name="connsiteY2" fmla="*/ 219076 h 1345405"/>
+              <a:gd name="connsiteX3" fmla="*/ 88107 w 1096169"/>
+              <a:gd name="connsiteY3" fmla="*/ 0 h 1345405"/>
+              <a:gd name="connsiteX4" fmla="*/ 0 w 1096169"/>
+              <a:gd name="connsiteY4" fmla="*/ 0 h 1345405"/>
+              <a:gd name="connsiteX0" fmla="*/ 0 w 1096169"/>
+              <a:gd name="connsiteY0" fmla="*/ 0 h 1345405"/>
+              <a:gd name="connsiteX1" fmla="*/ 64294 w 1096169"/>
+              <a:gd name="connsiteY1" fmla="*/ 1345405 h 1345405"/>
+              <a:gd name="connsiteX2" fmla="*/ 1096169 w 1096169"/>
+              <a:gd name="connsiteY2" fmla="*/ 219076 h 1345405"/>
+              <a:gd name="connsiteX3" fmla="*/ 80963 w 1096169"/>
+              <a:gd name="connsiteY3" fmla="*/ 0 h 1345405"/>
+              <a:gd name="connsiteX4" fmla="*/ 0 w 1096169"/>
+              <a:gd name="connsiteY4" fmla="*/ 0 h 1345405"/>
+              <a:gd name="connsiteX0" fmla="*/ 0 w 1086644"/>
+              <a:gd name="connsiteY0" fmla="*/ 0 h 1345405"/>
+              <a:gd name="connsiteX1" fmla="*/ 64294 w 1086644"/>
+              <a:gd name="connsiteY1" fmla="*/ 1345405 h 1345405"/>
+              <a:gd name="connsiteX2" fmla="*/ 1086644 w 1086644"/>
+              <a:gd name="connsiteY2" fmla="*/ 219076 h 1345405"/>
+              <a:gd name="connsiteX3" fmla="*/ 80963 w 1086644"/>
+              <a:gd name="connsiteY3" fmla="*/ 0 h 1345405"/>
+              <a:gd name="connsiteX4" fmla="*/ 0 w 1086644"/>
+              <a:gd name="connsiteY4" fmla="*/ 0 h 1345405"/>
+            </a:gdLst>
+            <a:ahLst/>
+            <a:cxnLst>
+              <a:cxn ang="0">
+                <a:pos x="connsiteX0" y="connsiteY0"/>
+              </a:cxn>
+              <a:cxn ang="0">
+                <a:pos x="connsiteX1" y="connsiteY1"/>
+              </a:cxn>
+              <a:cxn ang="0">
+                <a:pos x="connsiteX2" y="connsiteY2"/>
+              </a:cxn>
+              <a:cxn ang="0">
+                <a:pos x="connsiteX3" y="connsiteY3"/>
+              </a:cxn>
+              <a:cxn ang="0">
+                <a:pos x="connsiteX4" y="connsiteY4"/>
+              </a:cxn>
+            </a:cxnLst>
+            <a:rect l="l" t="t" r="r" b="b"/>
+            <a:pathLst>
+              <a:path w="1086644" h="1345405">
+                <a:moveTo>
+                  <a:pt x="0" y="0"/>
+                </a:moveTo>
+                <a:lnTo>
+                  <a:pt x="64294" y="1345405"/>
+                </a:lnTo>
+                <a:lnTo>
+                  <a:pt x="1086644" y="219076"/>
+                </a:lnTo>
+                <a:lnTo>
+                  <a:pt x="80963" y="0"/>
+                </a:lnTo>
+                <a:lnTo>
+                  <a:pt x="0" y="0"/>
+                </a:lnTo>
+                <a:close/>
+              </a:path>
+            </a:pathLst>
+          </a:custGeom>
+          <a:solidFill>
+            <a:schemeClr val="accent6">
+              <a:alpha val="75000"/>
+            </a:schemeClr>
+          </a:solidFill>
+          <a:ln w="3175">
+            <a:solidFill>
+              <a:schemeClr val="bg1">
+                <a:lumMod val="65000"/>
+              </a:schemeClr>
+            </a:solidFill>
+          </a:ln>
+        </p:spPr>
+        <p:style>
+          <a:lnRef idx="2">
+            <a:schemeClr val="accent1">
+              <a:shade val="50000"/>
+            </a:schemeClr>
+          </a:lnRef>
+          <a:fillRef idx="1">
+            <a:schemeClr val="accent1"/>
+          </a:fillRef>
+          <a:effectRef idx="0">
+            <a:schemeClr val="accent1"/>
+          </a:effectRef>
+          <a:fontRef idx="minor">
+            <a:schemeClr val="lt1"/>
+          </a:fontRef>
+        </p:style>
+        <p:txBody>
+          <a:bodyPr rtlCol="0" anchor="ctr"/>
+          <a:lstStyle/>
+          <a:p>
+            <a:pPr algn="ctr"/>
+            <a:endParaRPr lang="en-US"/>
           </a:p>
         </p:txBody>
       </p:sp>
       <p:pic>
         <p:nvPicPr>
-          <p:cNvPr id="1026" name="Picture 2"/>
+          <p:cNvPr id="23" name="Picture 3"/>
           <p:cNvPicPr>
             <a:picLocks noChangeAspect="1" noChangeArrowheads="1"/>
           </p:cNvPicPr>
           <p:nvPr/>
         </p:nvPicPr>
         <p:blipFill>
-          <a:blip r:embed="rId4" cstate="print"/>
-          <a:srcRect/>
+          <a:blip r:embed="rId3" cstate="print"/>
+          <a:srcRect l="150" t="1586" r="89108" b="78877"/>
           <a:stretch>
             <a:fillRect/>
           </a:stretch>
         </p:blipFill>
         <p:spPr bwMode="auto">
           <a:xfrm>
-            <a:off x="1592263" y="2028827"/>
-            <a:ext cx="1785461" cy="1257491"/>
+            <a:off x="2355056" y="2398554"/>
+            <a:ext cx="1021557" cy="1122521"/>
           </a:xfrm>
           <a:prstGeom prst="rect">
             <a:avLst/>
@@ -3601,16 +3731,163 @@
           </a:effectLst>
         </p:spPr>
       </p:pic>
+      <p:sp>
+        <p:nvSpPr>
+          <p:cNvPr id="8" name="TextBox 7"/>
+          <p:cNvSpPr txBox="1"/>
+          <p:nvPr/>
+        </p:nvSpPr>
+        <p:spPr>
+          <a:xfrm>
+            <a:off x="1475656" y="1556792"/>
+            <a:ext cx="2984600" cy="338554"/>
+          </a:xfrm>
+          <a:prstGeom prst="rect">
+            <a:avLst/>
+          </a:prstGeom>
+          <a:solidFill>
+            <a:schemeClr val="accent6"/>
+          </a:solidFill>
+          <a:ln>
+            <a:noFill/>
+          </a:ln>
+          <a:effectLst>
+            <a:outerShdw blurRad="50800" dist="38100" dir="2700000" algn="tl" rotWithShape="0">
+              <a:prstClr val="black">
+                <a:alpha val="40000"/>
+              </a:prstClr>
+            </a:outerShdw>
+          </a:effectLst>
+        </p:spPr>
+        <p:txBody>
+          <a:bodyPr wrap="none" rtlCol="0">
+            <a:spAutoFit/>
+          </a:bodyPr>
+          <a:lstStyle/>
+          <a:p>
+            <a:r>
+              <a:rPr lang="en-US" sz="1600" b="1" dirty="0" smtClean="0">
+                <a:solidFill>
+                  <a:schemeClr val="bg1"/>
+                </a:solidFill>
+              </a:rPr>
+              <a:t>Straightforward export to PRIDE!</a:t>
+            </a:r>
+            <a:endParaRPr lang="en-US" sz="1600" b="1" dirty="0">
+              <a:solidFill>
+                <a:schemeClr val="bg1"/>
+              </a:solidFill>
+            </a:endParaRPr>
+          </a:p>
+        </p:txBody>
+      </p:sp>
+      <p:grpSp>
+        <p:nvGrpSpPr>
+          <p:cNvPr id="25" name="Group 24"/>
+          <p:cNvGrpSpPr>
+            <a:grpSpLocks noChangeAspect="1"/>
+          </p:cNvGrpSpPr>
+          <p:nvPr/>
+        </p:nvGrpSpPr>
+        <p:grpSpPr>
+          <a:xfrm>
+            <a:off x="5867400" y="1496607"/>
+            <a:ext cx="742854" cy="524099"/>
+            <a:chOff x="5057775" y="2350294"/>
+            <a:chExt cx="3493294" cy="2464594"/>
+          </a:xfrm>
+          <a:effectLst/>
+        </p:grpSpPr>
+        <p:sp>
+          <p:nvSpPr>
+            <p:cNvPr id="26" name="Rectangle 25"/>
+            <p:cNvSpPr/>
+            <p:nvPr/>
+          </p:nvSpPr>
+          <p:spPr>
+            <a:xfrm>
+              <a:off x="5057775" y="2350294"/>
+              <a:ext cx="3493294" cy="2464594"/>
+            </a:xfrm>
+            <a:prstGeom prst="rect">
+              <a:avLst/>
+            </a:prstGeom>
+            <a:solidFill>
+              <a:schemeClr val="bg1"/>
+            </a:solidFill>
+            <a:ln w="3175" cmpd="sng">
+              <a:noFill/>
+            </a:ln>
+          </p:spPr>
+          <p:style>
+            <a:lnRef idx="2">
+              <a:schemeClr val="accent1">
+                <a:shade val="50000"/>
+              </a:schemeClr>
+            </a:lnRef>
+            <a:fillRef idx="1">
+              <a:schemeClr val="accent1"/>
+            </a:fillRef>
+            <a:effectRef idx="0">
+              <a:schemeClr val="accent1"/>
+            </a:effectRef>
+            <a:fontRef idx="minor">
+              <a:schemeClr val="lt1"/>
+            </a:fontRef>
+          </p:style>
+          <p:txBody>
+            <a:bodyPr rtlCol="0" anchor="ctr"/>
+            <a:lstStyle/>
+            <a:p>
+              <a:pPr algn="ctr"/>
+              <a:endParaRPr lang="en-US"/>
+            </a:p>
+          </p:txBody>
+        </p:sp>
+        <p:pic>
+          <p:nvPicPr>
+            <p:cNvPr id="27" name="Picture 4" descr="http://www.ebi.ac.uk/pride/images/pride_logo.jpg">
+              <a:hlinkClick r:id="rId4"/>
+            </p:cNvPr>
+            <p:cNvPicPr>
+              <a:picLocks noChangeAspect="1" noChangeArrowheads="1"/>
+            </p:cNvPicPr>
+            <p:nvPr/>
+          </p:nvPicPr>
+          <p:blipFill>
+            <a:blip r:embed="rId5" cstate="print"/>
+            <a:srcRect/>
+            <a:stretch>
+              <a:fillRect/>
+            </a:stretch>
+          </p:blipFill>
+          <p:spPr bwMode="auto">
+            <a:xfrm>
+              <a:off x="5336078" y="2571264"/>
+              <a:ext cx="2882046" cy="1921364"/>
+            </a:xfrm>
+            <a:prstGeom prst="rect">
+              <a:avLst/>
+            </a:prstGeom>
+            <a:noFill/>
+            <a:ln w="3175" cmpd="sng">
+              <a:noFill/>
+              <a:prstDash val="solid"/>
+            </a:ln>
+            <a:effectLst/>
+          </p:spPr>
+        </p:pic>
+      </p:grpSp>
       <p:pic>
         <p:nvPicPr>
-          <p:cNvPr id="1027" name="Picture 3"/>
+          <p:cNvPr id="2050" name="Picture 2"/>
           <p:cNvPicPr>
             <a:picLocks noChangeAspect="1" noChangeArrowheads="1"/>
           </p:cNvPicPr>
           <p:nvPr/>
         </p:nvPicPr>
         <p:blipFill>
-          <a:blip r:embed="rId5" cstate="print"/>
+          <a:blip r:embed="rId6" cstate="print"/>
           <a:srcRect/>
           <a:stretch>
             <a:fillRect/>
@@ -3618,8 +3895,8 @@
         </p:blipFill>
         <p:spPr bwMode="auto">
           <a:xfrm>
-            <a:off x="2946400" y="2374900"/>
-            <a:ext cx="1875282" cy="1627727"/>
+            <a:off x="4312063" y="2740189"/>
+            <a:ext cx="1785526" cy="1176968"/>
           </a:xfrm>
           <a:prstGeom prst="rect">
             <a:avLst/>
@@ -3642,16 +3919,16 @@
       </p:pic>
       <p:sp>
         <p:nvSpPr>
-          <p:cNvPr id="17" name="Left Arrow 16"/>
+          <p:cNvPr id="17" name="Right Arrow 16"/>
           <p:cNvSpPr/>
           <p:nvPr/>
         </p:nvSpPr>
         <p:spPr>
           <a:xfrm>
-            <a:off x="3291917" y="2005809"/>
-            <a:ext cx="2670733" cy="486000"/>
-          </a:xfrm>
-          <a:prstGeom prst="leftArrow">
+            <a:off x="3113877" y="2863852"/>
+            <a:ext cx="1281114" cy="889200"/>
+          </a:xfrm>
+          <a:prstGeom prst="rightArrow">
             <a:avLst/>
           </a:prstGeom>
           <a:solidFill>
@@ -3690,187 +3967,10 @@
           <a:p>
             <a:pPr algn="ctr"/>
             <a:r>
-              <a:rPr lang="en-US" sz="1400" dirty="0" smtClean="0">
-                <a:solidFill>
-                  <a:schemeClr val="bg1"/>
-                </a:solidFill>
-              </a:rPr>
-              <a:t>Search OMSSA and X!Tandem …</a:t>
-            </a:r>
-            <a:endParaRPr lang="en-US" sz="1400" dirty="0">
-              <a:solidFill>
-                <a:schemeClr val="bg1"/>
-              </a:solidFill>
-            </a:endParaRPr>
-          </a:p>
-        </p:txBody>
-      </p:sp>
-      <p:pic>
-        <p:nvPicPr>
-          <p:cNvPr id="1028" name="Picture 4"/>
-          <p:cNvPicPr>
-            <a:picLocks noChangeAspect="1" noChangeArrowheads="1"/>
-          </p:cNvPicPr>
-          <p:nvPr/>
-        </p:nvPicPr>
-        <p:blipFill>
-          <a:blip r:embed="rId6" cstate="print"/>
-          <a:srcRect/>
-          <a:stretch>
-            <a:fillRect/>
-          </a:stretch>
-        </p:blipFill>
-        <p:spPr bwMode="auto">
-          <a:xfrm>
-            <a:off x="4454526" y="2984500"/>
-            <a:ext cx="1993583" cy="1419606"/>
-          </a:xfrm>
-          <a:prstGeom prst="rect">
-            <a:avLst/>
-          </a:prstGeom>
-          <a:noFill/>
-          <a:ln w="9525">
-            <a:noFill/>
-            <a:miter lim="800000"/>
-            <a:headEnd/>
-            <a:tailEnd/>
-          </a:ln>
-          <a:effectLst>
-            <a:outerShdw blurRad="50800" dist="38100" dir="2700000" algn="tl" rotWithShape="0">
-              <a:prstClr val="black">
-                <a:alpha val="40000"/>
-              </a:prstClr>
-            </a:outerShdw>
-          </a:effectLst>
-        </p:spPr>
-      </p:pic>
-      <p:sp>
-        <p:nvSpPr>
-          <p:cNvPr id="24" name="Right Arrow 23"/>
-          <p:cNvSpPr/>
-          <p:nvPr/>
-        </p:nvSpPr>
-        <p:spPr>
-          <a:xfrm>
-            <a:off x="1714499" y="3920504"/>
-            <a:ext cx="3133725" cy="486000"/>
-          </a:xfrm>
-          <a:prstGeom prst="rightArrow">
-            <a:avLst/>
-          </a:prstGeom>
-          <a:solidFill>
-            <a:schemeClr val="accent6"/>
-          </a:solidFill>
-          <a:ln>
-            <a:noFill/>
-          </a:ln>
-          <a:effectLst>
-            <a:outerShdw blurRad="50800" dist="38100" dir="2700000" algn="tl" rotWithShape="0">
-              <a:prstClr val="black">
-                <a:alpha val="40000"/>
-              </a:prstClr>
-            </a:outerShdw>
-          </a:effectLst>
-        </p:spPr>
-        <p:style>
-          <a:lnRef idx="2">
-            <a:schemeClr val="accent1">
-              <a:shade val="50000"/>
-            </a:schemeClr>
-          </a:lnRef>
-          <a:fillRef idx="1">
-            <a:schemeClr val="accent1"/>
-          </a:fillRef>
-          <a:effectRef idx="0">
-            <a:schemeClr val="accent1"/>
-          </a:effectRef>
-          <a:fontRef idx="minor">
-            <a:schemeClr val="lt1"/>
-          </a:fontRef>
-        </p:style>
-        <p:txBody>
-          <a:bodyPr rtlCol="0" anchor="ctr"/>
-          <a:lstStyle/>
-          <a:p>
-            <a:pPr algn="ctr"/>
-            <a:r>
-              <a:rPr lang="en-US" sz="1400" dirty="0" smtClean="0">
-                <a:solidFill>
-                  <a:schemeClr val="bg1"/>
-                </a:solidFill>
-              </a:rPr>
-              <a:t>… in a simple graphical user interface.</a:t>
-            </a:r>
-            <a:endParaRPr lang="en-US" sz="1400" dirty="0">
-              <a:solidFill>
-                <a:schemeClr val="bg1"/>
-              </a:solidFill>
-            </a:endParaRPr>
-          </a:p>
-        </p:txBody>
-      </p:sp>
-      <p:sp>
-        <p:nvSpPr>
-          <p:cNvPr id="23" name="Left Arrow 22"/>
-          <p:cNvSpPr/>
-          <p:nvPr/>
-        </p:nvSpPr>
-        <p:spPr>
-          <a:xfrm>
-            <a:off x="4251322" y="2523333"/>
-            <a:ext cx="2333626" cy="486000"/>
-          </a:xfrm>
-          <a:prstGeom prst="leftArrow">
-            <a:avLst/>
-          </a:prstGeom>
-          <a:solidFill>
-            <a:schemeClr val="accent6"/>
-          </a:solidFill>
-          <a:ln>
-            <a:noFill/>
-          </a:ln>
-          <a:effectLst>
-            <a:outerShdw blurRad="50800" dist="38100" dir="2700000" algn="tl" rotWithShape="0">
-              <a:prstClr val="black">
-                <a:alpha val="40000"/>
-              </a:prstClr>
-            </a:outerShdw>
-          </a:effectLst>
-        </p:spPr>
-        <p:style>
-          <a:lnRef idx="2">
-            <a:schemeClr val="accent1">
-              <a:shade val="50000"/>
-            </a:schemeClr>
-          </a:lnRef>
-          <a:fillRef idx="1">
-            <a:schemeClr val="accent1"/>
-          </a:fillRef>
-          <a:effectRef idx="0">
-            <a:schemeClr val="accent1"/>
-          </a:effectRef>
-          <a:fontRef idx="minor">
-            <a:schemeClr val="lt1"/>
-          </a:fontRef>
-        </p:style>
-        <p:txBody>
-          <a:bodyPr rtlCol="0" anchor="ctr"/>
-          <a:lstStyle/>
-          <a:p>
-            <a:pPr algn="ctr"/>
-            <a:r>
-              <a:rPr lang="en-US" sz="1400" dirty="0" smtClean="0">
-                <a:solidFill>
-                  <a:schemeClr val="bg1"/>
-                </a:solidFill>
-              </a:rPr>
-              <a:t>… with the same settings …</a:t>
-            </a:r>
-            <a:endParaRPr lang="en-US" sz="1400" dirty="0">
-              <a:solidFill>
-                <a:schemeClr val="bg1"/>
-              </a:solidFill>
-            </a:endParaRPr>
+              <a:rPr lang="en-US" sz="1400" dirty="0" smtClean="0"/>
+              <a:t>PRIDE Export</a:t>
+            </a:r>
+            <a:endParaRPr lang="en-US" sz="1400" dirty="0"/>
           </a:p>
         </p:txBody>
       </p:sp>
@@ -3908,6 +4008,509 @@
       </p:grpSpPr>
       <p:sp>
         <p:nvSpPr>
+          <p:cNvPr id="24" name="Rectangle 23"/>
+          <p:cNvSpPr/>
+          <p:nvPr/>
+        </p:nvSpPr>
+        <p:spPr>
+          <a:xfrm>
+            <a:off x="323528" y="692696"/>
+            <a:ext cx="7848872" cy="5184576"/>
+          </a:xfrm>
+          <a:prstGeom prst="rect">
+            <a:avLst/>
+          </a:prstGeom>
+        </p:spPr>
+        <p:style>
+          <a:lnRef idx="2">
+            <a:schemeClr val="accent1">
+              <a:shade val="50000"/>
+            </a:schemeClr>
+          </a:lnRef>
+          <a:fillRef idx="1">
+            <a:schemeClr val="accent1"/>
+          </a:fillRef>
+          <a:effectRef idx="0">
+            <a:schemeClr val="accent1"/>
+          </a:effectRef>
+          <a:fontRef idx="minor">
+            <a:schemeClr val="lt1"/>
+          </a:fontRef>
+        </p:style>
+        <p:txBody>
+          <a:bodyPr rtlCol="0" anchor="ctr"/>
+          <a:lstStyle/>
+          <a:p>
+            <a:pPr algn="ctr"/>
+            <a:endParaRPr lang="en-US"/>
+          </a:p>
+        </p:txBody>
+      </p:sp>
+      <p:sp>
+        <p:nvSpPr>
+          <p:cNvPr id="28" name="Rectangle 27"/>
+          <p:cNvSpPr/>
+          <p:nvPr/>
+        </p:nvSpPr>
+        <p:spPr>
+          <a:xfrm>
+            <a:off x="1403648" y="1412776"/>
+            <a:ext cx="5271472" cy="3182084"/>
+          </a:xfrm>
+          <a:prstGeom prst="rect">
+            <a:avLst/>
+          </a:prstGeom>
+          <a:solidFill>
+            <a:schemeClr val="bg1"/>
+          </a:solidFill>
+          <a:ln w="6350">
+            <a:noFill/>
+          </a:ln>
+        </p:spPr>
+        <p:style>
+          <a:lnRef idx="2">
+            <a:schemeClr val="accent1">
+              <a:shade val="50000"/>
+            </a:schemeClr>
+          </a:lnRef>
+          <a:fillRef idx="1">
+            <a:schemeClr val="accent1"/>
+          </a:fillRef>
+          <a:effectRef idx="0">
+            <a:schemeClr val="accent1"/>
+          </a:effectRef>
+          <a:fontRef idx="minor">
+            <a:schemeClr val="lt1"/>
+          </a:fontRef>
+        </p:style>
+        <p:txBody>
+          <a:bodyPr rtlCol="0" anchor="ctr"/>
+          <a:lstStyle/>
+          <a:p>
+            <a:pPr algn="ctr"/>
+            <a:r>
+              <a:rPr lang="en-US" dirty="0" smtClean="0"/>
+              <a:t>PeptideShaker Overview</a:t>
+            </a:r>
+          </a:p>
+        </p:txBody>
+      </p:sp>
+      <p:sp>
+        <p:nvSpPr>
+          <p:cNvPr id="8" name="TextBox 7"/>
+          <p:cNvSpPr txBox="1"/>
+          <p:nvPr/>
+        </p:nvSpPr>
+        <p:spPr>
+          <a:xfrm>
+            <a:off x="1475656" y="1556792"/>
+            <a:ext cx="3286028" cy="338554"/>
+          </a:xfrm>
+          <a:prstGeom prst="rect">
+            <a:avLst/>
+          </a:prstGeom>
+          <a:solidFill>
+            <a:schemeClr val="accent6"/>
+          </a:solidFill>
+          <a:ln>
+            <a:noFill/>
+          </a:ln>
+          <a:effectLst>
+            <a:outerShdw blurRad="50800" dist="38100" dir="2700000" algn="tl" rotWithShape="0">
+              <a:prstClr val="black">
+                <a:alpha val="40000"/>
+              </a:prstClr>
+            </a:outerShdw>
+          </a:effectLst>
+        </p:spPr>
+        <p:txBody>
+          <a:bodyPr wrap="none" rtlCol="0">
+            <a:spAutoFit/>
+          </a:bodyPr>
+          <a:lstStyle/>
+          <a:p>
+            <a:r>
+              <a:rPr lang="en-US" sz="1600" b="1" dirty="0" smtClean="0">
+                <a:solidFill>
+                  <a:schemeClr val="bg1"/>
+                </a:solidFill>
+              </a:rPr>
+              <a:t>Easy reanalysis of public PRIDE data!</a:t>
+            </a:r>
+            <a:endParaRPr lang="en-US" sz="1600" b="1" dirty="0">
+              <a:solidFill>
+                <a:schemeClr val="bg1"/>
+              </a:solidFill>
+            </a:endParaRPr>
+          </a:p>
+        </p:txBody>
+      </p:sp>
+      <p:grpSp>
+        <p:nvGrpSpPr>
+          <p:cNvPr id="2" name="Group 24"/>
+          <p:cNvGrpSpPr>
+            <a:grpSpLocks noChangeAspect="1"/>
+          </p:cNvGrpSpPr>
+          <p:nvPr/>
+        </p:nvGrpSpPr>
+        <p:grpSpPr>
+          <a:xfrm>
+            <a:off x="5867400" y="1496607"/>
+            <a:ext cx="742854" cy="524099"/>
+            <a:chOff x="5057775" y="2350294"/>
+            <a:chExt cx="3493294" cy="2464594"/>
+          </a:xfrm>
+          <a:effectLst/>
+        </p:grpSpPr>
+        <p:sp>
+          <p:nvSpPr>
+            <p:cNvPr id="26" name="Rectangle 25"/>
+            <p:cNvSpPr/>
+            <p:nvPr/>
+          </p:nvSpPr>
+          <p:spPr>
+            <a:xfrm>
+              <a:off x="5057775" y="2350294"/>
+              <a:ext cx="3493294" cy="2464594"/>
+            </a:xfrm>
+            <a:prstGeom prst="rect">
+              <a:avLst/>
+            </a:prstGeom>
+            <a:solidFill>
+              <a:schemeClr val="bg1"/>
+            </a:solidFill>
+            <a:ln w="3175" cmpd="sng">
+              <a:noFill/>
+            </a:ln>
+          </p:spPr>
+          <p:style>
+            <a:lnRef idx="2">
+              <a:schemeClr val="accent1">
+                <a:shade val="50000"/>
+              </a:schemeClr>
+            </a:lnRef>
+            <a:fillRef idx="1">
+              <a:schemeClr val="accent1"/>
+            </a:fillRef>
+            <a:effectRef idx="0">
+              <a:schemeClr val="accent1"/>
+            </a:effectRef>
+            <a:fontRef idx="minor">
+              <a:schemeClr val="lt1"/>
+            </a:fontRef>
+          </p:style>
+          <p:txBody>
+            <a:bodyPr rtlCol="0" anchor="ctr"/>
+            <a:lstStyle/>
+            <a:p>
+              <a:pPr algn="ctr"/>
+              <a:endParaRPr lang="en-US"/>
+            </a:p>
+          </p:txBody>
+        </p:sp>
+        <p:pic>
+          <p:nvPicPr>
+            <p:cNvPr id="27" name="Picture 4" descr="http://www.ebi.ac.uk/pride/images/pride_logo.jpg">
+              <a:hlinkClick r:id="rId2"/>
+            </p:cNvPr>
+            <p:cNvPicPr>
+              <a:picLocks noChangeAspect="1" noChangeArrowheads="1"/>
+            </p:cNvPicPr>
+            <p:nvPr/>
+          </p:nvPicPr>
+          <p:blipFill>
+            <a:blip r:embed="rId3" cstate="print"/>
+            <a:srcRect/>
+            <a:stretch>
+              <a:fillRect/>
+            </a:stretch>
+          </p:blipFill>
+          <p:spPr bwMode="auto">
+            <a:xfrm>
+              <a:off x="5336078" y="2571264"/>
+              <a:ext cx="2882046" cy="1921364"/>
+            </a:xfrm>
+            <a:prstGeom prst="rect">
+              <a:avLst/>
+            </a:prstGeom>
+            <a:noFill/>
+            <a:ln w="3175" cmpd="sng">
+              <a:noFill/>
+              <a:prstDash val="solid"/>
+            </a:ln>
+            <a:effectLst/>
+          </p:spPr>
+        </p:pic>
+      </p:grpSp>
+      <p:pic>
+        <p:nvPicPr>
+          <p:cNvPr id="1029" name="Picture 5"/>
+          <p:cNvPicPr>
+            <a:picLocks noChangeAspect="1" noChangeArrowheads="1"/>
+          </p:cNvPicPr>
+          <p:nvPr/>
+        </p:nvPicPr>
+        <p:blipFill>
+          <a:blip r:embed="rId4" cstate="print"/>
+          <a:srcRect/>
+          <a:stretch>
+            <a:fillRect/>
+          </a:stretch>
+        </p:blipFill>
+        <p:spPr bwMode="auto">
+          <a:xfrm>
+            <a:off x="2257420" y="2045434"/>
+            <a:ext cx="3531428" cy="2313127"/>
+          </a:xfrm>
+          <a:prstGeom prst="rect">
+            <a:avLst/>
+          </a:prstGeom>
+          <a:noFill/>
+          <a:ln w="9525">
+            <a:noFill/>
+            <a:miter lim="800000"/>
+            <a:headEnd/>
+            <a:tailEnd/>
+          </a:ln>
+        </p:spPr>
+      </p:pic>
+      <p:sp>
+        <p:nvSpPr>
+          <p:cNvPr id="25" name="Left Arrow 24"/>
+          <p:cNvSpPr/>
+          <p:nvPr/>
+        </p:nvSpPr>
+        <p:spPr>
+          <a:xfrm>
+            <a:off x="4014788" y="2641603"/>
+            <a:ext cx="2550318" cy="486000"/>
+          </a:xfrm>
+          <a:prstGeom prst="leftArrow">
+            <a:avLst/>
+          </a:prstGeom>
+          <a:solidFill>
+            <a:schemeClr val="accent6"/>
+          </a:solidFill>
+          <a:ln>
+            <a:noFill/>
+          </a:ln>
+          <a:effectLst>
+            <a:outerShdw blurRad="50800" dist="38100" dir="2700000" algn="tl" rotWithShape="0">
+              <a:prstClr val="black">
+                <a:alpha val="40000"/>
+              </a:prstClr>
+            </a:outerShdw>
+          </a:effectLst>
+        </p:spPr>
+        <p:style>
+          <a:lnRef idx="2">
+            <a:schemeClr val="accent1">
+              <a:shade val="50000"/>
+            </a:schemeClr>
+          </a:lnRef>
+          <a:fillRef idx="1">
+            <a:schemeClr val="accent1"/>
+          </a:fillRef>
+          <a:effectRef idx="0">
+            <a:schemeClr val="accent1"/>
+          </a:effectRef>
+          <a:fontRef idx="minor">
+            <a:schemeClr val="lt1"/>
+          </a:fontRef>
+        </p:style>
+        <p:txBody>
+          <a:bodyPr rtlCol="0" anchor="ctr"/>
+          <a:lstStyle/>
+          <a:p>
+            <a:pPr algn="ctr"/>
+            <a:r>
+              <a:rPr lang="en-US" sz="1400" dirty="0" smtClean="0">
+                <a:solidFill>
+                  <a:schemeClr val="bg1"/>
+                </a:solidFill>
+              </a:rPr>
+              <a:t>Find the wanted project …</a:t>
+            </a:r>
+            <a:endParaRPr lang="en-US" sz="1400" dirty="0">
+              <a:solidFill>
+                <a:schemeClr val="bg1"/>
+              </a:solidFill>
+            </a:endParaRPr>
+          </a:p>
+        </p:txBody>
+      </p:sp>
+      <p:sp>
+        <p:nvSpPr>
+          <p:cNvPr id="29" name="Right Arrow 28"/>
+          <p:cNvSpPr/>
+          <p:nvPr/>
+        </p:nvSpPr>
+        <p:spPr>
+          <a:xfrm>
+            <a:off x="1957388" y="4020512"/>
+            <a:ext cx="3200399" cy="486000"/>
+          </a:xfrm>
+          <a:prstGeom prst="rightArrow">
+            <a:avLst/>
+          </a:prstGeom>
+          <a:solidFill>
+            <a:schemeClr val="accent6"/>
+          </a:solidFill>
+          <a:ln>
+            <a:noFill/>
+          </a:ln>
+          <a:effectLst>
+            <a:outerShdw blurRad="50800" dist="38100" dir="2700000" algn="tl" rotWithShape="0">
+              <a:prstClr val="black">
+                <a:alpha val="40000"/>
+              </a:prstClr>
+            </a:outerShdw>
+          </a:effectLst>
+        </p:spPr>
+        <p:style>
+          <a:lnRef idx="2">
+            <a:schemeClr val="accent1">
+              <a:shade val="50000"/>
+            </a:schemeClr>
+          </a:lnRef>
+          <a:fillRef idx="1">
+            <a:schemeClr val="accent1"/>
+          </a:fillRef>
+          <a:effectRef idx="0">
+            <a:schemeClr val="accent1"/>
+          </a:effectRef>
+          <a:fontRef idx="minor">
+            <a:schemeClr val="lt1"/>
+          </a:fontRef>
+        </p:style>
+        <p:txBody>
+          <a:bodyPr rtlCol="0" anchor="ctr"/>
+          <a:lstStyle/>
+          <a:p>
+            <a:pPr algn="ctr"/>
+            <a:r>
+              <a:rPr lang="en-US" sz="1400" dirty="0" smtClean="0">
+                <a:solidFill>
+                  <a:schemeClr val="bg1"/>
+                </a:solidFill>
+              </a:rPr>
+              <a:t>… and start re-analyzing the data!</a:t>
+            </a:r>
+            <a:endParaRPr lang="en-US" sz="1400" dirty="0">
+              <a:solidFill>
+                <a:schemeClr val="bg1"/>
+              </a:solidFill>
+            </a:endParaRPr>
+          </a:p>
+        </p:txBody>
+      </p:sp>
+      <p:sp>
+        <p:nvSpPr>
+          <p:cNvPr id="30" name="Left Arrow 29"/>
+          <p:cNvSpPr/>
+          <p:nvPr/>
+        </p:nvSpPr>
+        <p:spPr>
+          <a:xfrm>
+            <a:off x="4007645" y="3491711"/>
+            <a:ext cx="2571748" cy="486000"/>
+          </a:xfrm>
+          <a:prstGeom prst="leftArrow">
+            <a:avLst/>
+          </a:prstGeom>
+          <a:solidFill>
+            <a:schemeClr val="accent6"/>
+          </a:solidFill>
+          <a:ln>
+            <a:noFill/>
+          </a:ln>
+          <a:effectLst>
+            <a:outerShdw blurRad="50800" dist="38100" dir="2700000" algn="tl" rotWithShape="0">
+              <a:prstClr val="black">
+                <a:alpha val="40000"/>
+              </a:prstClr>
+            </a:outerShdw>
+          </a:effectLst>
+        </p:spPr>
+        <p:style>
+          <a:lnRef idx="2">
+            <a:schemeClr val="accent1">
+              <a:shade val="50000"/>
+            </a:schemeClr>
+          </a:lnRef>
+          <a:fillRef idx="1">
+            <a:schemeClr val="accent1"/>
+          </a:fillRef>
+          <a:effectRef idx="0">
+            <a:schemeClr val="accent1"/>
+          </a:effectRef>
+          <a:fontRef idx="minor">
+            <a:schemeClr val="lt1"/>
+          </a:fontRef>
+        </p:style>
+        <p:txBody>
+          <a:bodyPr rtlCol="0" anchor="ctr"/>
+          <a:lstStyle/>
+          <a:p>
+            <a:pPr algn="ctr"/>
+            <a:r>
+              <a:rPr lang="en-US" sz="1400" dirty="0" smtClean="0">
+                <a:solidFill>
+                  <a:schemeClr val="bg1"/>
+                </a:solidFill>
+              </a:rPr>
+              <a:t>… inspect </a:t>
+            </a:r>
+            <a:r>
+              <a:rPr lang="en-US" sz="1400" dirty="0" smtClean="0">
+                <a:solidFill>
+                  <a:schemeClr val="bg1"/>
+                </a:solidFill>
+              </a:rPr>
+              <a:t>the project details ….</a:t>
+            </a:r>
+            <a:endParaRPr lang="en-US" sz="1400" dirty="0">
+              <a:solidFill>
+                <a:schemeClr val="bg1"/>
+              </a:solidFill>
+            </a:endParaRPr>
+          </a:p>
+        </p:txBody>
+      </p:sp>
+    </p:spTree>
+  </p:cSld>
+  <p:clrMapOvr>
+    <a:masterClrMapping/>
+  </p:clrMapOvr>
+  <p:timing>
+    <p:tnLst>
+      <p:par>
+        <p:cTn id="1" dur="indefinite" restart="never" nodeType="tmRoot"/>
+      </p:par>
+    </p:tnLst>
+  </p:timing>
+</p:sld>
+</file>
+
+<file path=ppt/slides/slide12.xml><?xml version="1.0" encoding="utf-8"?>
+<p:sld xmlns:a="http://schemas.openxmlformats.org/drawingml/2006/main" xmlns:r="http://schemas.openxmlformats.org/officeDocument/2006/relationships" xmlns:p="http://schemas.openxmlformats.org/presentationml/2006/main">
+  <p:cSld>
+    <p:spTree>
+      <p:nvGrpSpPr>
+        <p:cNvPr id="1" name=""/>
+        <p:cNvGrpSpPr/>
+        <p:nvPr/>
+      </p:nvGrpSpPr>
+      <p:grpSpPr>
+        <a:xfrm>
+          <a:off x="0" y="0"/>
+          <a:ext cx="0" cy="0"/>
+          <a:chOff x="0" y="0"/>
+          <a:chExt cx="0" cy="0"/>
+        </a:xfrm>
+      </p:grpSpPr>
+      <p:sp>
+        <p:nvSpPr>
           <p:cNvPr id="7" name="Rectangle 6"/>
           <p:cNvSpPr/>
           <p:nvPr/>
@@ -4191,7 +4794,7 @@
 </p:sld>
 </file>
 
-<file path=ppt/slides/slide12.xml><?xml version="1.0" encoding="utf-8"?>
+<file path=ppt/slides/slide13.xml><?xml version="1.0" encoding="utf-8"?>
 <p:sld xmlns:a="http://schemas.openxmlformats.org/drawingml/2006/main" xmlns:r="http://schemas.openxmlformats.org/officeDocument/2006/relationships" xmlns:p="http://schemas.openxmlformats.org/presentationml/2006/main">
   <p:cSld>
     <p:spTree>
@@ -4648,49 +5251,6 @@
           </a:p>
         </p:txBody>
       </p:sp>
-      <p:pic>
-        <p:nvPicPr>
-          <p:cNvPr id="11267" name="Picture 3"/>
-          <p:cNvPicPr>
-            <a:picLocks noChangeAspect="1" noChangeArrowheads="1"/>
-          </p:cNvPicPr>
-          <p:nvPr/>
-        </p:nvPicPr>
-        <p:blipFill>
-          <a:blip r:embed="rId2" cstate="print"/>
-          <a:srcRect/>
-          <a:stretch>
-            <a:fillRect/>
-          </a:stretch>
-        </p:blipFill>
-        <p:spPr bwMode="auto">
-          <a:xfrm>
-            <a:off x="2275148" y="2072072"/>
-            <a:ext cx="3657600" cy="2209800"/>
-          </a:xfrm>
-          <a:prstGeom prst="rect">
-            <a:avLst/>
-          </a:prstGeom>
-          <a:noFill/>
-          <a:ln w="3175">
-            <a:solidFill>
-              <a:schemeClr val="bg1">
-                <a:lumMod val="85000"/>
-              </a:schemeClr>
-            </a:solidFill>
-            <a:miter lim="800000"/>
-            <a:headEnd/>
-            <a:tailEnd/>
-          </a:ln>
-          <a:effectLst>
-            <a:outerShdw blurRad="50800" dist="38100" dir="2700000" algn="tl" rotWithShape="0">
-              <a:prstClr val="black">
-                <a:alpha val="40000"/>
-              </a:prstClr>
-            </a:outerShdw>
-          </a:effectLst>
-        </p:spPr>
-      </p:pic>
       <p:sp>
         <p:nvSpPr>
           <p:cNvPr id="8" name="TextBox 7"/>
@@ -4700,7 +5260,7 @@
         <p:spPr>
           <a:xfrm>
             <a:off x="1475656" y="1556792"/>
-            <a:ext cx="4741363" cy="338554"/>
+            <a:ext cx="3623492" cy="338554"/>
           </a:xfrm>
           <a:prstGeom prst="rect">
             <a:avLst/>
@@ -4731,28 +5291,167 @@
                   <a:schemeClr val="bg1"/>
                 </a:solidFill>
               </a:rPr>
-              <a:t>Get an overview of all proteins, peptides and spectra!</a:t>
-            </a:r>
-            <a:endParaRPr lang="en-US" sz="1600" b="1" dirty="0">
-              <a:solidFill>
-                <a:schemeClr val="bg1"/>
-              </a:solidFill>
-            </a:endParaRPr>
-          </a:p>
-        </p:txBody>
-      </p:sp>
-      <p:sp>
-        <p:nvSpPr>
-          <p:cNvPr id="27" name="Right Arrow 26"/>
+              <a:t>Use </a:t>
+            </a:r>
+            <a:r>
+              <a:rPr lang="en-US" sz="1600" b="1" dirty="0">
+                <a:solidFill>
+                  <a:schemeClr val="bg1"/>
+                </a:solidFill>
+              </a:rPr>
+              <a:t>SearchGUI to identify your spectra!</a:t>
+            </a:r>
+          </a:p>
+        </p:txBody>
+      </p:sp>
+      <p:pic>
+        <p:nvPicPr>
+          <p:cNvPr id="18439" name="Picture 7" descr="C:\Users\hba041\My_Applications\peptide-shaker\src\main\resources\icons\searchgui-medium-shadow.png"/>
+          <p:cNvPicPr>
+            <a:picLocks noChangeAspect="1" noChangeArrowheads="1"/>
+          </p:cNvPicPr>
+          <p:nvPr/>
+        </p:nvPicPr>
+        <p:blipFill>
+          <a:blip r:embed="rId2" cstate="print"/>
+          <a:srcRect/>
+          <a:stretch>
+            <a:fillRect/>
+          </a:stretch>
+        </p:blipFill>
+        <p:spPr bwMode="auto">
+          <a:xfrm>
+            <a:off x="5863430" y="1551779"/>
+            <a:ext cx="633932" cy="475449"/>
+          </a:xfrm>
+          <a:prstGeom prst="rect">
+            <a:avLst/>
+          </a:prstGeom>
+          <a:noFill/>
+        </p:spPr>
+      </p:pic>
+      <p:sp>
+        <p:nvSpPr>
+          <p:cNvPr id="26" name="TextBox 25"/>
+          <p:cNvSpPr txBox="1"/>
+          <p:nvPr/>
+        </p:nvSpPr>
+        <p:spPr>
+          <a:xfrm>
+            <a:off x="1693081" y="4357689"/>
+            <a:ext cx="1952779" cy="246221"/>
+          </a:xfrm>
+          <a:prstGeom prst="rect">
+            <a:avLst/>
+          </a:prstGeom>
+          <a:noFill/>
+        </p:spPr>
+        <p:txBody>
+          <a:bodyPr wrap="none" rtlCol="0">
+            <a:spAutoFit/>
+          </a:bodyPr>
+          <a:lstStyle/>
+          <a:p>
+            <a:r>
+              <a:rPr lang="en-US" sz="1000" dirty="0" smtClean="0">
+                <a:hlinkClick r:id="rId3"/>
+              </a:rPr>
+              <a:t>Click here to download SearchGUI</a:t>
+            </a:r>
+            <a:endParaRPr lang="en-US" sz="1000" dirty="0"/>
+          </a:p>
+        </p:txBody>
+      </p:sp>
+      <p:pic>
+        <p:nvPicPr>
+          <p:cNvPr id="1026" name="Picture 2"/>
+          <p:cNvPicPr>
+            <a:picLocks noChangeAspect="1" noChangeArrowheads="1"/>
+          </p:cNvPicPr>
+          <p:nvPr/>
+        </p:nvPicPr>
+        <p:blipFill>
+          <a:blip r:embed="rId4" cstate="print"/>
+          <a:srcRect/>
+          <a:stretch>
+            <a:fillRect/>
+          </a:stretch>
+        </p:blipFill>
+        <p:spPr bwMode="auto">
+          <a:xfrm>
+            <a:off x="1592263" y="2028827"/>
+            <a:ext cx="1785461" cy="1257491"/>
+          </a:xfrm>
+          <a:prstGeom prst="rect">
+            <a:avLst/>
+          </a:prstGeom>
+          <a:noFill/>
+          <a:ln w="9525">
+            <a:noFill/>
+            <a:miter lim="800000"/>
+            <a:headEnd/>
+            <a:tailEnd/>
+          </a:ln>
+          <a:effectLst>
+            <a:outerShdw blurRad="50800" dist="38100" dir="2700000" algn="tl" rotWithShape="0">
+              <a:prstClr val="black">
+                <a:alpha val="40000"/>
+              </a:prstClr>
+            </a:outerShdw>
+          </a:effectLst>
+        </p:spPr>
+      </p:pic>
+      <p:pic>
+        <p:nvPicPr>
+          <p:cNvPr id="1027" name="Picture 3"/>
+          <p:cNvPicPr>
+            <a:picLocks noChangeAspect="1" noChangeArrowheads="1"/>
+          </p:cNvPicPr>
+          <p:nvPr/>
+        </p:nvPicPr>
+        <p:blipFill>
+          <a:blip r:embed="rId5" cstate="print"/>
+          <a:srcRect/>
+          <a:stretch>
+            <a:fillRect/>
+          </a:stretch>
+        </p:blipFill>
+        <p:spPr bwMode="auto">
+          <a:xfrm>
+            <a:off x="2946400" y="2374900"/>
+            <a:ext cx="1875282" cy="1627727"/>
+          </a:xfrm>
+          <a:prstGeom prst="rect">
+            <a:avLst/>
+          </a:prstGeom>
+          <a:noFill/>
+          <a:ln w="9525">
+            <a:noFill/>
+            <a:miter lim="800000"/>
+            <a:headEnd/>
+            <a:tailEnd/>
+          </a:ln>
+          <a:effectLst>
+            <a:outerShdw blurRad="50800" dist="38100" dir="2700000" algn="tl" rotWithShape="0">
+              <a:prstClr val="black">
+                <a:alpha val="40000"/>
+              </a:prstClr>
+            </a:outerShdw>
+          </a:effectLst>
+        </p:spPr>
+      </p:pic>
+      <p:sp>
+        <p:nvSpPr>
+          <p:cNvPr id="17" name="Left Arrow 16"/>
           <p:cNvSpPr/>
           <p:nvPr/>
         </p:nvSpPr>
         <p:spPr>
           <a:xfrm>
-            <a:off x="1475656" y="2320305"/>
-            <a:ext cx="1022400" cy="486000"/>
-          </a:xfrm>
-          <a:prstGeom prst="rightArrow">
+            <a:off x="3291917" y="2005809"/>
+            <a:ext cx="2670733" cy="486000"/>
+          </a:xfrm>
+          <a:prstGeom prst="leftArrow">
             <a:avLst/>
           </a:prstGeom>
           <a:solidFill>
@@ -4796,7 +5495,7 @@
                   <a:schemeClr val="bg1"/>
                 </a:solidFill>
               </a:rPr>
-              <a:t>Proteins</a:t>
+              <a:t>Search OMSSA and X!Tandem …</a:t>
             </a:r>
             <a:endParaRPr lang="en-US" sz="1400" dirty="0">
               <a:solidFill>
@@ -4806,16 +5505,55 @@
           </a:p>
         </p:txBody>
       </p:sp>
-      <p:sp>
-        <p:nvSpPr>
-          <p:cNvPr id="28" name="Right Arrow 27"/>
+      <p:pic>
+        <p:nvPicPr>
+          <p:cNvPr id="1028" name="Picture 4"/>
+          <p:cNvPicPr>
+            <a:picLocks noChangeAspect="1" noChangeArrowheads="1"/>
+          </p:cNvPicPr>
+          <p:nvPr/>
+        </p:nvPicPr>
+        <p:blipFill>
+          <a:blip r:embed="rId6" cstate="print"/>
+          <a:srcRect/>
+          <a:stretch>
+            <a:fillRect/>
+          </a:stretch>
+        </p:blipFill>
+        <p:spPr bwMode="auto">
+          <a:xfrm>
+            <a:off x="4454526" y="2984500"/>
+            <a:ext cx="1993583" cy="1419606"/>
+          </a:xfrm>
+          <a:prstGeom prst="rect">
+            <a:avLst/>
+          </a:prstGeom>
+          <a:noFill/>
+          <a:ln w="9525">
+            <a:noFill/>
+            <a:miter lim="800000"/>
+            <a:headEnd/>
+            <a:tailEnd/>
+          </a:ln>
+          <a:effectLst>
+            <a:outerShdw blurRad="50800" dist="38100" dir="2700000" algn="tl" rotWithShape="0">
+              <a:prstClr val="black">
+                <a:alpha val="40000"/>
+              </a:prstClr>
+            </a:outerShdw>
+          </a:effectLst>
+        </p:spPr>
+      </p:pic>
+      <p:sp>
+        <p:nvSpPr>
+          <p:cNvPr id="24" name="Right Arrow 23"/>
           <p:cNvSpPr/>
           <p:nvPr/>
         </p:nvSpPr>
         <p:spPr>
           <a:xfrm>
-            <a:off x="1475656" y="2968005"/>
-            <a:ext cx="1022400" cy="486000"/>
+            <a:off x="1714499" y="3920504"/>
+            <a:ext cx="3133725" cy="486000"/>
           </a:xfrm>
           <a:prstGeom prst="rightArrow">
             <a:avLst/>
@@ -4861,7 +5599,7 @@
                   <a:schemeClr val="bg1"/>
                 </a:solidFill>
               </a:rPr>
-              <a:t>Peptides</a:t>
+              <a:t>… in a simple graphical user interface.</a:t>
             </a:r>
             <a:endParaRPr lang="en-US" sz="1400" dirty="0">
               <a:solidFill>
@@ -4873,16 +5611,16 @@
       </p:sp>
       <p:sp>
         <p:nvSpPr>
-          <p:cNvPr id="29" name="Right Arrow 28"/>
+          <p:cNvPr id="23" name="Left Arrow 22"/>
           <p:cNvSpPr/>
           <p:nvPr/>
         </p:nvSpPr>
         <p:spPr>
           <a:xfrm>
-            <a:off x="1475656" y="3620468"/>
-            <a:ext cx="1022400" cy="486000"/>
-          </a:xfrm>
-          <a:prstGeom prst="rightArrow">
+            <a:off x="4251322" y="2523333"/>
+            <a:ext cx="2333626" cy="486000"/>
+          </a:xfrm>
+          <a:prstGeom prst="leftArrow">
             <a:avLst/>
           </a:prstGeom>
           <a:solidFill>
@@ -4926,181 +5664,13 @@
                   <a:schemeClr val="bg1"/>
                 </a:solidFill>
               </a:rPr>
-              <a:t>PSMs</a:t>
-            </a:r>
-            <a:r>
-              <a:rPr lang="en-US" sz="1100" dirty="0" smtClean="0">
-                <a:solidFill>
-                  <a:schemeClr val="bg1"/>
-                </a:solidFill>
-              </a:rPr>
-              <a:t>*</a:t>
+              <a:t>… with the same settings …</a:t>
             </a:r>
             <a:endParaRPr lang="en-US" sz="1400" dirty="0">
               <a:solidFill>
                 <a:schemeClr val="bg1"/>
               </a:solidFill>
             </a:endParaRPr>
-          </a:p>
-        </p:txBody>
-      </p:sp>
-      <p:sp>
-        <p:nvSpPr>
-          <p:cNvPr id="33" name="Left Arrow 32"/>
-          <p:cNvSpPr/>
-          <p:nvPr/>
-        </p:nvSpPr>
-        <p:spPr>
-          <a:xfrm>
-            <a:off x="5511244" y="3062288"/>
-            <a:ext cx="1022400" cy="486000"/>
-          </a:xfrm>
-          <a:prstGeom prst="leftArrow">
-            <a:avLst/>
-          </a:prstGeom>
-          <a:solidFill>
-            <a:schemeClr val="accent6"/>
-          </a:solidFill>
-          <a:ln>
-            <a:noFill/>
-          </a:ln>
-          <a:effectLst>
-            <a:outerShdw blurRad="50800" dist="38100" dir="2700000" algn="tl" rotWithShape="0">
-              <a:prstClr val="black">
-                <a:alpha val="40000"/>
-              </a:prstClr>
-            </a:outerShdw>
-          </a:effectLst>
-        </p:spPr>
-        <p:style>
-          <a:lnRef idx="2">
-            <a:schemeClr val="accent1">
-              <a:shade val="50000"/>
-            </a:schemeClr>
-          </a:lnRef>
-          <a:fillRef idx="1">
-            <a:schemeClr val="accent1"/>
-          </a:fillRef>
-          <a:effectRef idx="0">
-            <a:schemeClr val="accent1"/>
-          </a:effectRef>
-          <a:fontRef idx="minor">
-            <a:schemeClr val="lt1"/>
-          </a:fontRef>
-        </p:style>
-        <p:txBody>
-          <a:bodyPr rtlCol="0" anchor="ctr"/>
-          <a:lstStyle/>
-          <a:p>
-            <a:pPr algn="ctr"/>
-            <a:r>
-              <a:rPr lang="en-US" sz="1400" dirty="0" smtClean="0">
-                <a:solidFill>
-                  <a:schemeClr val="bg1"/>
-                </a:solidFill>
-              </a:rPr>
-              <a:t>Spectrum</a:t>
-            </a:r>
-            <a:endParaRPr lang="en-US" sz="1400" dirty="0">
-              <a:solidFill>
-                <a:schemeClr val="bg1"/>
-              </a:solidFill>
-            </a:endParaRPr>
-          </a:p>
-        </p:txBody>
-      </p:sp>
-      <p:sp>
-        <p:nvSpPr>
-          <p:cNvPr id="34" name="Left Arrow 33"/>
-          <p:cNvSpPr/>
-          <p:nvPr/>
-        </p:nvSpPr>
-        <p:spPr>
-          <a:xfrm>
-            <a:off x="5511244" y="3976688"/>
-            <a:ext cx="1022400" cy="486000"/>
-          </a:xfrm>
-          <a:prstGeom prst="leftArrow">
-            <a:avLst/>
-          </a:prstGeom>
-          <a:solidFill>
-            <a:schemeClr val="accent6"/>
-          </a:solidFill>
-          <a:ln>
-            <a:noFill/>
-          </a:ln>
-          <a:effectLst>
-            <a:outerShdw blurRad="50800" dist="38100" dir="2700000" algn="tl" rotWithShape="0">
-              <a:prstClr val="black">
-                <a:alpha val="40000"/>
-              </a:prstClr>
-            </a:outerShdw>
-          </a:effectLst>
-        </p:spPr>
-        <p:style>
-          <a:lnRef idx="2">
-            <a:schemeClr val="accent1">
-              <a:shade val="50000"/>
-            </a:schemeClr>
-          </a:lnRef>
-          <a:fillRef idx="1">
-            <a:schemeClr val="accent1"/>
-          </a:fillRef>
-          <a:effectRef idx="0">
-            <a:schemeClr val="accent1"/>
-          </a:effectRef>
-          <a:fontRef idx="minor">
-            <a:schemeClr val="lt1"/>
-          </a:fontRef>
-        </p:style>
-        <p:txBody>
-          <a:bodyPr rtlCol="0" anchor="ctr"/>
-          <a:lstStyle/>
-          <a:p>
-            <a:pPr algn="ctr"/>
-            <a:r>
-              <a:rPr lang="en-US" sz="1400" dirty="0" smtClean="0">
-                <a:solidFill>
-                  <a:schemeClr val="bg1"/>
-                </a:solidFill>
-              </a:rPr>
-              <a:t>Coverage</a:t>
-            </a:r>
-            <a:endParaRPr lang="en-US" sz="1400" dirty="0">
-              <a:solidFill>
-                <a:schemeClr val="bg1"/>
-              </a:solidFill>
-            </a:endParaRPr>
-          </a:p>
-        </p:txBody>
-      </p:sp>
-      <p:sp>
-        <p:nvSpPr>
-          <p:cNvPr id="11" name="TextBox 10"/>
-          <p:cNvSpPr txBox="1"/>
-          <p:nvPr/>
-        </p:nvSpPr>
-        <p:spPr>
-          <a:xfrm>
-            <a:off x="1414462" y="4371977"/>
-            <a:ext cx="1305165" cy="215444"/>
-          </a:xfrm>
-          <a:prstGeom prst="rect">
-            <a:avLst/>
-          </a:prstGeom>
-          <a:noFill/>
-        </p:spPr>
-        <p:txBody>
-          <a:bodyPr wrap="none" rtlCol="0">
-            <a:spAutoFit/>
-          </a:bodyPr>
-          <a:lstStyle/>
-          <a:p>
-            <a:r>
-              <a:rPr lang="en-US" sz="800" i="1" dirty="0" smtClean="0"/>
-              <a:t>* Peptide-Spectrum Match</a:t>
-            </a:r>
-            <a:endParaRPr lang="en-US" sz="800" i="1" dirty="0"/>
           </a:p>
         </p:txBody>
       </p:sp>
@@ -5184,8 +5754,8 @@
         </p:nvSpPr>
         <p:spPr>
           <a:xfrm>
-            <a:off x="1403648" y="1412775"/>
-            <a:ext cx="5271472" cy="3294955"/>
+            <a:off x="1403648" y="1412776"/>
+            <a:ext cx="5271472" cy="3182084"/>
           </a:xfrm>
           <a:prstGeom prst="rect">
             <a:avLst/>
@@ -5277,7 +5847,7 @@
         <p:spPr>
           <a:xfrm>
             <a:off x="1475656" y="1556792"/>
-            <a:ext cx="3565400" cy="338554"/>
+            <a:ext cx="4770793" cy="338554"/>
           </a:xfrm>
           <a:prstGeom prst="rect">
             <a:avLst/>
@@ -5303,13 +5873,26 @@
           <a:lstStyle/>
           <a:p>
             <a:r>
-              <a:rPr lang="en-US" sz="1600" b="1" dirty="0">
+              <a:rPr lang="en-US" sz="1600" b="1" dirty="0" smtClean="0">
                 <a:solidFill>
                   <a:schemeClr val="bg1"/>
                 </a:solidFill>
               </a:rPr>
-              <a:t>All tables, plots and graphics are linked!</a:t>
-            </a:r>
+              <a:t>Get an overview </a:t>
+            </a:r>
+            <a:r>
+              <a:rPr lang="en-US" sz="1600" b="1" dirty="0" smtClean="0">
+                <a:solidFill>
+                  <a:schemeClr val="bg1"/>
+                </a:solidFill>
+              </a:rPr>
+              <a:t>of all proteins, peptides and spectra!</a:t>
+            </a:r>
+            <a:endParaRPr lang="en-US" sz="1600" b="1" dirty="0">
+              <a:solidFill>
+                <a:schemeClr val="bg1"/>
+              </a:solidFill>
+            </a:endParaRPr>
           </a:p>
         </p:txBody>
       </p:sp>
@@ -5321,8 +5904,8 @@
         </p:nvSpPr>
         <p:spPr>
           <a:xfrm>
-            <a:off x="1475655" y="2000251"/>
-            <a:ext cx="1410420" cy="889200"/>
+            <a:off x="1475656" y="2320305"/>
+            <a:ext cx="1022400" cy="486000"/>
           </a:xfrm>
           <a:prstGeom prst="rightArrow">
             <a:avLst/>
@@ -5368,7 +5951,7 @@
                   <a:schemeClr val="bg1"/>
                 </a:solidFill>
               </a:rPr>
-              <a:t>Selecting a protein …</a:t>
+              <a:t>Proteins</a:t>
             </a:r>
             <a:endParaRPr lang="en-US" sz="1400" dirty="0">
               <a:solidFill>
@@ -5386,8 +5969,8 @@
         </p:nvSpPr>
         <p:spPr>
           <a:xfrm>
-            <a:off x="1475655" y="2764635"/>
-            <a:ext cx="1546151" cy="889200"/>
+            <a:off x="1475656" y="2968005"/>
+            <a:ext cx="1022400" cy="486000"/>
           </a:xfrm>
           <a:prstGeom prst="rightArrow">
             <a:avLst/>
@@ -5433,7 +6016,7 @@
                   <a:schemeClr val="bg1"/>
                 </a:solidFill>
               </a:rPr>
-              <a:t>…  displays the peptides …</a:t>
+              <a:t>Peptides</a:t>
             </a:r>
             <a:endParaRPr lang="en-US" sz="1400" dirty="0">
               <a:solidFill>
@@ -5451,8 +6034,8 @@
         </p:nvSpPr>
         <p:spPr>
           <a:xfrm>
-            <a:off x="1475656" y="3527594"/>
-            <a:ext cx="1381844" cy="889200"/>
+            <a:off x="1475656" y="3620468"/>
+            <a:ext cx="1022400" cy="486000"/>
           </a:xfrm>
           <a:prstGeom prst="rightArrow">
             <a:avLst/>
@@ -5498,7 +6081,15 @@
                   <a:schemeClr val="bg1"/>
                 </a:solidFill>
               </a:rPr>
-              <a:t>… and then the PSMs …</a:t>
+              <a:t>PSMs</a:t>
+            </a:r>
+            <a:r>
+              <a:rPr lang="en-US" sz="1100" dirty="0" smtClean="0">
+                <a:solidFill>
+                  <a:schemeClr val="bg1"/>
+                </a:solidFill>
+              </a:rPr>
+              <a:t>*</a:t>
             </a:r>
             <a:endParaRPr lang="en-US" sz="1400" dirty="0">
               <a:solidFill>
@@ -5516,8 +6107,8 @@
         </p:nvSpPr>
         <p:spPr>
           <a:xfrm>
-            <a:off x="4922045" y="2814651"/>
-            <a:ext cx="1611600" cy="889200"/>
+            <a:off x="5511244" y="3062288"/>
+            <a:ext cx="1022400" cy="486000"/>
           </a:xfrm>
           <a:prstGeom prst="leftArrow">
             <a:avLst/>
@@ -5563,7 +6154,7 @@
                   <a:schemeClr val="bg1"/>
                 </a:solidFill>
               </a:rPr>
-              <a:t>… which opens the spectrum …</a:t>
+              <a:t>Spectrum</a:t>
             </a:r>
             <a:endParaRPr lang="en-US" sz="1400" dirty="0">
               <a:solidFill>
@@ -5581,8 +6172,8 @@
         </p:nvSpPr>
         <p:spPr>
           <a:xfrm>
-            <a:off x="4622006" y="3700463"/>
-            <a:ext cx="1933069" cy="890817"/>
+            <a:off x="5511244" y="3976688"/>
+            <a:ext cx="1022400" cy="486000"/>
           </a:xfrm>
           <a:prstGeom prst="leftArrow">
             <a:avLst/>
@@ -5628,7 +6219,7 @@
                   <a:schemeClr val="bg1"/>
                 </a:solidFill>
               </a:rPr>
-              <a:t>… and updates the sequence coverage.</a:t>
+              <a:t>Coverage</a:t>
             </a:r>
             <a:endParaRPr lang="en-US" sz="1400" dirty="0">
               <a:solidFill>
@@ -5646,8 +6237,8 @@
         </p:nvSpPr>
         <p:spPr>
           <a:xfrm>
-            <a:off x="1414463" y="2178844"/>
-            <a:ext cx="242374" cy="230832"/>
+            <a:off x="1414462" y="4371977"/>
+            <a:ext cx="1305165" cy="215444"/>
           </a:xfrm>
           <a:prstGeom prst="rect">
             <a:avLst/>
@@ -5661,190 +6252,10 @@
           <a:lstStyle/>
           <a:p>
             <a:r>
-              <a:rPr lang="en-US" sz="900" dirty="0" smtClean="0">
-                <a:solidFill>
-                  <a:schemeClr val="bg1">
-                    <a:lumMod val="95000"/>
-                  </a:schemeClr>
-                </a:solidFill>
-              </a:rPr>
-              <a:t>1</a:t>
-            </a:r>
-            <a:endParaRPr lang="en-US" sz="900" dirty="0">
-              <a:solidFill>
-                <a:schemeClr val="bg1">
-                  <a:lumMod val="95000"/>
-                </a:schemeClr>
-              </a:solidFill>
-            </a:endParaRPr>
-          </a:p>
-        </p:txBody>
-      </p:sp>
-      <p:sp>
-        <p:nvSpPr>
-          <p:cNvPr id="12" name="TextBox 11"/>
-          <p:cNvSpPr txBox="1"/>
-          <p:nvPr/>
-        </p:nvSpPr>
-        <p:spPr>
-          <a:xfrm>
-            <a:off x="1423988" y="2938465"/>
-            <a:ext cx="242374" cy="230832"/>
-          </a:xfrm>
-          <a:prstGeom prst="rect">
-            <a:avLst/>
-          </a:prstGeom>
-          <a:noFill/>
-        </p:spPr>
-        <p:txBody>
-          <a:bodyPr wrap="none" rtlCol="0">
-            <a:spAutoFit/>
-          </a:bodyPr>
-          <a:lstStyle/>
-          <a:p>
-            <a:r>
-              <a:rPr lang="en-US" sz="900" dirty="0" smtClean="0">
-                <a:solidFill>
-                  <a:schemeClr val="bg1">
-                    <a:lumMod val="95000"/>
-                  </a:schemeClr>
-                </a:solidFill>
-              </a:rPr>
-              <a:t>2</a:t>
-            </a:r>
-            <a:endParaRPr lang="en-US" sz="900" dirty="0">
-              <a:solidFill>
-                <a:schemeClr val="bg1">
-                  <a:lumMod val="95000"/>
-                </a:schemeClr>
-              </a:solidFill>
-            </a:endParaRPr>
-          </a:p>
-        </p:txBody>
-      </p:sp>
-      <p:sp>
-        <p:nvSpPr>
-          <p:cNvPr id="13" name="TextBox 12"/>
-          <p:cNvSpPr txBox="1"/>
-          <p:nvPr/>
-        </p:nvSpPr>
-        <p:spPr>
-          <a:xfrm>
-            <a:off x="1416843" y="3695698"/>
-            <a:ext cx="242374" cy="230832"/>
-          </a:xfrm>
-          <a:prstGeom prst="rect">
-            <a:avLst/>
-          </a:prstGeom>
-          <a:noFill/>
-        </p:spPr>
-        <p:txBody>
-          <a:bodyPr wrap="none" rtlCol="0">
-            <a:spAutoFit/>
-          </a:bodyPr>
-          <a:lstStyle/>
-          <a:p>
-            <a:r>
-              <a:rPr lang="en-US" sz="900" dirty="0" smtClean="0">
-                <a:solidFill>
-                  <a:schemeClr val="bg1">
-                    <a:lumMod val="95000"/>
-                  </a:schemeClr>
-                </a:solidFill>
-              </a:rPr>
-              <a:t>3</a:t>
-            </a:r>
-            <a:endParaRPr lang="en-US" sz="900" dirty="0">
-              <a:solidFill>
-                <a:schemeClr val="bg1">
-                  <a:lumMod val="95000"/>
-                </a:schemeClr>
-              </a:solidFill>
-            </a:endParaRPr>
-          </a:p>
-        </p:txBody>
-      </p:sp>
-      <p:sp>
-        <p:nvSpPr>
-          <p:cNvPr id="14" name="TextBox 13"/>
-          <p:cNvSpPr txBox="1"/>
-          <p:nvPr/>
-        </p:nvSpPr>
-        <p:spPr>
-          <a:xfrm>
-            <a:off x="6353177" y="2995624"/>
-            <a:ext cx="242374" cy="230832"/>
-          </a:xfrm>
-          <a:prstGeom prst="rect">
-            <a:avLst/>
-          </a:prstGeom>
-          <a:noFill/>
-        </p:spPr>
-        <p:txBody>
-          <a:bodyPr wrap="none" rtlCol="0">
-            <a:spAutoFit/>
-          </a:bodyPr>
-          <a:lstStyle/>
-          <a:p>
-            <a:r>
-              <a:rPr lang="en-US" sz="900" dirty="0" smtClean="0">
-                <a:solidFill>
-                  <a:schemeClr val="bg1">
-                    <a:lumMod val="95000"/>
-                  </a:schemeClr>
-                </a:solidFill>
-              </a:rPr>
-              <a:t>4</a:t>
-            </a:r>
-            <a:endParaRPr lang="en-US" sz="900" dirty="0">
-              <a:solidFill>
-                <a:schemeClr val="bg1">
-                  <a:lumMod val="95000"/>
-                </a:schemeClr>
-              </a:solidFill>
-            </a:endParaRPr>
-          </a:p>
-        </p:txBody>
-      </p:sp>
-      <p:sp>
-        <p:nvSpPr>
-          <p:cNvPr id="15" name="TextBox 14"/>
-          <p:cNvSpPr txBox="1"/>
-          <p:nvPr/>
-        </p:nvSpPr>
-        <p:spPr>
-          <a:xfrm>
-            <a:off x="6360319" y="3888583"/>
-            <a:ext cx="242374" cy="230832"/>
-          </a:xfrm>
-          <a:prstGeom prst="rect">
-            <a:avLst/>
-          </a:prstGeom>
-          <a:noFill/>
-        </p:spPr>
-        <p:txBody>
-          <a:bodyPr wrap="none" rtlCol="0">
-            <a:spAutoFit/>
-          </a:bodyPr>
-          <a:lstStyle/>
-          <a:p>
-            <a:r>
-              <a:rPr lang="en-US" sz="900" dirty="0" smtClean="0">
-                <a:solidFill>
-                  <a:schemeClr val="bg1">
-                    <a:lumMod val="95000"/>
-                  </a:schemeClr>
-                </a:solidFill>
-              </a:rPr>
-              <a:t>5</a:t>
-            </a:r>
-            <a:endParaRPr lang="en-US" sz="900" dirty="0">
-              <a:solidFill>
-                <a:schemeClr val="bg1">
-                  <a:lumMod val="95000"/>
-                </a:schemeClr>
-              </a:solidFill>
-            </a:endParaRPr>
+              <a:rPr lang="en-US" sz="800" i="1" dirty="0" smtClean="0"/>
+              <a:t>* Peptide-Spectrum Match</a:t>
+            </a:r>
+            <a:endParaRPr lang="en-US" sz="800" i="1" dirty="0"/>
           </a:p>
         </p:txBody>
       </p:sp>
@@ -5864,6 +6275,750 @@
 </file>
 
 <file path=ppt/slides/slide4.xml><?xml version="1.0" encoding="utf-8"?>
+<p:sld xmlns:a="http://schemas.openxmlformats.org/drawingml/2006/main" xmlns:r="http://schemas.openxmlformats.org/officeDocument/2006/relationships" xmlns:p="http://schemas.openxmlformats.org/presentationml/2006/main">
+  <p:cSld>
+    <p:spTree>
+      <p:nvGrpSpPr>
+        <p:cNvPr id="1" name=""/>
+        <p:cNvGrpSpPr/>
+        <p:nvPr/>
+      </p:nvGrpSpPr>
+      <p:grpSpPr>
+        <a:xfrm>
+          <a:off x="0" y="0"/>
+          <a:ext cx="0" cy="0"/>
+          <a:chOff x="0" y="0"/>
+          <a:chExt cx="0" cy="0"/>
+        </a:xfrm>
+      </p:grpSpPr>
+      <p:sp>
+        <p:nvSpPr>
+          <p:cNvPr id="7" name="Rectangle 6"/>
+          <p:cNvSpPr/>
+          <p:nvPr/>
+        </p:nvSpPr>
+        <p:spPr>
+          <a:xfrm>
+            <a:off x="323528" y="692696"/>
+            <a:ext cx="7848872" cy="5184576"/>
+          </a:xfrm>
+          <a:prstGeom prst="rect">
+            <a:avLst/>
+          </a:prstGeom>
+        </p:spPr>
+        <p:style>
+          <a:lnRef idx="2">
+            <a:schemeClr val="accent1">
+              <a:shade val="50000"/>
+            </a:schemeClr>
+          </a:lnRef>
+          <a:fillRef idx="1">
+            <a:schemeClr val="accent1"/>
+          </a:fillRef>
+          <a:effectRef idx="0">
+            <a:schemeClr val="accent1"/>
+          </a:effectRef>
+          <a:fontRef idx="minor">
+            <a:schemeClr val="lt1"/>
+          </a:fontRef>
+        </p:style>
+        <p:txBody>
+          <a:bodyPr rtlCol="0" anchor="ctr"/>
+          <a:lstStyle/>
+          <a:p>
+            <a:pPr algn="ctr"/>
+            <a:endParaRPr lang="en-US"/>
+          </a:p>
+        </p:txBody>
+      </p:sp>
+      <p:sp>
+        <p:nvSpPr>
+          <p:cNvPr id="5" name="Rectangle 4"/>
+          <p:cNvSpPr/>
+          <p:nvPr/>
+        </p:nvSpPr>
+        <p:spPr>
+          <a:xfrm>
+            <a:off x="1403648" y="1412775"/>
+            <a:ext cx="5271472" cy="3294955"/>
+          </a:xfrm>
+          <a:prstGeom prst="rect">
+            <a:avLst/>
+          </a:prstGeom>
+          <a:solidFill>
+            <a:schemeClr val="bg1"/>
+          </a:solidFill>
+          <a:ln w="6350">
+            <a:noFill/>
+          </a:ln>
+        </p:spPr>
+        <p:style>
+          <a:lnRef idx="2">
+            <a:schemeClr val="accent1">
+              <a:shade val="50000"/>
+            </a:schemeClr>
+          </a:lnRef>
+          <a:fillRef idx="1">
+            <a:schemeClr val="accent1"/>
+          </a:fillRef>
+          <a:effectRef idx="0">
+            <a:schemeClr val="accent1"/>
+          </a:effectRef>
+          <a:fontRef idx="minor">
+            <a:schemeClr val="lt1"/>
+          </a:fontRef>
+        </p:style>
+        <p:txBody>
+          <a:bodyPr rtlCol="0" anchor="ctr"/>
+          <a:lstStyle/>
+          <a:p>
+            <a:pPr algn="ctr"/>
+            <a:r>
+              <a:rPr lang="en-US" dirty="0" smtClean="0"/>
+              <a:t>PeptideShaker Overview</a:t>
+            </a:r>
+          </a:p>
+        </p:txBody>
+      </p:sp>
+      <p:pic>
+        <p:nvPicPr>
+          <p:cNvPr id="11267" name="Picture 3"/>
+          <p:cNvPicPr>
+            <a:picLocks noChangeAspect="1" noChangeArrowheads="1"/>
+          </p:cNvPicPr>
+          <p:nvPr/>
+        </p:nvPicPr>
+        <p:blipFill>
+          <a:blip r:embed="rId2" cstate="print"/>
+          <a:srcRect/>
+          <a:stretch>
+            <a:fillRect/>
+          </a:stretch>
+        </p:blipFill>
+        <p:spPr bwMode="auto">
+          <a:xfrm>
+            <a:off x="2275148" y="2072072"/>
+            <a:ext cx="3657600" cy="2209800"/>
+          </a:xfrm>
+          <a:prstGeom prst="rect">
+            <a:avLst/>
+          </a:prstGeom>
+          <a:noFill/>
+          <a:ln w="3175">
+            <a:solidFill>
+              <a:schemeClr val="bg1">
+                <a:lumMod val="85000"/>
+              </a:schemeClr>
+            </a:solidFill>
+            <a:miter lim="800000"/>
+            <a:headEnd/>
+            <a:tailEnd/>
+          </a:ln>
+          <a:effectLst>
+            <a:outerShdw blurRad="50800" dist="38100" dir="2700000" algn="tl" rotWithShape="0">
+              <a:prstClr val="black">
+                <a:alpha val="40000"/>
+              </a:prstClr>
+            </a:outerShdw>
+          </a:effectLst>
+        </p:spPr>
+      </p:pic>
+      <p:sp>
+        <p:nvSpPr>
+          <p:cNvPr id="8" name="TextBox 7"/>
+          <p:cNvSpPr txBox="1"/>
+          <p:nvPr/>
+        </p:nvSpPr>
+        <p:spPr>
+          <a:xfrm>
+            <a:off x="1475656" y="1556792"/>
+            <a:ext cx="3565400" cy="338554"/>
+          </a:xfrm>
+          <a:prstGeom prst="rect">
+            <a:avLst/>
+          </a:prstGeom>
+          <a:solidFill>
+            <a:schemeClr val="accent6"/>
+          </a:solidFill>
+          <a:ln>
+            <a:noFill/>
+          </a:ln>
+          <a:effectLst>
+            <a:outerShdw blurRad="50800" dist="38100" dir="2700000" algn="tl" rotWithShape="0">
+              <a:prstClr val="black">
+                <a:alpha val="40000"/>
+              </a:prstClr>
+            </a:outerShdw>
+          </a:effectLst>
+        </p:spPr>
+        <p:txBody>
+          <a:bodyPr wrap="none" rtlCol="0">
+            <a:spAutoFit/>
+          </a:bodyPr>
+          <a:lstStyle/>
+          <a:p>
+            <a:r>
+              <a:rPr lang="en-US" sz="1600" b="1" dirty="0">
+                <a:solidFill>
+                  <a:schemeClr val="bg1"/>
+                </a:solidFill>
+              </a:rPr>
+              <a:t>All tables, plots and graphics are linked!</a:t>
+            </a:r>
+          </a:p>
+        </p:txBody>
+      </p:sp>
+      <p:sp>
+        <p:nvSpPr>
+          <p:cNvPr id="27" name="Right Arrow 26"/>
+          <p:cNvSpPr/>
+          <p:nvPr/>
+        </p:nvSpPr>
+        <p:spPr>
+          <a:xfrm>
+            <a:off x="1475655" y="2000251"/>
+            <a:ext cx="1410420" cy="889200"/>
+          </a:xfrm>
+          <a:prstGeom prst="rightArrow">
+            <a:avLst/>
+          </a:prstGeom>
+          <a:solidFill>
+            <a:schemeClr val="accent6"/>
+          </a:solidFill>
+          <a:ln>
+            <a:noFill/>
+          </a:ln>
+          <a:effectLst>
+            <a:outerShdw blurRad="50800" dist="38100" dir="2700000" algn="tl" rotWithShape="0">
+              <a:prstClr val="black">
+                <a:alpha val="40000"/>
+              </a:prstClr>
+            </a:outerShdw>
+          </a:effectLst>
+        </p:spPr>
+        <p:style>
+          <a:lnRef idx="2">
+            <a:schemeClr val="accent1">
+              <a:shade val="50000"/>
+            </a:schemeClr>
+          </a:lnRef>
+          <a:fillRef idx="1">
+            <a:schemeClr val="accent1"/>
+          </a:fillRef>
+          <a:effectRef idx="0">
+            <a:schemeClr val="accent1"/>
+          </a:effectRef>
+          <a:fontRef idx="minor">
+            <a:schemeClr val="lt1"/>
+          </a:fontRef>
+        </p:style>
+        <p:txBody>
+          <a:bodyPr rtlCol="0" anchor="ctr"/>
+          <a:lstStyle/>
+          <a:p>
+            <a:pPr algn="ctr"/>
+            <a:r>
+              <a:rPr lang="en-US" sz="1400" dirty="0" smtClean="0">
+                <a:solidFill>
+                  <a:schemeClr val="bg1"/>
+                </a:solidFill>
+              </a:rPr>
+              <a:t>Selecting a protein …</a:t>
+            </a:r>
+            <a:endParaRPr lang="en-US" sz="1400" dirty="0">
+              <a:solidFill>
+                <a:schemeClr val="bg1"/>
+              </a:solidFill>
+            </a:endParaRPr>
+          </a:p>
+        </p:txBody>
+      </p:sp>
+      <p:sp>
+        <p:nvSpPr>
+          <p:cNvPr id="28" name="Right Arrow 27"/>
+          <p:cNvSpPr/>
+          <p:nvPr/>
+        </p:nvSpPr>
+        <p:spPr>
+          <a:xfrm>
+            <a:off x="1475655" y="2764635"/>
+            <a:ext cx="1546151" cy="889200"/>
+          </a:xfrm>
+          <a:prstGeom prst="rightArrow">
+            <a:avLst/>
+          </a:prstGeom>
+          <a:solidFill>
+            <a:schemeClr val="accent6"/>
+          </a:solidFill>
+          <a:ln>
+            <a:noFill/>
+          </a:ln>
+          <a:effectLst>
+            <a:outerShdw blurRad="50800" dist="38100" dir="2700000" algn="tl" rotWithShape="0">
+              <a:prstClr val="black">
+                <a:alpha val="40000"/>
+              </a:prstClr>
+            </a:outerShdw>
+          </a:effectLst>
+        </p:spPr>
+        <p:style>
+          <a:lnRef idx="2">
+            <a:schemeClr val="accent1">
+              <a:shade val="50000"/>
+            </a:schemeClr>
+          </a:lnRef>
+          <a:fillRef idx="1">
+            <a:schemeClr val="accent1"/>
+          </a:fillRef>
+          <a:effectRef idx="0">
+            <a:schemeClr val="accent1"/>
+          </a:effectRef>
+          <a:fontRef idx="minor">
+            <a:schemeClr val="lt1"/>
+          </a:fontRef>
+        </p:style>
+        <p:txBody>
+          <a:bodyPr rtlCol="0" anchor="ctr"/>
+          <a:lstStyle/>
+          <a:p>
+            <a:pPr algn="ctr"/>
+            <a:r>
+              <a:rPr lang="en-US" sz="1400" dirty="0" smtClean="0">
+                <a:solidFill>
+                  <a:schemeClr val="bg1"/>
+                </a:solidFill>
+              </a:rPr>
+              <a:t>…  displays the peptides …</a:t>
+            </a:r>
+            <a:endParaRPr lang="en-US" sz="1400" dirty="0">
+              <a:solidFill>
+                <a:schemeClr val="bg1"/>
+              </a:solidFill>
+            </a:endParaRPr>
+          </a:p>
+        </p:txBody>
+      </p:sp>
+      <p:sp>
+        <p:nvSpPr>
+          <p:cNvPr id="29" name="Right Arrow 28"/>
+          <p:cNvSpPr/>
+          <p:nvPr/>
+        </p:nvSpPr>
+        <p:spPr>
+          <a:xfrm>
+            <a:off x="1475656" y="3527594"/>
+            <a:ext cx="1381844" cy="889200"/>
+          </a:xfrm>
+          <a:prstGeom prst="rightArrow">
+            <a:avLst/>
+          </a:prstGeom>
+          <a:solidFill>
+            <a:schemeClr val="accent6"/>
+          </a:solidFill>
+          <a:ln>
+            <a:noFill/>
+          </a:ln>
+          <a:effectLst>
+            <a:outerShdw blurRad="50800" dist="38100" dir="2700000" algn="tl" rotWithShape="0">
+              <a:prstClr val="black">
+                <a:alpha val="40000"/>
+              </a:prstClr>
+            </a:outerShdw>
+          </a:effectLst>
+        </p:spPr>
+        <p:style>
+          <a:lnRef idx="2">
+            <a:schemeClr val="accent1">
+              <a:shade val="50000"/>
+            </a:schemeClr>
+          </a:lnRef>
+          <a:fillRef idx="1">
+            <a:schemeClr val="accent1"/>
+          </a:fillRef>
+          <a:effectRef idx="0">
+            <a:schemeClr val="accent1"/>
+          </a:effectRef>
+          <a:fontRef idx="minor">
+            <a:schemeClr val="lt1"/>
+          </a:fontRef>
+        </p:style>
+        <p:txBody>
+          <a:bodyPr rtlCol="0" anchor="ctr"/>
+          <a:lstStyle/>
+          <a:p>
+            <a:pPr algn="ctr"/>
+            <a:r>
+              <a:rPr lang="en-US" sz="1400" dirty="0" smtClean="0">
+                <a:solidFill>
+                  <a:schemeClr val="bg1"/>
+                </a:solidFill>
+              </a:rPr>
+              <a:t>… and then the PSMs …</a:t>
+            </a:r>
+            <a:endParaRPr lang="en-US" sz="1400" dirty="0">
+              <a:solidFill>
+                <a:schemeClr val="bg1"/>
+              </a:solidFill>
+            </a:endParaRPr>
+          </a:p>
+        </p:txBody>
+      </p:sp>
+      <p:sp>
+        <p:nvSpPr>
+          <p:cNvPr id="33" name="Left Arrow 32"/>
+          <p:cNvSpPr/>
+          <p:nvPr/>
+        </p:nvSpPr>
+        <p:spPr>
+          <a:xfrm>
+            <a:off x="4922045" y="2814651"/>
+            <a:ext cx="1611600" cy="889200"/>
+          </a:xfrm>
+          <a:prstGeom prst="leftArrow">
+            <a:avLst/>
+          </a:prstGeom>
+          <a:solidFill>
+            <a:schemeClr val="accent6"/>
+          </a:solidFill>
+          <a:ln>
+            <a:noFill/>
+          </a:ln>
+          <a:effectLst>
+            <a:outerShdw blurRad="50800" dist="38100" dir="2700000" algn="tl" rotWithShape="0">
+              <a:prstClr val="black">
+                <a:alpha val="40000"/>
+              </a:prstClr>
+            </a:outerShdw>
+          </a:effectLst>
+        </p:spPr>
+        <p:style>
+          <a:lnRef idx="2">
+            <a:schemeClr val="accent1">
+              <a:shade val="50000"/>
+            </a:schemeClr>
+          </a:lnRef>
+          <a:fillRef idx="1">
+            <a:schemeClr val="accent1"/>
+          </a:fillRef>
+          <a:effectRef idx="0">
+            <a:schemeClr val="accent1"/>
+          </a:effectRef>
+          <a:fontRef idx="minor">
+            <a:schemeClr val="lt1"/>
+          </a:fontRef>
+        </p:style>
+        <p:txBody>
+          <a:bodyPr rtlCol="0" anchor="ctr"/>
+          <a:lstStyle/>
+          <a:p>
+            <a:pPr algn="ctr"/>
+            <a:r>
+              <a:rPr lang="en-US" sz="1400" dirty="0" smtClean="0">
+                <a:solidFill>
+                  <a:schemeClr val="bg1"/>
+                </a:solidFill>
+              </a:rPr>
+              <a:t>… which opens the spectrum …</a:t>
+            </a:r>
+            <a:endParaRPr lang="en-US" sz="1400" dirty="0">
+              <a:solidFill>
+                <a:schemeClr val="bg1"/>
+              </a:solidFill>
+            </a:endParaRPr>
+          </a:p>
+        </p:txBody>
+      </p:sp>
+      <p:sp>
+        <p:nvSpPr>
+          <p:cNvPr id="34" name="Left Arrow 33"/>
+          <p:cNvSpPr/>
+          <p:nvPr/>
+        </p:nvSpPr>
+        <p:spPr>
+          <a:xfrm>
+            <a:off x="4622006" y="3700463"/>
+            <a:ext cx="1933069" cy="890817"/>
+          </a:xfrm>
+          <a:prstGeom prst="leftArrow">
+            <a:avLst/>
+          </a:prstGeom>
+          <a:solidFill>
+            <a:schemeClr val="accent6"/>
+          </a:solidFill>
+          <a:ln>
+            <a:noFill/>
+          </a:ln>
+          <a:effectLst>
+            <a:outerShdw blurRad="50800" dist="38100" dir="2700000" algn="tl" rotWithShape="0">
+              <a:prstClr val="black">
+                <a:alpha val="40000"/>
+              </a:prstClr>
+            </a:outerShdw>
+          </a:effectLst>
+        </p:spPr>
+        <p:style>
+          <a:lnRef idx="2">
+            <a:schemeClr val="accent1">
+              <a:shade val="50000"/>
+            </a:schemeClr>
+          </a:lnRef>
+          <a:fillRef idx="1">
+            <a:schemeClr val="accent1"/>
+          </a:fillRef>
+          <a:effectRef idx="0">
+            <a:schemeClr val="accent1"/>
+          </a:effectRef>
+          <a:fontRef idx="minor">
+            <a:schemeClr val="lt1"/>
+          </a:fontRef>
+        </p:style>
+        <p:txBody>
+          <a:bodyPr rtlCol="0" anchor="ctr"/>
+          <a:lstStyle/>
+          <a:p>
+            <a:pPr algn="ctr"/>
+            <a:r>
+              <a:rPr lang="en-US" sz="1400" dirty="0" smtClean="0">
+                <a:solidFill>
+                  <a:schemeClr val="bg1"/>
+                </a:solidFill>
+              </a:rPr>
+              <a:t>… and updates the sequence coverage.</a:t>
+            </a:r>
+            <a:endParaRPr lang="en-US" sz="1400" dirty="0">
+              <a:solidFill>
+                <a:schemeClr val="bg1"/>
+              </a:solidFill>
+            </a:endParaRPr>
+          </a:p>
+        </p:txBody>
+      </p:sp>
+      <p:sp>
+        <p:nvSpPr>
+          <p:cNvPr id="11" name="TextBox 10"/>
+          <p:cNvSpPr txBox="1"/>
+          <p:nvPr/>
+        </p:nvSpPr>
+        <p:spPr>
+          <a:xfrm>
+            <a:off x="1414463" y="2178844"/>
+            <a:ext cx="242374" cy="230832"/>
+          </a:xfrm>
+          <a:prstGeom prst="rect">
+            <a:avLst/>
+          </a:prstGeom>
+          <a:noFill/>
+        </p:spPr>
+        <p:txBody>
+          <a:bodyPr wrap="none" rtlCol="0">
+            <a:spAutoFit/>
+          </a:bodyPr>
+          <a:lstStyle/>
+          <a:p>
+            <a:r>
+              <a:rPr lang="en-US" sz="900" dirty="0" smtClean="0">
+                <a:solidFill>
+                  <a:schemeClr val="bg1">
+                    <a:lumMod val="95000"/>
+                  </a:schemeClr>
+                </a:solidFill>
+              </a:rPr>
+              <a:t>1</a:t>
+            </a:r>
+            <a:endParaRPr lang="en-US" sz="900" dirty="0">
+              <a:solidFill>
+                <a:schemeClr val="bg1">
+                  <a:lumMod val="95000"/>
+                </a:schemeClr>
+              </a:solidFill>
+            </a:endParaRPr>
+          </a:p>
+        </p:txBody>
+      </p:sp>
+      <p:sp>
+        <p:nvSpPr>
+          <p:cNvPr id="12" name="TextBox 11"/>
+          <p:cNvSpPr txBox="1"/>
+          <p:nvPr/>
+        </p:nvSpPr>
+        <p:spPr>
+          <a:xfrm>
+            <a:off x="1423988" y="2938465"/>
+            <a:ext cx="242374" cy="230832"/>
+          </a:xfrm>
+          <a:prstGeom prst="rect">
+            <a:avLst/>
+          </a:prstGeom>
+          <a:noFill/>
+        </p:spPr>
+        <p:txBody>
+          <a:bodyPr wrap="none" rtlCol="0">
+            <a:spAutoFit/>
+          </a:bodyPr>
+          <a:lstStyle/>
+          <a:p>
+            <a:r>
+              <a:rPr lang="en-US" sz="900" dirty="0" smtClean="0">
+                <a:solidFill>
+                  <a:schemeClr val="bg1">
+                    <a:lumMod val="95000"/>
+                  </a:schemeClr>
+                </a:solidFill>
+              </a:rPr>
+              <a:t>2</a:t>
+            </a:r>
+            <a:endParaRPr lang="en-US" sz="900" dirty="0">
+              <a:solidFill>
+                <a:schemeClr val="bg1">
+                  <a:lumMod val="95000"/>
+                </a:schemeClr>
+              </a:solidFill>
+            </a:endParaRPr>
+          </a:p>
+        </p:txBody>
+      </p:sp>
+      <p:sp>
+        <p:nvSpPr>
+          <p:cNvPr id="13" name="TextBox 12"/>
+          <p:cNvSpPr txBox="1"/>
+          <p:nvPr/>
+        </p:nvSpPr>
+        <p:spPr>
+          <a:xfrm>
+            <a:off x="1416843" y="3695698"/>
+            <a:ext cx="242374" cy="230832"/>
+          </a:xfrm>
+          <a:prstGeom prst="rect">
+            <a:avLst/>
+          </a:prstGeom>
+          <a:noFill/>
+        </p:spPr>
+        <p:txBody>
+          <a:bodyPr wrap="none" rtlCol="0">
+            <a:spAutoFit/>
+          </a:bodyPr>
+          <a:lstStyle/>
+          <a:p>
+            <a:r>
+              <a:rPr lang="en-US" sz="900" dirty="0" smtClean="0">
+                <a:solidFill>
+                  <a:schemeClr val="bg1">
+                    <a:lumMod val="95000"/>
+                  </a:schemeClr>
+                </a:solidFill>
+              </a:rPr>
+              <a:t>3</a:t>
+            </a:r>
+            <a:endParaRPr lang="en-US" sz="900" dirty="0">
+              <a:solidFill>
+                <a:schemeClr val="bg1">
+                  <a:lumMod val="95000"/>
+                </a:schemeClr>
+              </a:solidFill>
+            </a:endParaRPr>
+          </a:p>
+        </p:txBody>
+      </p:sp>
+      <p:sp>
+        <p:nvSpPr>
+          <p:cNvPr id="14" name="TextBox 13"/>
+          <p:cNvSpPr txBox="1"/>
+          <p:nvPr/>
+        </p:nvSpPr>
+        <p:spPr>
+          <a:xfrm>
+            <a:off x="6353177" y="2995624"/>
+            <a:ext cx="242374" cy="230832"/>
+          </a:xfrm>
+          <a:prstGeom prst="rect">
+            <a:avLst/>
+          </a:prstGeom>
+          <a:noFill/>
+        </p:spPr>
+        <p:txBody>
+          <a:bodyPr wrap="none" rtlCol="0">
+            <a:spAutoFit/>
+          </a:bodyPr>
+          <a:lstStyle/>
+          <a:p>
+            <a:r>
+              <a:rPr lang="en-US" sz="900" dirty="0" smtClean="0">
+                <a:solidFill>
+                  <a:schemeClr val="bg1">
+                    <a:lumMod val="95000"/>
+                  </a:schemeClr>
+                </a:solidFill>
+              </a:rPr>
+              <a:t>4</a:t>
+            </a:r>
+            <a:endParaRPr lang="en-US" sz="900" dirty="0">
+              <a:solidFill>
+                <a:schemeClr val="bg1">
+                  <a:lumMod val="95000"/>
+                </a:schemeClr>
+              </a:solidFill>
+            </a:endParaRPr>
+          </a:p>
+        </p:txBody>
+      </p:sp>
+      <p:sp>
+        <p:nvSpPr>
+          <p:cNvPr id="15" name="TextBox 14"/>
+          <p:cNvSpPr txBox="1"/>
+          <p:nvPr/>
+        </p:nvSpPr>
+        <p:spPr>
+          <a:xfrm>
+            <a:off x="6360319" y="3888583"/>
+            <a:ext cx="242374" cy="230832"/>
+          </a:xfrm>
+          <a:prstGeom prst="rect">
+            <a:avLst/>
+          </a:prstGeom>
+          <a:noFill/>
+        </p:spPr>
+        <p:txBody>
+          <a:bodyPr wrap="none" rtlCol="0">
+            <a:spAutoFit/>
+          </a:bodyPr>
+          <a:lstStyle/>
+          <a:p>
+            <a:r>
+              <a:rPr lang="en-US" sz="900" dirty="0" smtClean="0">
+                <a:solidFill>
+                  <a:schemeClr val="bg1">
+                    <a:lumMod val="95000"/>
+                  </a:schemeClr>
+                </a:solidFill>
+              </a:rPr>
+              <a:t>5</a:t>
+            </a:r>
+            <a:endParaRPr lang="en-US" sz="900" dirty="0">
+              <a:solidFill>
+                <a:schemeClr val="bg1">
+                  <a:lumMod val="95000"/>
+                </a:schemeClr>
+              </a:solidFill>
+            </a:endParaRPr>
+          </a:p>
+        </p:txBody>
+      </p:sp>
+    </p:spTree>
+  </p:cSld>
+  <p:clrMapOvr>
+    <a:masterClrMapping/>
+  </p:clrMapOvr>
+  <p:timing>
+    <p:tnLst>
+      <p:par>
+        <p:cTn id="1" dur="indefinite" restart="never" nodeType="tmRoot"/>
+      </p:par>
+    </p:tnLst>
+  </p:timing>
+</p:sld>
+</file>
+
+<file path=ppt/slides/slide5.xml><?xml version="1.0" encoding="utf-8"?>
 <p:sld xmlns:a="http://schemas.openxmlformats.org/drawingml/2006/main" xmlns:r="http://schemas.openxmlformats.org/officeDocument/2006/relationships" xmlns:p="http://schemas.openxmlformats.org/presentationml/2006/main">
   <p:cSld>
     <p:spTree>
@@ -6380,7 +7535,7 @@
 </p:sld>
 </file>
 
-<file path=ppt/slides/slide5.xml><?xml version="1.0" encoding="utf-8"?>
+<file path=ppt/slides/slide6.xml><?xml version="1.0" encoding="utf-8"?>
 <p:sld xmlns:a="http://schemas.openxmlformats.org/drawingml/2006/main" xmlns:r="http://schemas.openxmlformats.org/officeDocument/2006/relationships" xmlns:p="http://schemas.openxmlformats.org/presentationml/2006/main">
   <p:cSld>
     <p:spTree>
@@ -7493,7 +8648,7 @@
 </p:sld>
 </file>
 
-<file path=ppt/slides/slide6.xml><?xml version="1.0" encoding="utf-8"?>
+<file path=ppt/slides/slide7.xml><?xml version="1.0" encoding="utf-8"?>
 <p:sld xmlns:a="http://schemas.openxmlformats.org/drawingml/2006/main" xmlns:r="http://schemas.openxmlformats.org/officeDocument/2006/relationships" xmlns:p="http://schemas.openxmlformats.org/presentationml/2006/main">
   <p:cSld>
     <p:spTree>
@@ -8133,7 +9288,7 @@
 </p:sld>
 </file>
 
-<file path=ppt/slides/slide7.xml><?xml version="1.0" encoding="utf-8"?>
+<file path=ppt/slides/slide8.xml><?xml version="1.0" encoding="utf-8"?>
 <p:sld xmlns:a="http://schemas.openxmlformats.org/drawingml/2006/main" xmlns:r="http://schemas.openxmlformats.org/officeDocument/2006/relationships" xmlns:p="http://schemas.openxmlformats.org/presentationml/2006/main">
   <p:cSld>
     <p:spTree>
@@ -8654,7 +9809,7 @@
 </p:sld>
 </file>
 
-<file path=ppt/slides/slide8.xml><?xml version="1.0" encoding="utf-8"?>
+<file path=ppt/slides/slide9.xml><?xml version="1.0" encoding="utf-8"?>
 <p:sld xmlns:a="http://schemas.openxmlformats.org/drawingml/2006/main" xmlns:r="http://schemas.openxmlformats.org/officeDocument/2006/relationships" xmlns:p="http://schemas.openxmlformats.org/presentationml/2006/main">
   <p:cSld>
     <p:spTree>
@@ -8843,15 +9998,7 @@
                   <a:schemeClr val="bg1"/>
                 </a:solidFill>
               </a:rPr>
-              <a:t>Easy sharing of projects with collaborators</a:t>
-            </a:r>
-            <a:r>
-              <a:rPr lang="en-US" sz="1600" b="1" dirty="0" smtClean="0">
-                <a:solidFill>
-                  <a:schemeClr val="bg1"/>
-                </a:solidFill>
-              </a:rPr>
-              <a:t>!</a:t>
+              <a:t>Easy sharing of projects with collaborators!</a:t>
             </a:r>
             <a:endParaRPr lang="en-US" sz="1600" b="1" dirty="0">
               <a:solidFill>
@@ -9205,716 +10352,6 @@
     <p:tnLst>
       <p:par>
         <p:cTn id="1" dur="indefinite" restart="never" nodeType="tmRoot"/>
-      </p:par>
-    </p:tnLst>
-  </p:timing>
-</p:sld>
-</file>
-
-<file path=ppt/slides/slide9.xml><?xml version="1.0" encoding="utf-8"?>
-<p:sld xmlns:a="http://schemas.openxmlformats.org/drawingml/2006/main" xmlns:r="http://schemas.openxmlformats.org/officeDocument/2006/relationships" xmlns:p="http://schemas.openxmlformats.org/presentationml/2006/main">
-  <p:cSld>
-    <p:spTree>
-      <p:nvGrpSpPr>
-        <p:cNvPr id="1" name=""/>
-        <p:cNvGrpSpPr/>
-        <p:nvPr/>
-      </p:nvGrpSpPr>
-      <p:grpSpPr>
-        <a:xfrm>
-          <a:off x="0" y="0"/>
-          <a:ext cx="0" cy="0"/>
-          <a:chOff x="0" y="0"/>
-          <a:chExt cx="0" cy="0"/>
-        </a:xfrm>
-      </p:grpSpPr>
-      <p:sp>
-        <p:nvSpPr>
-          <p:cNvPr id="24" name="Rectangle 23"/>
-          <p:cNvSpPr/>
-          <p:nvPr/>
-        </p:nvSpPr>
-        <p:spPr>
-          <a:xfrm>
-            <a:off x="323528" y="692696"/>
-            <a:ext cx="7848872" cy="5184576"/>
-          </a:xfrm>
-          <a:prstGeom prst="rect">
-            <a:avLst/>
-          </a:prstGeom>
-        </p:spPr>
-        <p:style>
-          <a:lnRef idx="2">
-            <a:schemeClr val="accent1">
-              <a:shade val="50000"/>
-            </a:schemeClr>
-          </a:lnRef>
-          <a:fillRef idx="1">
-            <a:schemeClr val="accent1"/>
-          </a:fillRef>
-          <a:effectRef idx="0">
-            <a:schemeClr val="accent1"/>
-          </a:effectRef>
-          <a:fontRef idx="minor">
-            <a:schemeClr val="lt1"/>
-          </a:fontRef>
-        </p:style>
-        <p:txBody>
-          <a:bodyPr rtlCol="0" anchor="ctr"/>
-          <a:lstStyle/>
-          <a:p>
-            <a:pPr algn="ctr"/>
-            <a:endParaRPr lang="en-US"/>
-          </a:p>
-        </p:txBody>
-      </p:sp>
-      <p:sp>
-        <p:nvSpPr>
-          <p:cNvPr id="28" name="Rectangle 27"/>
-          <p:cNvSpPr/>
-          <p:nvPr/>
-        </p:nvSpPr>
-        <p:spPr>
-          <a:xfrm>
-            <a:off x="1403648" y="1412776"/>
-            <a:ext cx="5271472" cy="3182084"/>
-          </a:xfrm>
-          <a:prstGeom prst="rect">
-            <a:avLst/>
-          </a:prstGeom>
-          <a:solidFill>
-            <a:schemeClr val="bg1"/>
-          </a:solidFill>
-          <a:ln w="6350">
-            <a:noFill/>
-          </a:ln>
-        </p:spPr>
-        <p:style>
-          <a:lnRef idx="2">
-            <a:schemeClr val="accent1">
-              <a:shade val="50000"/>
-            </a:schemeClr>
-          </a:lnRef>
-          <a:fillRef idx="1">
-            <a:schemeClr val="accent1"/>
-          </a:fillRef>
-          <a:effectRef idx="0">
-            <a:schemeClr val="accent1"/>
-          </a:effectRef>
-          <a:fontRef idx="minor">
-            <a:schemeClr val="lt1"/>
-          </a:fontRef>
-        </p:style>
-        <p:txBody>
-          <a:bodyPr rtlCol="0" anchor="ctr"/>
-          <a:lstStyle/>
-          <a:p>
-            <a:pPr algn="ctr"/>
-            <a:r>
-              <a:rPr lang="en-US" dirty="0" smtClean="0"/>
-              <a:t>PeptideShaker Overview</a:t>
-            </a:r>
-          </a:p>
-        </p:txBody>
-      </p:sp>
-      <p:pic>
-        <p:nvPicPr>
-          <p:cNvPr id="21" name="Picture 2"/>
-          <p:cNvPicPr>
-            <a:picLocks noChangeAspect="1" noChangeArrowheads="1"/>
-          </p:cNvPicPr>
-          <p:nvPr/>
-        </p:nvPicPr>
-        <p:blipFill>
-          <a:blip r:embed="rId2" cstate="print"/>
-          <a:srcRect/>
-          <a:stretch>
-            <a:fillRect/>
-          </a:stretch>
-        </p:blipFill>
-        <p:spPr bwMode="auto">
-          <a:xfrm>
-            <a:off x="2275200" y="2073600"/>
-            <a:ext cx="3657600" cy="2209800"/>
-          </a:xfrm>
-          <a:prstGeom prst="rect">
-            <a:avLst/>
-          </a:prstGeom>
-          <a:noFill/>
-          <a:ln w="3175">
-            <a:solidFill>
-              <a:schemeClr val="bg1">
-                <a:lumMod val="85000"/>
-              </a:schemeClr>
-            </a:solidFill>
-            <a:miter lim="800000"/>
-            <a:headEnd/>
-            <a:tailEnd/>
-          </a:ln>
-          <a:effectLst>
-            <a:outerShdw blurRad="50800" dist="38100" dir="2700000" algn="tl" rotWithShape="0">
-              <a:prstClr val="black">
-                <a:alpha val="40000"/>
-              </a:prstClr>
-            </a:outerShdw>
-          </a:effectLst>
-        </p:spPr>
-      </p:pic>
-      <p:sp>
-        <p:nvSpPr>
-          <p:cNvPr id="22" name="Freeform 21"/>
-          <p:cNvSpPr/>
-          <p:nvPr/>
-        </p:nvSpPr>
-        <p:spPr>
-          <a:xfrm>
-            <a:off x="2288380" y="2178051"/>
-            <a:ext cx="1086644" cy="1345405"/>
-          </a:xfrm>
-          <a:custGeom>
-            <a:avLst/>
-            <a:gdLst>
-              <a:gd name="connsiteX0" fmla="*/ 0 w 966788"/>
-              <a:gd name="connsiteY0" fmla="*/ 0 h 1012031"/>
-              <a:gd name="connsiteX1" fmla="*/ 119063 w 966788"/>
-              <a:gd name="connsiteY1" fmla="*/ 1012031 h 1012031"/>
-              <a:gd name="connsiteX2" fmla="*/ 966788 w 966788"/>
-              <a:gd name="connsiteY2" fmla="*/ 285750 h 1012031"/>
-              <a:gd name="connsiteX3" fmla="*/ 88107 w 966788"/>
-              <a:gd name="connsiteY3" fmla="*/ 0 h 1012031"/>
-              <a:gd name="connsiteX4" fmla="*/ 0 w 966788"/>
-              <a:gd name="connsiteY4" fmla="*/ 0 h 1012031"/>
-              <a:gd name="connsiteX0" fmla="*/ 0 w 919163"/>
-              <a:gd name="connsiteY0" fmla="*/ 0 h 1012031"/>
-              <a:gd name="connsiteX1" fmla="*/ 119063 w 919163"/>
-              <a:gd name="connsiteY1" fmla="*/ 1012031 h 1012031"/>
-              <a:gd name="connsiteX2" fmla="*/ 919163 w 919163"/>
-              <a:gd name="connsiteY2" fmla="*/ 328613 h 1012031"/>
-              <a:gd name="connsiteX3" fmla="*/ 88107 w 919163"/>
-              <a:gd name="connsiteY3" fmla="*/ 0 h 1012031"/>
-              <a:gd name="connsiteX4" fmla="*/ 0 w 919163"/>
-              <a:gd name="connsiteY4" fmla="*/ 0 h 1012031"/>
-              <a:gd name="connsiteX0" fmla="*/ 0 w 893763"/>
-              <a:gd name="connsiteY0" fmla="*/ 0 h 1012031"/>
-              <a:gd name="connsiteX1" fmla="*/ 119063 w 893763"/>
-              <a:gd name="connsiteY1" fmla="*/ 1012031 h 1012031"/>
-              <a:gd name="connsiteX2" fmla="*/ 893763 w 893763"/>
-              <a:gd name="connsiteY2" fmla="*/ 366713 h 1012031"/>
-              <a:gd name="connsiteX3" fmla="*/ 88107 w 893763"/>
-              <a:gd name="connsiteY3" fmla="*/ 0 h 1012031"/>
-              <a:gd name="connsiteX4" fmla="*/ 0 w 893763"/>
-              <a:gd name="connsiteY4" fmla="*/ 0 h 1012031"/>
-              <a:gd name="connsiteX0" fmla="*/ 0 w 1050925"/>
-              <a:gd name="connsiteY0" fmla="*/ 0 h 1012031"/>
-              <a:gd name="connsiteX1" fmla="*/ 119063 w 1050925"/>
-              <a:gd name="connsiteY1" fmla="*/ 1012031 h 1012031"/>
-              <a:gd name="connsiteX2" fmla="*/ 1050925 w 1050925"/>
-              <a:gd name="connsiteY2" fmla="*/ 226220 h 1012031"/>
-              <a:gd name="connsiteX3" fmla="*/ 88107 w 1050925"/>
-              <a:gd name="connsiteY3" fmla="*/ 0 h 1012031"/>
-              <a:gd name="connsiteX4" fmla="*/ 0 w 1050925"/>
-              <a:gd name="connsiteY4" fmla="*/ 0 h 1012031"/>
-              <a:gd name="connsiteX0" fmla="*/ 0 w 1050925"/>
-              <a:gd name="connsiteY0" fmla="*/ 0 h 1343024"/>
-              <a:gd name="connsiteX1" fmla="*/ 40482 w 1050925"/>
-              <a:gd name="connsiteY1" fmla="*/ 1343024 h 1343024"/>
-              <a:gd name="connsiteX2" fmla="*/ 1050925 w 1050925"/>
-              <a:gd name="connsiteY2" fmla="*/ 226220 h 1343024"/>
-              <a:gd name="connsiteX3" fmla="*/ 88107 w 1050925"/>
-              <a:gd name="connsiteY3" fmla="*/ 0 h 1343024"/>
-              <a:gd name="connsiteX4" fmla="*/ 0 w 1050925"/>
-              <a:gd name="connsiteY4" fmla="*/ 0 h 1343024"/>
-              <a:gd name="connsiteX0" fmla="*/ 0 w 1096169"/>
-              <a:gd name="connsiteY0" fmla="*/ 0 h 1343024"/>
-              <a:gd name="connsiteX1" fmla="*/ 40482 w 1096169"/>
-              <a:gd name="connsiteY1" fmla="*/ 1343024 h 1343024"/>
-              <a:gd name="connsiteX2" fmla="*/ 1096169 w 1096169"/>
-              <a:gd name="connsiteY2" fmla="*/ 219076 h 1343024"/>
-              <a:gd name="connsiteX3" fmla="*/ 88107 w 1096169"/>
-              <a:gd name="connsiteY3" fmla="*/ 0 h 1343024"/>
-              <a:gd name="connsiteX4" fmla="*/ 0 w 1096169"/>
-              <a:gd name="connsiteY4" fmla="*/ 0 h 1343024"/>
-              <a:gd name="connsiteX0" fmla="*/ 0 w 1096169"/>
-              <a:gd name="connsiteY0" fmla="*/ 0 h 1350167"/>
-              <a:gd name="connsiteX1" fmla="*/ 50007 w 1096169"/>
-              <a:gd name="connsiteY1" fmla="*/ 1350167 h 1350167"/>
-              <a:gd name="connsiteX2" fmla="*/ 1096169 w 1096169"/>
-              <a:gd name="connsiteY2" fmla="*/ 219076 h 1350167"/>
-              <a:gd name="connsiteX3" fmla="*/ 88107 w 1096169"/>
-              <a:gd name="connsiteY3" fmla="*/ 0 h 1350167"/>
-              <a:gd name="connsiteX4" fmla="*/ 0 w 1096169"/>
-              <a:gd name="connsiteY4" fmla="*/ 0 h 1350167"/>
-              <a:gd name="connsiteX0" fmla="*/ 0 w 1096169"/>
-              <a:gd name="connsiteY0" fmla="*/ 0 h 1345405"/>
-              <a:gd name="connsiteX1" fmla="*/ 64294 w 1096169"/>
-              <a:gd name="connsiteY1" fmla="*/ 1345405 h 1345405"/>
-              <a:gd name="connsiteX2" fmla="*/ 1096169 w 1096169"/>
-              <a:gd name="connsiteY2" fmla="*/ 219076 h 1345405"/>
-              <a:gd name="connsiteX3" fmla="*/ 88107 w 1096169"/>
-              <a:gd name="connsiteY3" fmla="*/ 0 h 1345405"/>
-              <a:gd name="connsiteX4" fmla="*/ 0 w 1096169"/>
-              <a:gd name="connsiteY4" fmla="*/ 0 h 1345405"/>
-              <a:gd name="connsiteX0" fmla="*/ 0 w 1096169"/>
-              <a:gd name="connsiteY0" fmla="*/ 0 h 1345405"/>
-              <a:gd name="connsiteX1" fmla="*/ 64294 w 1096169"/>
-              <a:gd name="connsiteY1" fmla="*/ 1345405 h 1345405"/>
-              <a:gd name="connsiteX2" fmla="*/ 1096169 w 1096169"/>
-              <a:gd name="connsiteY2" fmla="*/ 219076 h 1345405"/>
-              <a:gd name="connsiteX3" fmla="*/ 80963 w 1096169"/>
-              <a:gd name="connsiteY3" fmla="*/ 0 h 1345405"/>
-              <a:gd name="connsiteX4" fmla="*/ 0 w 1096169"/>
-              <a:gd name="connsiteY4" fmla="*/ 0 h 1345405"/>
-              <a:gd name="connsiteX0" fmla="*/ 0 w 1086644"/>
-              <a:gd name="connsiteY0" fmla="*/ 0 h 1345405"/>
-              <a:gd name="connsiteX1" fmla="*/ 64294 w 1086644"/>
-              <a:gd name="connsiteY1" fmla="*/ 1345405 h 1345405"/>
-              <a:gd name="connsiteX2" fmla="*/ 1086644 w 1086644"/>
-              <a:gd name="connsiteY2" fmla="*/ 219076 h 1345405"/>
-              <a:gd name="connsiteX3" fmla="*/ 80963 w 1086644"/>
-              <a:gd name="connsiteY3" fmla="*/ 0 h 1345405"/>
-              <a:gd name="connsiteX4" fmla="*/ 0 w 1086644"/>
-              <a:gd name="connsiteY4" fmla="*/ 0 h 1345405"/>
-            </a:gdLst>
-            <a:ahLst/>
-            <a:cxnLst>
-              <a:cxn ang="0">
-                <a:pos x="connsiteX0" y="connsiteY0"/>
-              </a:cxn>
-              <a:cxn ang="0">
-                <a:pos x="connsiteX1" y="connsiteY1"/>
-              </a:cxn>
-              <a:cxn ang="0">
-                <a:pos x="connsiteX2" y="connsiteY2"/>
-              </a:cxn>
-              <a:cxn ang="0">
-                <a:pos x="connsiteX3" y="connsiteY3"/>
-              </a:cxn>
-              <a:cxn ang="0">
-                <a:pos x="connsiteX4" y="connsiteY4"/>
-              </a:cxn>
-            </a:cxnLst>
-            <a:rect l="l" t="t" r="r" b="b"/>
-            <a:pathLst>
-              <a:path w="1086644" h="1345405">
-                <a:moveTo>
-                  <a:pt x="0" y="0"/>
-                </a:moveTo>
-                <a:lnTo>
-                  <a:pt x="64294" y="1345405"/>
-                </a:lnTo>
-                <a:lnTo>
-                  <a:pt x="1086644" y="219076"/>
-                </a:lnTo>
-                <a:lnTo>
-                  <a:pt x="80963" y="0"/>
-                </a:lnTo>
-                <a:lnTo>
-                  <a:pt x="0" y="0"/>
-                </a:lnTo>
-                <a:close/>
-              </a:path>
-            </a:pathLst>
-          </a:custGeom>
-          <a:solidFill>
-            <a:schemeClr val="accent6">
-              <a:alpha val="75000"/>
-            </a:schemeClr>
-          </a:solidFill>
-          <a:ln w="3175">
-            <a:solidFill>
-              <a:schemeClr val="bg1">
-                <a:lumMod val="65000"/>
-              </a:schemeClr>
-            </a:solidFill>
-          </a:ln>
-        </p:spPr>
-        <p:style>
-          <a:lnRef idx="2">
-            <a:schemeClr val="accent1">
-              <a:shade val="50000"/>
-            </a:schemeClr>
-          </a:lnRef>
-          <a:fillRef idx="1">
-            <a:schemeClr val="accent1"/>
-          </a:fillRef>
-          <a:effectRef idx="0">
-            <a:schemeClr val="accent1"/>
-          </a:effectRef>
-          <a:fontRef idx="minor">
-            <a:schemeClr val="lt1"/>
-          </a:fontRef>
-        </p:style>
-        <p:txBody>
-          <a:bodyPr rtlCol="0" anchor="ctr"/>
-          <a:lstStyle/>
-          <a:p>
-            <a:pPr algn="ctr"/>
-            <a:endParaRPr lang="en-US"/>
-          </a:p>
-        </p:txBody>
-      </p:sp>
-      <p:pic>
-        <p:nvPicPr>
-          <p:cNvPr id="23" name="Picture 3"/>
-          <p:cNvPicPr>
-            <a:picLocks noChangeAspect="1" noChangeArrowheads="1"/>
-          </p:cNvPicPr>
-          <p:nvPr/>
-        </p:nvPicPr>
-        <p:blipFill>
-          <a:blip r:embed="rId3" cstate="print"/>
-          <a:srcRect l="150" t="1586" r="89108" b="78877"/>
-          <a:stretch>
-            <a:fillRect/>
-          </a:stretch>
-        </p:blipFill>
-        <p:spPr bwMode="auto">
-          <a:xfrm>
-            <a:off x="2355056" y="2398554"/>
-            <a:ext cx="1021557" cy="1122521"/>
-          </a:xfrm>
-          <a:prstGeom prst="rect">
-            <a:avLst/>
-          </a:prstGeom>
-          <a:noFill/>
-          <a:ln w="9525">
-            <a:noFill/>
-            <a:miter lim="800000"/>
-            <a:headEnd/>
-            <a:tailEnd/>
-          </a:ln>
-          <a:effectLst>
-            <a:outerShdw blurRad="50800" dist="38100" dir="2700000" algn="tl" rotWithShape="0">
-              <a:prstClr val="black">
-                <a:alpha val="40000"/>
-              </a:prstClr>
-            </a:outerShdw>
-          </a:effectLst>
-        </p:spPr>
-      </p:pic>
-      <p:sp>
-        <p:nvSpPr>
-          <p:cNvPr id="8" name="TextBox 7"/>
-          <p:cNvSpPr txBox="1"/>
-          <p:nvPr/>
-        </p:nvSpPr>
-        <p:spPr>
-          <a:xfrm>
-            <a:off x="1475656" y="1556792"/>
-            <a:ext cx="2984600" cy="338554"/>
-          </a:xfrm>
-          <a:prstGeom prst="rect">
-            <a:avLst/>
-          </a:prstGeom>
-          <a:solidFill>
-            <a:schemeClr val="accent6"/>
-          </a:solidFill>
-          <a:ln>
-            <a:noFill/>
-          </a:ln>
-          <a:effectLst>
-            <a:outerShdw blurRad="50800" dist="38100" dir="2700000" algn="tl" rotWithShape="0">
-              <a:prstClr val="black">
-                <a:alpha val="40000"/>
-              </a:prstClr>
-            </a:outerShdw>
-          </a:effectLst>
-        </p:spPr>
-        <p:txBody>
-          <a:bodyPr wrap="none" rtlCol="0">
-            <a:spAutoFit/>
-          </a:bodyPr>
-          <a:lstStyle/>
-          <a:p>
-            <a:r>
-              <a:rPr lang="en-US" sz="1600" b="1" dirty="0" smtClean="0">
-                <a:solidFill>
-                  <a:schemeClr val="bg1"/>
-                </a:solidFill>
-              </a:rPr>
-              <a:t>Straightforward export to PRIDE!</a:t>
-            </a:r>
-            <a:endParaRPr lang="en-US" sz="1600" b="1" dirty="0">
-              <a:solidFill>
-                <a:schemeClr val="bg1"/>
-              </a:solidFill>
-            </a:endParaRPr>
-          </a:p>
-        </p:txBody>
-      </p:sp>
-      <p:pic>
-        <p:nvPicPr>
-          <p:cNvPr id="3075" name="Picture 3"/>
-          <p:cNvPicPr>
-            <a:picLocks noChangeAspect="1" noChangeArrowheads="1"/>
-          </p:cNvPicPr>
-          <p:nvPr/>
-        </p:nvPicPr>
-        <p:blipFill>
-          <a:blip r:embed="rId4" cstate="print"/>
-          <a:srcRect/>
-          <a:stretch>
-            <a:fillRect/>
-          </a:stretch>
-        </p:blipFill>
-        <p:spPr bwMode="auto">
-          <a:xfrm>
-            <a:off x="4345780" y="2720183"/>
-            <a:ext cx="1680210" cy="1217295"/>
-          </a:xfrm>
-          <a:prstGeom prst="rect">
-            <a:avLst/>
-          </a:prstGeom>
-          <a:noFill/>
-          <a:ln w="9525">
-            <a:noFill/>
-            <a:miter lim="800000"/>
-            <a:headEnd/>
-            <a:tailEnd/>
-          </a:ln>
-          <a:effectLst>
-            <a:outerShdw blurRad="50800" dist="38100" dir="2700000" algn="tl" rotWithShape="0">
-              <a:prstClr val="black">
-                <a:alpha val="40000"/>
-              </a:prstClr>
-            </a:outerShdw>
-          </a:effectLst>
-        </p:spPr>
-      </p:pic>
-      <p:grpSp>
-        <p:nvGrpSpPr>
-          <p:cNvPr id="25" name="Group 24"/>
-          <p:cNvGrpSpPr>
-            <a:grpSpLocks noChangeAspect="1"/>
-          </p:cNvGrpSpPr>
-          <p:nvPr/>
-        </p:nvGrpSpPr>
-        <p:grpSpPr>
-          <a:xfrm>
-            <a:off x="5867400" y="1496607"/>
-            <a:ext cx="742854" cy="524099"/>
-            <a:chOff x="5057775" y="2350294"/>
-            <a:chExt cx="3493294" cy="2464594"/>
-          </a:xfrm>
-          <a:effectLst/>
-        </p:grpSpPr>
-        <p:sp>
-          <p:nvSpPr>
-            <p:cNvPr id="26" name="Rectangle 25"/>
-            <p:cNvSpPr/>
-            <p:nvPr/>
-          </p:nvSpPr>
-          <p:spPr>
-            <a:xfrm>
-              <a:off x="5057775" y="2350294"/>
-              <a:ext cx="3493294" cy="2464594"/>
-            </a:xfrm>
-            <a:prstGeom prst="rect">
-              <a:avLst/>
-            </a:prstGeom>
-            <a:solidFill>
-              <a:schemeClr val="bg1"/>
-            </a:solidFill>
-            <a:ln w="3175" cmpd="sng">
-              <a:noFill/>
-            </a:ln>
-          </p:spPr>
-          <p:style>
-            <a:lnRef idx="2">
-              <a:schemeClr val="accent1">
-                <a:shade val="50000"/>
-              </a:schemeClr>
-            </a:lnRef>
-            <a:fillRef idx="1">
-              <a:schemeClr val="accent1"/>
-            </a:fillRef>
-            <a:effectRef idx="0">
-              <a:schemeClr val="accent1"/>
-            </a:effectRef>
-            <a:fontRef idx="minor">
-              <a:schemeClr val="lt1"/>
-            </a:fontRef>
-          </p:style>
-          <p:txBody>
-            <a:bodyPr rtlCol="0" anchor="ctr"/>
-            <a:lstStyle/>
-            <a:p>
-              <a:pPr algn="ctr"/>
-              <a:endParaRPr lang="en-US"/>
-            </a:p>
-          </p:txBody>
-        </p:sp>
-        <p:pic>
-          <p:nvPicPr>
-            <p:cNvPr id="27" name="Picture 4" descr="http://www.ebi.ac.uk/pride/images/pride_logo.jpg">
-              <a:hlinkClick r:id="rId5"/>
-            </p:cNvPr>
-            <p:cNvPicPr>
-              <a:picLocks noChangeAspect="1" noChangeArrowheads="1"/>
-            </p:cNvPicPr>
-            <p:nvPr/>
-          </p:nvPicPr>
-          <p:blipFill>
-            <a:blip r:embed="rId6" cstate="print"/>
-            <a:srcRect/>
-            <a:stretch>
-              <a:fillRect/>
-            </a:stretch>
-          </p:blipFill>
-          <p:spPr bwMode="auto">
-            <a:xfrm>
-              <a:off x="5336078" y="2571264"/>
-              <a:ext cx="2882046" cy="1921364"/>
-            </a:xfrm>
-            <a:prstGeom prst="rect">
-              <a:avLst/>
-            </a:prstGeom>
-            <a:noFill/>
-            <a:ln w="3175" cmpd="sng">
-              <a:noFill/>
-              <a:prstDash val="solid"/>
-            </a:ln>
-            <a:effectLst/>
-          </p:spPr>
-        </p:pic>
-      </p:grpSp>
-      <p:sp>
-        <p:nvSpPr>
-          <p:cNvPr id="17" name="Right Arrow 16"/>
-          <p:cNvSpPr/>
-          <p:nvPr/>
-        </p:nvSpPr>
-        <p:spPr>
-          <a:xfrm>
-            <a:off x="3113877" y="2863852"/>
-            <a:ext cx="1281114" cy="889200"/>
-          </a:xfrm>
-          <a:prstGeom prst="rightArrow">
-            <a:avLst/>
-          </a:prstGeom>
-          <a:solidFill>
-            <a:schemeClr val="accent6"/>
-          </a:solidFill>
-          <a:ln>
-            <a:noFill/>
-          </a:ln>
-          <a:effectLst>
-            <a:outerShdw blurRad="50800" dist="38100" dir="2700000" algn="tl" rotWithShape="0">
-              <a:prstClr val="black">
-                <a:alpha val="40000"/>
-              </a:prstClr>
-            </a:outerShdw>
-          </a:effectLst>
-        </p:spPr>
-        <p:style>
-          <a:lnRef idx="2">
-            <a:schemeClr val="accent1">
-              <a:shade val="50000"/>
-            </a:schemeClr>
-          </a:lnRef>
-          <a:fillRef idx="1">
-            <a:schemeClr val="accent1"/>
-          </a:fillRef>
-          <a:effectRef idx="0">
-            <a:schemeClr val="accent1"/>
-          </a:effectRef>
-          <a:fontRef idx="minor">
-            <a:schemeClr val="lt1"/>
-          </a:fontRef>
-        </p:style>
-        <p:txBody>
-          <a:bodyPr rtlCol="0" anchor="ctr"/>
-          <a:lstStyle/>
-          <a:p>
-            <a:pPr algn="ctr"/>
-            <a:r>
-              <a:rPr lang="en-US" sz="1400" dirty="0" smtClean="0"/>
-              <a:t>PRIDE Export</a:t>
-            </a:r>
-            <a:endParaRPr lang="en-US" sz="1400" dirty="0"/>
-          </a:p>
-        </p:txBody>
-      </p:sp>
-    </p:spTree>
-  </p:cSld>
-  <p:clrMapOvr>
-    <a:masterClrMapping/>
-  </p:clrMapOvr>
-  <p:timing>
-    <p:tnLst>
-      <p:par>
-        <p:cTn id="1" dur="indefinite" restart="never" nodeType="tmRoot">
-          <p:childTnLst>
-            <p:seq concurrent="1" nextAc="seek">
-              <p:cTn id="2" dur="indefinite" nodeType="mainSeq">
-                <p:childTnLst>
-                  <p:par>
-                    <p:cTn id="3" fill="hold">
-                      <p:stCondLst>
-                        <p:cond delay="indefinite"/>
-                        <p:cond evt="onBegin" delay="0">
-                          <p:tn val="2"/>
-                        </p:cond>
-                      </p:stCondLst>
-                      <p:childTnLst>
-                        <p:par>
-                          <p:cTn id="4" fill="hold">
-                            <p:stCondLst>
-                              <p:cond delay="0"/>
-                            </p:stCondLst>
-                            <p:childTnLst>
-                              <p:par>
-                                <p:cTn id="5" presetID="1" presetClass="entr" presetSubtype="0" fill="hold" nodeType="withEffect">
-                                  <p:stCondLst>
-                                    <p:cond delay="0"/>
-                                  </p:stCondLst>
-                                  <p:childTnLst>
-                                    <p:set>
-                                      <p:cBhvr>
-                                        <p:cTn id="6" dur="1" fill="hold">
-                                          <p:stCondLst>
-                                            <p:cond delay="0"/>
-                                          </p:stCondLst>
-                                        </p:cTn>
-                                        <p:tgtEl>
-                                          <p:spTgt spid="25"/>
-                                        </p:tgtEl>
-                                        <p:attrNameLst>
-                                          <p:attrName>style.visibility</p:attrName>
-                                        </p:attrNameLst>
-                                      </p:cBhvr>
-                                      <p:to>
-                                        <p:strVal val="visible"/>
-                                      </p:to>
-                                    </p:set>
-                                  </p:childTnLst>
-                                </p:cTn>
-                              </p:par>
-                            </p:childTnLst>
-                          </p:cTn>
-                        </p:par>
-                      </p:childTnLst>
-                    </p:cTn>
-                  </p:par>
-                </p:childTnLst>
-              </p:cTn>
-              <p:prevCondLst>
-                <p:cond evt="onPrev" delay="0">
-                  <p:tgtEl>
-                    <p:sldTgt/>
-                  </p:tgtEl>
-                </p:cond>
-              </p:prevCondLst>
-              <p:nextCondLst>
-                <p:cond evt="onNext" delay="0">
-                  <p:tgtEl>
-                    <p:sldTgt/>
-                  </p:tgtEl>
-                </p:cond>
-              </p:nextCondLst>
-            </p:seq>
-          </p:childTnLst>
-        </p:cTn>
       </p:par>
     </p:tnLst>
   </p:timing>

</xml_diff>

<commit_message>
Minor change to one of the getting started slides.
</commit_message>
<xml_diff>
--- a/wiki/getting_started/getting_started.pptx
+++ b/wiki/getting_started/getting_started.pptx
@@ -301,7 +301,7 @@
             <a:fld id="{925377B3-2828-421F-BFC8-72289DEFFBB5}" type="datetimeFigureOut">
               <a:rPr lang="en-US" smtClean="0"/>
               <a:pPr/>
-              <a:t>8/30/2013</a:t>
+              <a:t>10/15/2013</a:t>
             </a:fld>
             <a:endParaRPr lang="en-US"/>
           </a:p>
@@ -468,7 +468,7 @@
             <a:fld id="{925377B3-2828-421F-BFC8-72289DEFFBB5}" type="datetimeFigureOut">
               <a:rPr lang="en-US" smtClean="0"/>
               <a:pPr/>
-              <a:t>8/30/2013</a:t>
+              <a:t>10/15/2013</a:t>
             </a:fld>
             <a:endParaRPr lang="en-US"/>
           </a:p>
@@ -645,7 +645,7 @@
             <a:fld id="{925377B3-2828-421F-BFC8-72289DEFFBB5}" type="datetimeFigureOut">
               <a:rPr lang="en-US" smtClean="0"/>
               <a:pPr/>
-              <a:t>8/30/2013</a:t>
+              <a:t>10/15/2013</a:t>
             </a:fld>
             <a:endParaRPr lang="en-US"/>
           </a:p>
@@ -812,7 +812,7 @@
             <a:fld id="{925377B3-2828-421F-BFC8-72289DEFFBB5}" type="datetimeFigureOut">
               <a:rPr lang="en-US" smtClean="0"/>
               <a:pPr/>
-              <a:t>8/30/2013</a:t>
+              <a:t>10/15/2013</a:t>
             </a:fld>
             <a:endParaRPr lang="en-US"/>
           </a:p>
@@ -1055,7 +1055,7 @@
             <a:fld id="{925377B3-2828-421F-BFC8-72289DEFFBB5}" type="datetimeFigureOut">
               <a:rPr lang="en-US" smtClean="0"/>
               <a:pPr/>
-              <a:t>8/30/2013</a:t>
+              <a:t>10/15/2013</a:t>
             </a:fld>
             <a:endParaRPr lang="en-US"/>
           </a:p>
@@ -1340,7 +1340,7 @@
             <a:fld id="{925377B3-2828-421F-BFC8-72289DEFFBB5}" type="datetimeFigureOut">
               <a:rPr lang="en-US" smtClean="0"/>
               <a:pPr/>
-              <a:t>8/30/2013</a:t>
+              <a:t>10/15/2013</a:t>
             </a:fld>
             <a:endParaRPr lang="en-US"/>
           </a:p>
@@ -1759,7 +1759,7 @@
             <a:fld id="{925377B3-2828-421F-BFC8-72289DEFFBB5}" type="datetimeFigureOut">
               <a:rPr lang="en-US" smtClean="0"/>
               <a:pPr/>
-              <a:t>8/30/2013</a:t>
+              <a:t>10/15/2013</a:t>
             </a:fld>
             <a:endParaRPr lang="en-US"/>
           </a:p>
@@ -1874,7 +1874,7 @@
             <a:fld id="{925377B3-2828-421F-BFC8-72289DEFFBB5}" type="datetimeFigureOut">
               <a:rPr lang="en-US" smtClean="0"/>
               <a:pPr/>
-              <a:t>8/30/2013</a:t>
+              <a:t>10/15/2013</a:t>
             </a:fld>
             <a:endParaRPr lang="en-US"/>
           </a:p>
@@ -1966,7 +1966,7 @@
             <a:fld id="{925377B3-2828-421F-BFC8-72289DEFFBB5}" type="datetimeFigureOut">
               <a:rPr lang="en-US" smtClean="0"/>
               <a:pPr/>
-              <a:t>8/30/2013</a:t>
+              <a:t>10/15/2013</a:t>
             </a:fld>
             <a:endParaRPr lang="en-US"/>
           </a:p>
@@ -2240,7 +2240,7 @@
             <a:fld id="{925377B3-2828-421F-BFC8-72289DEFFBB5}" type="datetimeFigureOut">
               <a:rPr lang="en-US" smtClean="0"/>
               <a:pPr/>
-              <a:t>8/30/2013</a:t>
+              <a:t>10/15/2013</a:t>
             </a:fld>
             <a:endParaRPr lang="en-US"/>
           </a:p>
@@ -2490,7 +2490,7 @@
             <a:fld id="{925377B3-2828-421F-BFC8-72289DEFFBB5}" type="datetimeFigureOut">
               <a:rPr lang="en-US" smtClean="0"/>
               <a:pPr/>
-              <a:t>8/30/2013</a:t>
+              <a:t>10/15/2013</a:t>
             </a:fld>
             <a:endParaRPr lang="en-US"/>
           </a:p>
@@ -2700,7 +2700,7 @@
             <a:fld id="{925377B3-2828-421F-BFC8-72289DEFFBB5}" type="datetimeFigureOut">
               <a:rPr lang="en-US" smtClean="0"/>
               <a:pPr/>
-              <a:t>8/30/2013</a:t>
+              <a:t>10/15/2013</a:t>
             </a:fld>
             <a:endParaRPr lang="en-US"/>
           </a:p>
@@ -4332,7 +4332,23 @@
                   <a:schemeClr val="bg1"/>
                 </a:solidFill>
               </a:rPr>
-              <a:t>Find the wanted project …</a:t>
+              <a:t>Find the </a:t>
+            </a:r>
+            <a:r>
+              <a:rPr lang="en-US" sz="1400" dirty="0" smtClean="0">
+                <a:solidFill>
+                  <a:schemeClr val="bg1"/>
+                </a:solidFill>
+              </a:rPr>
+              <a:t>desired </a:t>
+            </a:r>
+            <a:r>
+              <a:rPr lang="en-US" sz="1400" dirty="0" smtClean="0">
+                <a:solidFill>
+                  <a:schemeClr val="bg1"/>
+                </a:solidFill>
+              </a:rPr>
+              <a:t>project …</a:t>
             </a:r>
             <a:endParaRPr lang="en-US" sz="1400" dirty="0">
               <a:solidFill>

</xml_diff>

<commit_message>
Updated the getting started slides where MS-GF+ is now also mentioned. Updated chapter 1.3 to include MS-GF+.
</commit_message>
<xml_diff>
--- a/wiki/getting_started/getting_started.pptx
+++ b/wiki/getting_started/getting_started.pptx
@@ -301,7 +301,7 @@
             <a:fld id="{925377B3-2828-421F-BFC8-72289DEFFBB5}" type="datetimeFigureOut">
               <a:rPr lang="en-US" smtClean="0"/>
               <a:pPr/>
-              <a:t>10/15/2013</a:t>
+              <a:t>3/28/2014</a:t>
             </a:fld>
             <a:endParaRPr lang="en-US"/>
           </a:p>
@@ -468,7 +468,7 @@
             <a:fld id="{925377B3-2828-421F-BFC8-72289DEFFBB5}" type="datetimeFigureOut">
               <a:rPr lang="en-US" smtClean="0"/>
               <a:pPr/>
-              <a:t>10/15/2013</a:t>
+              <a:t>3/28/2014</a:t>
             </a:fld>
             <a:endParaRPr lang="en-US"/>
           </a:p>
@@ -645,7 +645,7 @@
             <a:fld id="{925377B3-2828-421F-BFC8-72289DEFFBB5}" type="datetimeFigureOut">
               <a:rPr lang="en-US" smtClean="0"/>
               <a:pPr/>
-              <a:t>10/15/2013</a:t>
+              <a:t>3/28/2014</a:t>
             </a:fld>
             <a:endParaRPr lang="en-US"/>
           </a:p>
@@ -812,7 +812,7 @@
             <a:fld id="{925377B3-2828-421F-BFC8-72289DEFFBB5}" type="datetimeFigureOut">
               <a:rPr lang="en-US" smtClean="0"/>
               <a:pPr/>
-              <a:t>10/15/2013</a:t>
+              <a:t>3/28/2014</a:t>
             </a:fld>
             <a:endParaRPr lang="en-US"/>
           </a:p>
@@ -1055,7 +1055,7 @@
             <a:fld id="{925377B3-2828-421F-BFC8-72289DEFFBB5}" type="datetimeFigureOut">
               <a:rPr lang="en-US" smtClean="0"/>
               <a:pPr/>
-              <a:t>10/15/2013</a:t>
+              <a:t>3/28/2014</a:t>
             </a:fld>
             <a:endParaRPr lang="en-US"/>
           </a:p>
@@ -1340,7 +1340,7 @@
             <a:fld id="{925377B3-2828-421F-BFC8-72289DEFFBB5}" type="datetimeFigureOut">
               <a:rPr lang="en-US" smtClean="0"/>
               <a:pPr/>
-              <a:t>10/15/2013</a:t>
+              <a:t>3/28/2014</a:t>
             </a:fld>
             <a:endParaRPr lang="en-US"/>
           </a:p>
@@ -1759,7 +1759,7 @@
             <a:fld id="{925377B3-2828-421F-BFC8-72289DEFFBB5}" type="datetimeFigureOut">
               <a:rPr lang="en-US" smtClean="0"/>
               <a:pPr/>
-              <a:t>10/15/2013</a:t>
+              <a:t>3/28/2014</a:t>
             </a:fld>
             <a:endParaRPr lang="en-US"/>
           </a:p>
@@ -1874,7 +1874,7 @@
             <a:fld id="{925377B3-2828-421F-BFC8-72289DEFFBB5}" type="datetimeFigureOut">
               <a:rPr lang="en-US" smtClean="0"/>
               <a:pPr/>
-              <a:t>10/15/2013</a:t>
+              <a:t>3/28/2014</a:t>
             </a:fld>
             <a:endParaRPr lang="en-US"/>
           </a:p>
@@ -1966,7 +1966,7 @@
             <a:fld id="{925377B3-2828-421F-BFC8-72289DEFFBB5}" type="datetimeFigureOut">
               <a:rPr lang="en-US" smtClean="0"/>
               <a:pPr/>
-              <a:t>10/15/2013</a:t>
+              <a:t>3/28/2014</a:t>
             </a:fld>
             <a:endParaRPr lang="en-US"/>
           </a:p>
@@ -2240,7 +2240,7 @@
             <a:fld id="{925377B3-2828-421F-BFC8-72289DEFFBB5}" type="datetimeFigureOut">
               <a:rPr lang="en-US" smtClean="0"/>
               <a:pPr/>
-              <a:t>10/15/2013</a:t>
+              <a:t>3/28/2014</a:t>
             </a:fld>
             <a:endParaRPr lang="en-US"/>
           </a:p>
@@ -2490,7 +2490,7 @@
             <a:fld id="{925377B3-2828-421F-BFC8-72289DEFFBB5}" type="datetimeFigureOut">
               <a:rPr lang="en-US" smtClean="0"/>
               <a:pPr/>
-              <a:t>10/15/2013</a:t>
+              <a:t>3/28/2014</a:t>
             </a:fld>
             <a:endParaRPr lang="en-US"/>
           </a:p>
@@ -2700,7 +2700,7 @@
             <a:fld id="{925377B3-2828-421F-BFC8-72289DEFFBB5}" type="datetimeFigureOut">
               <a:rPr lang="en-US" smtClean="0"/>
               <a:pPr/>
-              <a:t>10/15/2013</a:t>
+              <a:t>3/28/2014</a:t>
             </a:fld>
             <a:endParaRPr lang="en-US"/>
           </a:p>
@@ -4332,23 +4332,7 @@
                   <a:schemeClr val="bg1"/>
                 </a:solidFill>
               </a:rPr>
-              <a:t>Find the </a:t>
-            </a:r>
-            <a:r>
-              <a:rPr lang="en-US" sz="1400" dirty="0" smtClean="0">
-                <a:solidFill>
-                  <a:schemeClr val="bg1"/>
-                </a:solidFill>
-              </a:rPr>
-              <a:t>desired </a:t>
-            </a:r>
-            <a:r>
-              <a:rPr lang="en-US" sz="1400" dirty="0" smtClean="0">
-                <a:solidFill>
-                  <a:schemeClr val="bg1"/>
-                </a:solidFill>
-              </a:rPr>
-              <a:t>project …</a:t>
+              <a:t>Find the desired project …</a:t>
             </a:r>
             <a:endParaRPr lang="en-US" sz="1400" dirty="0">
               <a:solidFill>
@@ -5262,62 +5246,9 @@
           </a:p>
         </p:txBody>
       </p:sp>
-      <p:sp>
-        <p:nvSpPr>
-          <p:cNvPr id="8" name="TextBox 7"/>
-          <p:cNvSpPr txBox="1"/>
-          <p:nvPr/>
-        </p:nvSpPr>
-        <p:spPr>
-          <a:xfrm>
-            <a:off x="1475656" y="1556792"/>
-            <a:ext cx="3623492" cy="338554"/>
-          </a:xfrm>
-          <a:prstGeom prst="rect">
-            <a:avLst/>
-          </a:prstGeom>
-          <a:solidFill>
-            <a:schemeClr val="accent6"/>
-          </a:solidFill>
-          <a:ln>
-            <a:noFill/>
-          </a:ln>
-          <a:effectLst>
-            <a:outerShdw blurRad="50800" dist="38100" dir="2700000" algn="tl" rotWithShape="0">
-              <a:prstClr val="black">
-                <a:alpha val="40000"/>
-              </a:prstClr>
-            </a:outerShdw>
-          </a:effectLst>
-        </p:spPr>
-        <p:txBody>
-          <a:bodyPr wrap="none" rtlCol="0">
-            <a:spAutoFit/>
-          </a:bodyPr>
-          <a:lstStyle/>
-          <a:p>
-            <a:r>
-              <a:rPr lang="en-US" sz="1600" b="1" dirty="0" smtClean="0">
-                <a:solidFill>
-                  <a:schemeClr val="bg1"/>
-                </a:solidFill>
-              </a:rPr>
-              <a:t>Use </a:t>
-            </a:r>
-            <a:r>
-              <a:rPr lang="en-US" sz="1600" b="1" dirty="0">
-                <a:solidFill>
-                  <a:schemeClr val="bg1"/>
-                </a:solidFill>
-              </a:rPr>
-              <a:t>SearchGUI to identify your spectra!</a:t>
-            </a:r>
-          </a:p>
-        </p:txBody>
-      </p:sp>
       <p:pic>
         <p:nvPicPr>
-          <p:cNvPr id="18439" name="Picture 7" descr="C:\Users\hba041\My_Applications\peptide-shaker\src\main\resources\icons\searchgui-medium-shadow.png"/>
+          <p:cNvPr id="2" name="Picture 2"/>
           <p:cNvPicPr>
             <a:picLocks noChangeAspect="1" noChangeArrowheads="1"/>
           </p:cNvPicPr>
@@ -5332,66 +5263,8 @@
         </p:blipFill>
         <p:spPr bwMode="auto">
           <a:xfrm>
-            <a:off x="5863430" y="1551779"/>
-            <a:ext cx="633932" cy="475449"/>
-          </a:xfrm>
-          <a:prstGeom prst="rect">
-            <a:avLst/>
-          </a:prstGeom>
-          <a:noFill/>
-        </p:spPr>
-      </p:pic>
-      <p:sp>
-        <p:nvSpPr>
-          <p:cNvPr id="26" name="TextBox 25"/>
-          <p:cNvSpPr txBox="1"/>
-          <p:nvPr/>
-        </p:nvSpPr>
-        <p:spPr>
-          <a:xfrm>
-            <a:off x="1693081" y="4357689"/>
-            <a:ext cx="1952779" cy="246221"/>
-          </a:xfrm>
-          <a:prstGeom prst="rect">
-            <a:avLst/>
-          </a:prstGeom>
-          <a:noFill/>
-        </p:spPr>
-        <p:txBody>
-          <a:bodyPr wrap="none" rtlCol="0">
-            <a:spAutoFit/>
-          </a:bodyPr>
-          <a:lstStyle/>
-          <a:p>
-            <a:r>
-              <a:rPr lang="en-US" sz="1000" dirty="0" smtClean="0">
-                <a:hlinkClick r:id="rId3"/>
-              </a:rPr>
-              <a:t>Click here to download SearchGUI</a:t>
-            </a:r>
-            <a:endParaRPr lang="en-US" sz="1000" dirty="0"/>
-          </a:p>
-        </p:txBody>
-      </p:sp>
-      <p:pic>
-        <p:nvPicPr>
-          <p:cNvPr id="1026" name="Picture 2"/>
-          <p:cNvPicPr>
-            <a:picLocks noChangeAspect="1" noChangeArrowheads="1"/>
-          </p:cNvPicPr>
-          <p:nvPr/>
-        </p:nvPicPr>
-        <p:blipFill>
-          <a:blip r:embed="rId4" cstate="print"/>
-          <a:srcRect/>
-          <a:stretch>
-            <a:fillRect/>
-          </a:stretch>
-        </p:blipFill>
-        <p:spPr bwMode="auto">
-          <a:xfrm>
-            <a:off x="1592263" y="2028827"/>
-            <a:ext cx="1785461" cy="1257491"/>
+            <a:off x="1628776" y="2009714"/>
+            <a:ext cx="1864518" cy="1406445"/>
           </a:xfrm>
           <a:prstGeom prst="rect">
             <a:avLst/>
@@ -5412,6 +5285,117 @@
           </a:effectLst>
         </p:spPr>
       </p:pic>
+      <p:sp>
+        <p:nvSpPr>
+          <p:cNvPr id="8" name="TextBox 7"/>
+          <p:cNvSpPr txBox="1"/>
+          <p:nvPr/>
+        </p:nvSpPr>
+        <p:spPr>
+          <a:xfrm>
+            <a:off x="1475656" y="1556792"/>
+            <a:ext cx="3623492" cy="338554"/>
+          </a:xfrm>
+          <a:prstGeom prst="rect">
+            <a:avLst/>
+          </a:prstGeom>
+          <a:solidFill>
+            <a:schemeClr val="accent6"/>
+          </a:solidFill>
+          <a:ln>
+            <a:noFill/>
+          </a:ln>
+          <a:effectLst>
+            <a:outerShdw blurRad="50800" dist="38100" dir="2700000" algn="tl" rotWithShape="0">
+              <a:prstClr val="black">
+                <a:alpha val="40000"/>
+              </a:prstClr>
+            </a:outerShdw>
+          </a:effectLst>
+        </p:spPr>
+        <p:txBody>
+          <a:bodyPr wrap="none" rtlCol="0">
+            <a:spAutoFit/>
+          </a:bodyPr>
+          <a:lstStyle/>
+          <a:p>
+            <a:r>
+              <a:rPr lang="en-US" sz="1600" b="1" dirty="0" smtClean="0">
+                <a:solidFill>
+                  <a:schemeClr val="bg1"/>
+                </a:solidFill>
+              </a:rPr>
+              <a:t>Use </a:t>
+            </a:r>
+            <a:r>
+              <a:rPr lang="en-US" sz="1600" b="1" dirty="0">
+                <a:solidFill>
+                  <a:schemeClr val="bg1"/>
+                </a:solidFill>
+              </a:rPr>
+              <a:t>SearchGUI to identify your spectra!</a:t>
+            </a:r>
+          </a:p>
+        </p:txBody>
+      </p:sp>
+      <p:pic>
+        <p:nvPicPr>
+          <p:cNvPr id="18439" name="Picture 7" descr="C:\Users\hba041\My_Applications\peptide-shaker\src\main\resources\icons\searchgui-medium-shadow.png"/>
+          <p:cNvPicPr>
+            <a:picLocks noChangeAspect="1" noChangeArrowheads="1"/>
+          </p:cNvPicPr>
+          <p:nvPr/>
+        </p:nvPicPr>
+        <p:blipFill>
+          <a:blip r:embed="rId3" cstate="print"/>
+          <a:srcRect/>
+          <a:stretch>
+            <a:fillRect/>
+          </a:stretch>
+        </p:blipFill>
+        <p:spPr bwMode="auto">
+          <a:xfrm>
+            <a:off x="5863430" y="1551779"/>
+            <a:ext cx="633932" cy="475449"/>
+          </a:xfrm>
+          <a:prstGeom prst="rect">
+            <a:avLst/>
+          </a:prstGeom>
+          <a:noFill/>
+        </p:spPr>
+      </p:pic>
+      <p:sp>
+        <p:nvSpPr>
+          <p:cNvPr id="26" name="TextBox 25"/>
+          <p:cNvSpPr txBox="1"/>
+          <p:nvPr/>
+        </p:nvSpPr>
+        <p:spPr>
+          <a:xfrm>
+            <a:off x="1693081" y="4357689"/>
+            <a:ext cx="1952779" cy="246221"/>
+          </a:xfrm>
+          <a:prstGeom prst="rect">
+            <a:avLst/>
+          </a:prstGeom>
+          <a:noFill/>
+        </p:spPr>
+        <p:txBody>
+          <a:bodyPr wrap="none" rtlCol="0">
+            <a:spAutoFit/>
+          </a:bodyPr>
+          <a:lstStyle/>
+          <a:p>
+            <a:r>
+              <a:rPr lang="en-US" sz="1000" dirty="0" smtClean="0">
+                <a:hlinkClick r:id="rId4"/>
+              </a:rPr>
+              <a:t>Click here to download SearchGUI</a:t>
+            </a:r>
+            <a:endParaRPr lang="en-US" sz="1000" dirty="0"/>
+          </a:p>
+        </p:txBody>
+      </p:sp>
       <p:pic>
         <p:nvPicPr>
           <p:cNvPr id="1027" name="Picture 3"/>
@@ -5429,7 +5413,7 @@
         </p:blipFill>
         <p:spPr bwMode="auto">
           <a:xfrm>
-            <a:off x="2946400" y="2374900"/>
+            <a:off x="2939256" y="2374900"/>
             <a:ext cx="1875282" cy="1627727"/>
           </a:xfrm>
           <a:prstGeom prst="rect">
@@ -5459,8 +5443,8 @@
         </p:nvSpPr>
         <p:spPr>
           <a:xfrm>
-            <a:off x="3291917" y="2005809"/>
-            <a:ext cx="2670733" cy="486000"/>
+            <a:off x="3291916" y="2005809"/>
+            <a:ext cx="3273189" cy="486000"/>
           </a:xfrm>
           <a:prstGeom prst="leftArrow">
             <a:avLst/>
@@ -5506,7 +5490,15 @@
                   <a:schemeClr val="bg1"/>
                 </a:solidFill>
               </a:rPr>
-              <a:t>Search OMSSA and X!Tandem …</a:t>
+              <a:t>Apply X!Tandem, MS-GF+ and OMSSA </a:t>
+            </a:r>
+            <a:r>
+              <a:rPr lang="en-US" sz="1400" dirty="0" smtClean="0">
+                <a:solidFill>
+                  <a:schemeClr val="bg1"/>
+                </a:solidFill>
+              </a:rPr>
+              <a:t>…</a:t>
             </a:r>
             <a:endParaRPr lang="en-US" sz="1400" dirty="0">
               <a:solidFill>

</xml_diff>

<commit_message>
Updated the getting started slides to include Comet. Updated Chapter 1.3 of the Tutorials.
</commit_message>
<xml_diff>
--- a/wiki/getting_started/getting_started.pptx
+++ b/wiki/getting_started/getting_started.pptx
@@ -301,7 +301,7 @@
             <a:fld id="{925377B3-2828-421F-BFC8-72289DEFFBB5}" type="datetimeFigureOut">
               <a:rPr lang="en-US" smtClean="0"/>
               <a:pPr/>
-              <a:t>8/22/2014</a:t>
+              <a:t>9/29/2014</a:t>
             </a:fld>
             <a:endParaRPr lang="en-US"/>
           </a:p>
@@ -468,7 +468,7 @@
             <a:fld id="{925377B3-2828-421F-BFC8-72289DEFFBB5}" type="datetimeFigureOut">
               <a:rPr lang="en-US" smtClean="0"/>
               <a:pPr/>
-              <a:t>8/22/2014</a:t>
+              <a:t>9/29/2014</a:t>
             </a:fld>
             <a:endParaRPr lang="en-US"/>
           </a:p>
@@ -645,7 +645,7 @@
             <a:fld id="{925377B3-2828-421F-BFC8-72289DEFFBB5}" type="datetimeFigureOut">
               <a:rPr lang="en-US" smtClean="0"/>
               <a:pPr/>
-              <a:t>8/22/2014</a:t>
+              <a:t>9/29/2014</a:t>
             </a:fld>
             <a:endParaRPr lang="en-US"/>
           </a:p>
@@ -812,7 +812,7 @@
             <a:fld id="{925377B3-2828-421F-BFC8-72289DEFFBB5}" type="datetimeFigureOut">
               <a:rPr lang="en-US" smtClean="0"/>
               <a:pPr/>
-              <a:t>8/22/2014</a:t>
+              <a:t>9/29/2014</a:t>
             </a:fld>
             <a:endParaRPr lang="en-US"/>
           </a:p>
@@ -1055,7 +1055,7 @@
             <a:fld id="{925377B3-2828-421F-BFC8-72289DEFFBB5}" type="datetimeFigureOut">
               <a:rPr lang="en-US" smtClean="0"/>
               <a:pPr/>
-              <a:t>8/22/2014</a:t>
+              <a:t>9/29/2014</a:t>
             </a:fld>
             <a:endParaRPr lang="en-US"/>
           </a:p>
@@ -1340,7 +1340,7 @@
             <a:fld id="{925377B3-2828-421F-BFC8-72289DEFFBB5}" type="datetimeFigureOut">
               <a:rPr lang="en-US" smtClean="0"/>
               <a:pPr/>
-              <a:t>8/22/2014</a:t>
+              <a:t>9/29/2014</a:t>
             </a:fld>
             <a:endParaRPr lang="en-US"/>
           </a:p>
@@ -1759,7 +1759,7 @@
             <a:fld id="{925377B3-2828-421F-BFC8-72289DEFFBB5}" type="datetimeFigureOut">
               <a:rPr lang="en-US" smtClean="0"/>
               <a:pPr/>
-              <a:t>8/22/2014</a:t>
+              <a:t>9/29/2014</a:t>
             </a:fld>
             <a:endParaRPr lang="en-US"/>
           </a:p>
@@ -1874,7 +1874,7 @@
             <a:fld id="{925377B3-2828-421F-BFC8-72289DEFFBB5}" type="datetimeFigureOut">
               <a:rPr lang="en-US" smtClean="0"/>
               <a:pPr/>
-              <a:t>8/22/2014</a:t>
+              <a:t>9/29/2014</a:t>
             </a:fld>
             <a:endParaRPr lang="en-US"/>
           </a:p>
@@ -1966,7 +1966,7 @@
             <a:fld id="{925377B3-2828-421F-BFC8-72289DEFFBB5}" type="datetimeFigureOut">
               <a:rPr lang="en-US" smtClean="0"/>
               <a:pPr/>
-              <a:t>8/22/2014</a:t>
+              <a:t>9/29/2014</a:t>
             </a:fld>
             <a:endParaRPr lang="en-US"/>
           </a:p>
@@ -2240,7 +2240,7 @@
             <a:fld id="{925377B3-2828-421F-BFC8-72289DEFFBB5}" type="datetimeFigureOut">
               <a:rPr lang="en-US" smtClean="0"/>
               <a:pPr/>
-              <a:t>8/22/2014</a:t>
+              <a:t>9/29/2014</a:t>
             </a:fld>
             <a:endParaRPr lang="en-US"/>
           </a:p>
@@ -2490,7 +2490,7 @@
             <a:fld id="{925377B3-2828-421F-BFC8-72289DEFFBB5}" type="datetimeFigureOut">
               <a:rPr lang="en-US" smtClean="0"/>
               <a:pPr/>
-              <a:t>8/22/2014</a:t>
+              <a:t>9/29/2014</a:t>
             </a:fld>
             <a:endParaRPr lang="en-US"/>
           </a:p>
@@ -2700,7 +2700,7 @@
             <a:fld id="{925377B3-2828-421F-BFC8-72289DEFFBB5}" type="datetimeFigureOut">
               <a:rPr lang="en-US" smtClean="0"/>
               <a:pPr/>
-              <a:t>8/22/2014</a:t>
+              <a:t>9/29/2014</a:t>
             </a:fld>
             <a:endParaRPr lang="en-US"/>
           </a:p>
@@ -5283,7 +5283,7 @@
       </p:sp>
       <p:pic>
         <p:nvPicPr>
-          <p:cNvPr id="1026" name="Picture 2"/>
+          <p:cNvPr id="2" name="Picture 2"/>
           <p:cNvPicPr>
             <a:picLocks noChangeAspect="1" noChangeArrowheads="1"/>
           </p:cNvPicPr>
@@ -5298,151 +5298,8 @@
         </p:blipFill>
         <p:spPr bwMode="auto">
           <a:xfrm>
-            <a:off x="1629697" y="1989726"/>
-            <a:ext cx="1875600" cy="1595464"/>
-          </a:xfrm>
-          <a:prstGeom prst="rect">
-            <a:avLst/>
-          </a:prstGeom>
-          <a:noFill/>
-          <a:ln w="9525">
-            <a:noFill/>
-            <a:miter lim="800000"/>
-            <a:headEnd/>
-            <a:tailEnd/>
-          </a:ln>
-        </p:spPr>
-      </p:pic>
-      <p:sp>
-        <p:nvSpPr>
-          <p:cNvPr id="8" name="TextBox 7"/>
-          <p:cNvSpPr txBox="1"/>
-          <p:nvPr/>
-        </p:nvSpPr>
-        <p:spPr>
-          <a:xfrm>
-            <a:off x="1475656" y="1556792"/>
-            <a:ext cx="3623492" cy="338554"/>
-          </a:xfrm>
-          <a:prstGeom prst="rect">
-            <a:avLst/>
-          </a:prstGeom>
-          <a:solidFill>
-            <a:schemeClr val="accent6"/>
-          </a:solidFill>
-          <a:ln>
-            <a:noFill/>
-          </a:ln>
-          <a:effectLst>
-            <a:outerShdw blurRad="50800" dist="38100" dir="2700000" algn="tl" rotWithShape="0">
-              <a:prstClr val="black">
-                <a:alpha val="40000"/>
-              </a:prstClr>
-            </a:outerShdw>
-          </a:effectLst>
-        </p:spPr>
-        <p:txBody>
-          <a:bodyPr wrap="none" rtlCol="0">
-            <a:spAutoFit/>
-          </a:bodyPr>
-          <a:lstStyle/>
-          <a:p>
-            <a:r>
-              <a:rPr lang="en-US" sz="1600" b="1" dirty="0" smtClean="0">
-                <a:solidFill>
-                  <a:schemeClr val="bg1"/>
-                </a:solidFill>
-              </a:rPr>
-              <a:t>Use </a:t>
-            </a:r>
-            <a:r>
-              <a:rPr lang="en-US" sz="1600" b="1" dirty="0">
-                <a:solidFill>
-                  <a:schemeClr val="bg1"/>
-                </a:solidFill>
-              </a:rPr>
-              <a:t>SearchGUI to identify your spectra!</a:t>
-            </a:r>
-          </a:p>
-        </p:txBody>
-      </p:sp>
-      <p:pic>
-        <p:nvPicPr>
-          <p:cNvPr id="18439" name="Picture 7" descr="C:\Users\hba041\My_Applications\peptide-shaker\src\main\resources\icons\searchgui-medium-shadow.png"/>
-          <p:cNvPicPr>
-            <a:picLocks noChangeAspect="1" noChangeArrowheads="1"/>
-          </p:cNvPicPr>
-          <p:nvPr/>
-        </p:nvPicPr>
-        <p:blipFill>
-          <a:blip r:embed="rId3" cstate="print"/>
-          <a:srcRect/>
-          <a:stretch>
-            <a:fillRect/>
-          </a:stretch>
-        </p:blipFill>
-        <p:spPr bwMode="auto">
-          <a:xfrm>
-            <a:off x="5863430" y="1551779"/>
-            <a:ext cx="633932" cy="475449"/>
-          </a:xfrm>
-          <a:prstGeom prst="rect">
-            <a:avLst/>
-          </a:prstGeom>
-          <a:noFill/>
-        </p:spPr>
-      </p:pic>
-      <p:sp>
-        <p:nvSpPr>
-          <p:cNvPr id="26" name="TextBox 25"/>
-          <p:cNvSpPr txBox="1"/>
-          <p:nvPr/>
-        </p:nvSpPr>
-        <p:spPr>
-          <a:xfrm>
-            <a:off x="1693081" y="4357689"/>
-            <a:ext cx="1952779" cy="246221"/>
-          </a:xfrm>
-          <a:prstGeom prst="rect">
-            <a:avLst/>
-          </a:prstGeom>
-          <a:noFill/>
-        </p:spPr>
-        <p:txBody>
-          <a:bodyPr wrap="none" rtlCol="0">
-            <a:spAutoFit/>
-          </a:bodyPr>
-          <a:lstStyle/>
-          <a:p>
-            <a:r>
-              <a:rPr lang="en-US" sz="1000" dirty="0" smtClean="0">
-                <a:hlinkClick r:id="rId4"/>
-              </a:rPr>
-              <a:t>Click here to download SearchGUI</a:t>
-            </a:r>
-            <a:endParaRPr lang="en-US" sz="1000" dirty="0"/>
-          </a:p>
-        </p:txBody>
-      </p:sp>
-      <p:pic>
-        <p:nvPicPr>
-          <p:cNvPr id="1027" name="Picture 3"/>
-          <p:cNvPicPr>
-            <a:picLocks noChangeAspect="1" noChangeArrowheads="1"/>
-          </p:cNvPicPr>
-          <p:nvPr/>
-        </p:nvPicPr>
-        <p:blipFill>
-          <a:blip r:embed="rId5" cstate="print"/>
-          <a:srcRect/>
-          <a:stretch>
-            <a:fillRect/>
-          </a:stretch>
-        </p:blipFill>
-        <p:spPr bwMode="auto">
-          <a:xfrm>
-            <a:off x="2939256" y="2374900"/>
-            <a:ext cx="1875282" cy="1627727"/>
+            <a:off x="1650787" y="2027259"/>
+            <a:ext cx="1859329" cy="1690102"/>
           </a:xfrm>
           <a:prstGeom prst="rect">
             <a:avLst/>
@@ -5465,16 +5322,16 @@
       </p:pic>
       <p:sp>
         <p:nvSpPr>
-          <p:cNvPr id="17" name="Left Arrow 16"/>
-          <p:cNvSpPr/>
-          <p:nvPr/>
-        </p:nvSpPr>
-        <p:spPr>
-          <a:xfrm>
-            <a:off x="3291916" y="2005809"/>
-            <a:ext cx="3273189" cy="486000"/>
-          </a:xfrm>
-          <a:prstGeom prst="leftArrow">
+          <p:cNvPr id="8" name="TextBox 7"/>
+          <p:cNvSpPr txBox="1"/>
+          <p:nvPr/>
+        </p:nvSpPr>
+        <p:spPr>
+          <a:xfrm>
+            <a:off x="1475656" y="1556792"/>
+            <a:ext cx="3623492" cy="338554"/>
+          </a:xfrm>
+          <a:prstGeom prst="rect">
             <a:avLst/>
           </a:prstGeom>
           <a:solidFill>
@@ -5491,6 +5348,156 @@
             </a:outerShdw>
           </a:effectLst>
         </p:spPr>
+        <p:txBody>
+          <a:bodyPr wrap="none" rtlCol="0">
+            <a:spAutoFit/>
+          </a:bodyPr>
+          <a:lstStyle/>
+          <a:p>
+            <a:r>
+              <a:rPr lang="en-US" sz="1600" b="1" dirty="0" smtClean="0">
+                <a:solidFill>
+                  <a:schemeClr val="bg1"/>
+                </a:solidFill>
+              </a:rPr>
+              <a:t>Use </a:t>
+            </a:r>
+            <a:r>
+              <a:rPr lang="en-US" sz="1600" b="1" dirty="0">
+                <a:solidFill>
+                  <a:schemeClr val="bg1"/>
+                </a:solidFill>
+              </a:rPr>
+              <a:t>SearchGUI to identify your spectra!</a:t>
+            </a:r>
+          </a:p>
+        </p:txBody>
+      </p:sp>
+      <p:pic>
+        <p:nvPicPr>
+          <p:cNvPr id="18439" name="Picture 7" descr="C:\Users\hba041\My_Applications\peptide-shaker\src\main\resources\icons\searchgui-medium-shadow.png"/>
+          <p:cNvPicPr>
+            <a:picLocks noChangeAspect="1" noChangeArrowheads="1"/>
+          </p:cNvPicPr>
+          <p:nvPr/>
+        </p:nvPicPr>
+        <p:blipFill>
+          <a:blip r:embed="rId3" cstate="print"/>
+          <a:srcRect/>
+          <a:stretch>
+            <a:fillRect/>
+          </a:stretch>
+        </p:blipFill>
+        <p:spPr bwMode="auto">
+          <a:xfrm>
+            <a:off x="5863430" y="1551779"/>
+            <a:ext cx="633932" cy="475449"/>
+          </a:xfrm>
+          <a:prstGeom prst="rect">
+            <a:avLst/>
+          </a:prstGeom>
+          <a:noFill/>
+        </p:spPr>
+      </p:pic>
+      <p:sp>
+        <p:nvSpPr>
+          <p:cNvPr id="26" name="TextBox 25"/>
+          <p:cNvSpPr txBox="1"/>
+          <p:nvPr/>
+        </p:nvSpPr>
+        <p:spPr>
+          <a:xfrm>
+            <a:off x="1693081" y="4357689"/>
+            <a:ext cx="1952779" cy="246221"/>
+          </a:xfrm>
+          <a:prstGeom prst="rect">
+            <a:avLst/>
+          </a:prstGeom>
+          <a:noFill/>
+        </p:spPr>
+        <p:txBody>
+          <a:bodyPr wrap="none" rtlCol="0">
+            <a:spAutoFit/>
+          </a:bodyPr>
+          <a:lstStyle/>
+          <a:p>
+            <a:r>
+              <a:rPr lang="en-US" sz="1000" dirty="0" smtClean="0">
+                <a:hlinkClick r:id="rId4"/>
+              </a:rPr>
+              <a:t>Click here to download SearchGUI</a:t>
+            </a:r>
+            <a:endParaRPr lang="en-US" sz="1000" dirty="0"/>
+          </a:p>
+        </p:txBody>
+      </p:sp>
+      <p:pic>
+        <p:nvPicPr>
+          <p:cNvPr id="1027" name="Picture 3"/>
+          <p:cNvPicPr>
+            <a:picLocks noChangeAspect="1" noChangeArrowheads="1"/>
+          </p:cNvPicPr>
+          <p:nvPr/>
+        </p:nvPicPr>
+        <p:blipFill>
+          <a:blip r:embed="rId5" cstate="print"/>
+          <a:srcRect/>
+          <a:stretch>
+            <a:fillRect/>
+          </a:stretch>
+        </p:blipFill>
+        <p:spPr bwMode="auto">
+          <a:xfrm>
+            <a:off x="2939256" y="2374900"/>
+            <a:ext cx="1875282" cy="1627727"/>
+          </a:xfrm>
+          <a:prstGeom prst="rect">
+            <a:avLst/>
+          </a:prstGeom>
+          <a:noFill/>
+          <a:ln w="9525">
+            <a:noFill/>
+            <a:miter lim="800000"/>
+            <a:headEnd/>
+            <a:tailEnd/>
+          </a:ln>
+          <a:effectLst>
+            <a:outerShdw blurRad="50800" dist="38100" dir="2700000" algn="tl" rotWithShape="0">
+              <a:prstClr val="black">
+                <a:alpha val="40000"/>
+              </a:prstClr>
+            </a:outerShdw>
+          </a:effectLst>
+        </p:spPr>
+      </p:pic>
+      <p:sp>
+        <p:nvSpPr>
+          <p:cNvPr id="17" name="Left Arrow 16"/>
+          <p:cNvSpPr/>
+          <p:nvPr/>
+        </p:nvSpPr>
+        <p:spPr>
+          <a:xfrm>
+            <a:off x="3291916" y="2005809"/>
+            <a:ext cx="3273189" cy="486000"/>
+          </a:xfrm>
+          <a:prstGeom prst="leftArrow">
+            <a:avLst/>
+          </a:prstGeom>
+          <a:solidFill>
+            <a:schemeClr val="accent6"/>
+          </a:solidFill>
+          <a:ln>
+            <a:noFill/>
+          </a:ln>
+          <a:effectLst>
+            <a:outerShdw blurRad="50800" dist="38100" dir="2700000" algn="tl" rotWithShape="0">
+              <a:prstClr val="black">
+                <a:alpha val="40000"/>
+              </a:prstClr>
+            </a:outerShdw>
+          </a:effectLst>
+        </p:spPr>
         <p:style>
           <a:lnRef idx="2">
             <a:schemeClr val="accent1">
@@ -5526,7 +5533,7 @@
                   <a:schemeClr val="bg1"/>
                 </a:solidFill>
               </a:rPr>
-              <a:t>five</a:t>
+              <a:t>six </a:t>
             </a:r>
             <a:r>
               <a:rPr lang="en-US" sz="1400" dirty="0" smtClean="0">
@@ -5534,23 +5541,7 @@
                   <a:schemeClr val="bg1"/>
                 </a:solidFill>
               </a:rPr>
-              <a:t> proteomics search engines</a:t>
-            </a:r>
-            <a:r>
-              <a:rPr lang="en-US" sz="1400" dirty="0" smtClean="0">
-                <a:solidFill>
-                  <a:schemeClr val="bg1"/>
-                </a:solidFill>
-              </a:rPr>
-              <a:t> </a:t>
-            </a:r>
-            <a:r>
-              <a:rPr lang="en-US" sz="1400" dirty="0" smtClean="0">
-                <a:solidFill>
-                  <a:schemeClr val="bg1"/>
-                </a:solidFill>
-              </a:rPr>
-              <a:t>…</a:t>
+              <a:t>proteomics search engines …</a:t>
             </a:r>
             <a:endParaRPr lang="en-US" sz="1400" dirty="0">
               <a:solidFill>

</xml_diff>

<commit_message>
Added the PeptideShaker reference to the Getting Started slides.
</commit_message>
<xml_diff>
--- a/wiki/getting_started/getting_started.pptx
+++ b/wiki/getting_started/getting_started.pptx
@@ -301,7 +301,7 @@
             <a:fld id="{925377B3-2828-421F-BFC8-72289DEFFBB5}" type="datetimeFigureOut">
               <a:rPr lang="en-US" smtClean="0"/>
               <a:pPr/>
-              <a:t>9/29/2014</a:t>
+              <a:t>1/9/2015</a:t>
             </a:fld>
             <a:endParaRPr lang="en-US"/>
           </a:p>
@@ -468,7 +468,7 @@
             <a:fld id="{925377B3-2828-421F-BFC8-72289DEFFBB5}" type="datetimeFigureOut">
               <a:rPr lang="en-US" smtClean="0"/>
               <a:pPr/>
-              <a:t>9/29/2014</a:t>
+              <a:t>1/9/2015</a:t>
             </a:fld>
             <a:endParaRPr lang="en-US"/>
           </a:p>
@@ -645,7 +645,7 @@
             <a:fld id="{925377B3-2828-421F-BFC8-72289DEFFBB5}" type="datetimeFigureOut">
               <a:rPr lang="en-US" smtClean="0"/>
               <a:pPr/>
-              <a:t>9/29/2014</a:t>
+              <a:t>1/9/2015</a:t>
             </a:fld>
             <a:endParaRPr lang="en-US"/>
           </a:p>
@@ -812,7 +812,7 @@
             <a:fld id="{925377B3-2828-421F-BFC8-72289DEFFBB5}" type="datetimeFigureOut">
               <a:rPr lang="en-US" smtClean="0"/>
               <a:pPr/>
-              <a:t>9/29/2014</a:t>
+              <a:t>1/9/2015</a:t>
             </a:fld>
             <a:endParaRPr lang="en-US"/>
           </a:p>
@@ -1055,7 +1055,7 @@
             <a:fld id="{925377B3-2828-421F-BFC8-72289DEFFBB5}" type="datetimeFigureOut">
               <a:rPr lang="en-US" smtClean="0"/>
               <a:pPr/>
-              <a:t>9/29/2014</a:t>
+              <a:t>1/9/2015</a:t>
             </a:fld>
             <a:endParaRPr lang="en-US"/>
           </a:p>
@@ -1340,7 +1340,7 @@
             <a:fld id="{925377B3-2828-421F-BFC8-72289DEFFBB5}" type="datetimeFigureOut">
               <a:rPr lang="en-US" smtClean="0"/>
               <a:pPr/>
-              <a:t>9/29/2014</a:t>
+              <a:t>1/9/2015</a:t>
             </a:fld>
             <a:endParaRPr lang="en-US"/>
           </a:p>
@@ -1759,7 +1759,7 @@
             <a:fld id="{925377B3-2828-421F-BFC8-72289DEFFBB5}" type="datetimeFigureOut">
               <a:rPr lang="en-US" smtClean="0"/>
               <a:pPr/>
-              <a:t>9/29/2014</a:t>
+              <a:t>1/9/2015</a:t>
             </a:fld>
             <a:endParaRPr lang="en-US"/>
           </a:p>
@@ -1874,7 +1874,7 @@
             <a:fld id="{925377B3-2828-421F-BFC8-72289DEFFBB5}" type="datetimeFigureOut">
               <a:rPr lang="en-US" smtClean="0"/>
               <a:pPr/>
-              <a:t>9/29/2014</a:t>
+              <a:t>1/9/2015</a:t>
             </a:fld>
             <a:endParaRPr lang="en-US"/>
           </a:p>
@@ -1966,7 +1966,7 @@
             <a:fld id="{925377B3-2828-421F-BFC8-72289DEFFBB5}" type="datetimeFigureOut">
               <a:rPr lang="en-US" smtClean="0"/>
               <a:pPr/>
-              <a:t>9/29/2014</a:t>
+              <a:t>1/9/2015</a:t>
             </a:fld>
             <a:endParaRPr lang="en-US"/>
           </a:p>
@@ -2240,7 +2240,7 @@
             <a:fld id="{925377B3-2828-421F-BFC8-72289DEFFBB5}" type="datetimeFigureOut">
               <a:rPr lang="en-US" smtClean="0"/>
               <a:pPr/>
-              <a:t>9/29/2014</a:t>
+              <a:t>1/9/2015</a:t>
             </a:fld>
             <a:endParaRPr lang="en-US"/>
           </a:p>
@@ -2490,7 +2490,7 @@
             <a:fld id="{925377B3-2828-421F-BFC8-72289DEFFBB5}" type="datetimeFigureOut">
               <a:rPr lang="en-US" smtClean="0"/>
               <a:pPr/>
-              <a:t>9/29/2014</a:t>
+              <a:t>1/9/2015</a:t>
             </a:fld>
             <a:endParaRPr lang="en-US"/>
           </a:p>
@@ -2700,7 +2700,7 @@
             <a:fld id="{925377B3-2828-421F-BFC8-72289DEFFBB5}" type="datetimeFigureOut">
               <a:rPr lang="en-US" smtClean="0"/>
               <a:pPr/>
-              <a:t>9/29/2014</a:t>
+              <a:t>1/9/2015</a:t>
             </a:fld>
             <a:endParaRPr lang="en-US"/>
           </a:p>
@@ -3213,7 +3213,7 @@
         </p:nvSpPr>
         <p:spPr>
           <a:xfrm>
-            <a:off x="4564857" y="4264817"/>
+            <a:off x="4572231" y="4264817"/>
             <a:ext cx="2021707" cy="253916"/>
           </a:xfrm>
           <a:prstGeom prst="rect">
@@ -3328,6 +3328,48 @@
               </a:rPr>
               <a:t>Completes the proteomics analysis cycle!</a:t>
             </a:r>
+          </a:p>
+        </p:txBody>
+      </p:sp>
+      <p:sp>
+        <p:nvSpPr>
+          <p:cNvPr id="9" name="TextBox 8"/>
+          <p:cNvSpPr txBox="1"/>
+          <p:nvPr/>
+        </p:nvSpPr>
+        <p:spPr>
+          <a:xfrm>
+            <a:off x="1430593" y="4284405"/>
+            <a:ext cx="3127779" cy="246221"/>
+          </a:xfrm>
+          <a:prstGeom prst="rect">
+            <a:avLst/>
+          </a:prstGeom>
+          <a:noFill/>
+        </p:spPr>
+        <p:txBody>
+          <a:bodyPr wrap="none" rtlCol="0">
+            <a:spAutoFit/>
+          </a:bodyPr>
+          <a:lstStyle/>
+          <a:p>
+            <a:r>
+              <a:rPr lang="nl-NL" sz="1000" dirty="0" smtClean="0"/>
+              <a:t>Vaudel </a:t>
+            </a:r>
+            <a:r>
+              <a:rPr lang="nl-NL" sz="1000" i="1" dirty="0" smtClean="0"/>
+              <a:t>et al.: </a:t>
+            </a:r>
+            <a:r>
+              <a:rPr lang="nl-NL" sz="1000" dirty="0" smtClean="0"/>
+              <a:t>Nature </a:t>
+            </a:r>
+            <a:r>
+              <a:rPr lang="nl-NL" sz="1000" dirty="0" smtClean="0"/>
+              <a:t>Biotechnol. 2015 Jan;33(1):22–24.</a:t>
+            </a:r>
+            <a:endParaRPr lang="en-US" sz="1000" dirty="0"/>
           </a:p>
         </p:txBody>
       </p:sp>
@@ -5525,23 +5567,7 @@
                   <a:schemeClr val="bg1"/>
                 </a:solidFill>
               </a:rPr>
-              <a:t>Apply </a:t>
-            </a:r>
-            <a:r>
-              <a:rPr lang="en-US" sz="1400" dirty="0" smtClean="0">
-                <a:solidFill>
-                  <a:schemeClr val="bg1"/>
-                </a:solidFill>
-              </a:rPr>
-              <a:t>six </a:t>
-            </a:r>
-            <a:r>
-              <a:rPr lang="en-US" sz="1400" dirty="0" smtClean="0">
-                <a:solidFill>
-                  <a:schemeClr val="bg1"/>
-                </a:solidFill>
-              </a:rPr>
-              <a:t>proteomics search engines …</a:t>
+              <a:t>Apply six proteomics search engines …</a:t>
             </a:r>
             <a:endParaRPr lang="en-US" sz="1400" dirty="0">
               <a:solidFill>

</xml_diff>